<commit_message>
PowerPoint con tema rojo y diseño optimizado
- Tema rojo profesional en lugar de azul
- Control preciso del espaciado para evitar solapamiento de texto
- Audios embebidos con add_movie() para reproducción
- 20 diapositivas bien distribuidas
- Cajas con bordes rojos para audios
- Tabla con headers rojos
- Mejor aprovechamiento del espacio (menos blancos)
- word_wrap activado para evitar desbordamientos
</commit_message>
<xml_diff>
--- a/presentacion.pptx
+++ b/presentacion.pptx
@@ -25,7 +25,6 @@
     <p:sldId id="273" r:id="rId24"/>
     <p:sldId id="274" r:id="rId25"/>
     <p:sldId id="275" r:id="rId26"/>
-    <p:sldId id="276" r:id="rId27"/>
   </p:sldIdLst>
   <p:sldSz cx="9144000" cy="6858000" type="screen4x3"/>
   <p:notesSz cx="6858000" cy="9144000"/>
@@ -3104,7 +3103,7 @@
     <p:bg>
       <p:bgPr>
         <a:solidFill>
-          <a:srgbClr val="2C3E50"/>
+          <a:srgbClr val="34495E"/>
         </a:solidFill>
         <a:effectLst/>
       </p:bgPr>
@@ -3124,8 +3123,8 @@
         </p:nvSpPr>
         <p:spPr>
           <a:xfrm>
-            <a:off x="914400" y="2286000"/>
-            <a:ext cx="7315200" cy="1828800"/>
+            <a:off x="457200" y="1828800"/>
+            <a:ext cx="8229600" cy="3200400"/>
           </a:xfrm>
           <a:prstGeom prst="rect">
             <a:avLst/>
@@ -3133,13 +3132,13 @@
           <a:noFill/>
         </p:spPr>
         <p:txBody>
-          <a:bodyPr wrap="none">
+          <a:bodyPr wrap="square">
             <a:spAutoFit/>
           </a:bodyPr>
           <a:lstStyle/>
           <a:p>
             <a:pPr algn="ctr">
-              <a:defRPr sz="4800" b="1">
+              <a:defRPr sz="5400" b="1">
                 <a:solidFill>
                   <a:srgbClr val="FFFFFF"/>
                 </a:solidFill>
@@ -3151,9 +3150,9 @@
           </a:p>
           <a:p>
             <a:pPr algn="ctr">
-              <a:defRPr sz="4800" b="1">
+              <a:defRPr sz="3800">
                 <a:solidFill>
-                  <a:srgbClr val="FFFFFF"/>
+                  <a:srgbClr val="C0392B"/>
                 </a:solidFill>
               </a:defRPr>
             </a:pPr>
@@ -3190,13 +3189,13 @@
         <p:spPr>
           <a:xfrm>
             <a:off x="0" y="0"/>
-            <a:ext cx="9144000" cy="1005840"/>
+            <a:ext cx="9144000" cy="914400"/>
           </a:xfrm>
           <a:prstGeom prst="rect">
             <a:avLst/>
           </a:prstGeom>
           <a:solidFill>
-            <a:srgbClr val="3498DB"/>
+            <a:srgbClr val="C0392B"/>
           </a:solidFill>
           <a:ln>
             <a:noFill/>
@@ -3232,8 +3231,8 @@
         </p:nvSpPr>
         <p:spPr>
           <a:xfrm>
-            <a:off x="274320" y="228600"/>
-            <a:ext cx="8595360" cy="640080"/>
+            <a:off x="182880" y="137160"/>
+            <a:ext cx="8778240" cy="640080"/>
           </a:xfrm>
           <a:prstGeom prst="rect">
             <a:avLst/>
@@ -3247,14 +3246,14 @@
           <a:lstStyle/>
           <a:p>
             <a:pPr algn="ctr">
-              <a:defRPr sz="3600" b="1">
+              <a:defRPr sz="3400" b="1">
                 <a:solidFill>
                   <a:srgbClr val="FFFFFF"/>
                 </a:solidFill>
               </a:defRPr>
             </a:pPr>
             <a:r>
-              <a:t>Las visualizaciones acústicas</a:t>
+              <a:t>Las visualizaciones acústicas (II)</a:t>
             </a:r>
           </a:p>
         </p:txBody>
@@ -3267,7 +3266,7 @@
         </p:nvSpPr>
         <p:spPr>
           <a:xfrm>
-            <a:off x="457200" y="1188720"/>
+            <a:off x="457200" y="1097280"/>
             <a:ext cx="8229600" cy="457200"/>
           </a:xfrm>
           <a:prstGeom prst="rect">
@@ -3284,19 +3283,19 @@
             <a:pPr>
               <a:defRPr sz="2400">
                 <a:solidFill>
-                  <a:srgbClr val="555555"/>
+                  <a:srgbClr val="34495E"/>
                 </a:solidFill>
               </a:defRPr>
             </a:pPr>
             <a:r>
-              <a:t>Espacio vocálico F1-F2</a:t>
+              <a:t>Distribución del tono</a:t>
             </a:r>
           </a:p>
         </p:txBody>
       </p:sp>
       <p:pic>
         <p:nvPicPr>
-          <p:cNvPr id="5" name="Picture 4" descr="vowel_spaces_overlap_small.png"/>
+          <p:cNvPr id="5" name="Picture 4" descr="gender_comparison_statistical_small.png"/>
           <p:cNvPicPr>
             <a:picLocks noChangeAspect="1"/>
           </p:cNvPicPr>
@@ -3310,8 +3309,8 @@
         </p:blipFill>
         <p:spPr>
           <a:xfrm>
-            <a:off x="1828800" y="1737360"/>
-            <a:ext cx="4426813" cy="3840480"/>
+            <a:off x="1371600" y="1737360"/>
+            <a:ext cx="5813351" cy="4114800"/>
           </a:xfrm>
           <a:prstGeom prst="rect">
             <a:avLst/>
@@ -3326,8 +3325,8 @@
         </p:nvSpPr>
         <p:spPr>
           <a:xfrm>
-            <a:off x="457200" y="5760720"/>
-            <a:ext cx="8229600" cy="548640"/>
+            <a:off x="457200" y="6035040"/>
+            <a:ext cx="8229600" cy="640080"/>
           </a:xfrm>
           <a:prstGeom prst="rect">
             <a:avLst/>
@@ -3335,20 +3334,20 @@
           <a:noFill/>
         </p:spPr>
         <p:txBody>
-          <a:bodyPr wrap="none">
+          <a:bodyPr wrap="square">
             <a:spAutoFit/>
           </a:bodyPr>
           <a:lstStyle/>
           <a:p>
             <a:pPr>
-              <a:defRPr sz="1800" i="1">
+              <a:defRPr sz="2000" i="1">
                 <a:solidFill>
-                  <a:srgbClr val="7F8C8D"/>
+                  <a:srgbClr val="34495E"/>
                 </a:solidFill>
               </a:defRPr>
             </a:pPr>
             <a:r>
-              <a:t>Interpretación: las elipses muestran la distribución de las vocales de cada hablante. El solapamiento es evidente.</a:t>
+              <a:t>Interpretación: las barras de error muestran que los rangos de tono son muy similares entre niños y niñas.</a:t>
             </a:r>
           </a:p>
         </p:txBody>
@@ -3380,13 +3379,13 @@
         <p:spPr>
           <a:xfrm>
             <a:off x="0" y="0"/>
-            <a:ext cx="9144000" cy="1005840"/>
+            <a:ext cx="9144000" cy="914400"/>
           </a:xfrm>
           <a:prstGeom prst="rect">
             <a:avLst/>
           </a:prstGeom>
           <a:solidFill>
-            <a:srgbClr val="3498DB"/>
+            <a:srgbClr val="C0392B"/>
           </a:solidFill>
           <a:ln>
             <a:noFill/>
@@ -3422,8 +3421,8 @@
         </p:nvSpPr>
         <p:spPr>
           <a:xfrm>
-            <a:off x="274320" y="228600"/>
-            <a:ext cx="8595360" cy="640080"/>
+            <a:off x="182880" y="137160"/>
+            <a:ext cx="8778240" cy="640080"/>
           </a:xfrm>
           <a:prstGeom prst="rect">
             <a:avLst/>
@@ -3437,14 +3436,14 @@
           <a:lstStyle/>
           <a:p>
             <a:pPr algn="ctr">
-              <a:defRPr sz="3600" b="1">
+              <a:defRPr sz="3400" b="1">
                 <a:solidFill>
                   <a:srgbClr val="FFFFFF"/>
                 </a:solidFill>
               </a:defRPr>
             </a:pPr>
             <a:r>
-              <a:t>Las visualizaciones acústicas (II)</a:t>
+              <a:t>La paradoja: ¿cómo diferenciamos entonces?</a:t>
             </a:r>
           </a:p>
         </p:txBody>
@@ -3472,42 +3471,63 @@
           <a:lstStyle/>
           <a:p>
             <a:pPr>
-              <a:defRPr sz="2400">
+              <a:defRPr sz="2400" b="1">
                 <a:solidFill>
-                  <a:srgbClr val="555555"/>
+                  <a:srgbClr val="34495E"/>
                 </a:solidFill>
               </a:defRPr>
             </a:pPr>
             <a:r>
-              <a:t>Distribución del tono</a:t>
-            </a:r>
-          </a:p>
-        </p:txBody>
-      </p:sp>
-      <p:pic>
-        <p:nvPicPr>
-          <p:cNvPr id="5" name="Picture 4" descr="gender_comparison_statistical_small.png"/>
-          <p:cNvPicPr>
-            <a:picLocks noChangeAspect="1"/>
-          </p:cNvPicPr>
-          <p:nvPr/>
-        </p:nvPicPr>
-        <p:blipFill>
-          <a:blip r:embed="rId2"/>
-          <a:stretch>
-            <a:fillRect/>
-          </a:stretch>
-        </p:blipFill>
-        <p:spPr>
-          <a:xfrm>
-            <a:off x="1828800" y="1737360"/>
-            <a:ext cx="5425794" cy="3840480"/>
-          </a:xfrm>
-          <a:prstGeom prst="rect">
-            <a:avLst/>
-          </a:prstGeom>
-        </p:spPr>
-      </p:pic>
+              <a:t>Lo que sabemos de la percepción - Barreda &amp; Assmann (2021)</a:t>
+            </a:r>
+          </a:p>
+        </p:txBody>
+      </p:sp>
+      <p:sp>
+        <p:nvSpPr>
+          <p:cNvPr id="5" name="Rounded Rectangle 4"/>
+          <p:cNvSpPr/>
+          <p:nvPr/>
+        </p:nvSpPr>
+        <p:spPr>
+          <a:xfrm>
+            <a:off x="731520" y="1920240"/>
+            <a:ext cx="7680960" cy="1463040"/>
+          </a:xfrm>
+          <a:prstGeom prst="roundRect">
+            <a:avLst/>
+          </a:prstGeom>
+          <a:solidFill>
+            <a:srgbClr val="ECF0F1"/>
+          </a:solidFill>
+          <a:ln w="25400">
+            <a:solidFill>
+              <a:srgbClr val="C0392B"/>
+            </a:solidFill>
+          </a:ln>
+        </p:spPr>
+        <p:style>
+          <a:lnRef idx="1">
+            <a:schemeClr val="accent1"/>
+          </a:lnRef>
+          <a:fillRef idx="3">
+            <a:schemeClr val="accent1"/>
+          </a:fillRef>
+          <a:effectRef idx="2">
+            <a:schemeClr val="accent1"/>
+          </a:effectRef>
+          <a:fontRef idx="minor">
+            <a:schemeClr val="lt1"/>
+          </a:fontRef>
+        </p:style>
+        <p:txBody>
+          <a:bodyPr rtlCol="0" anchor="ctr"/>
+          <a:lstStyle/>
+          <a:p>
+            <a:pPr algn="ctr"/>
+          </a:p>
+        </p:txBody>
+      </p:sp>
       <p:sp>
         <p:nvSpPr>
           <p:cNvPr id="6" name="TextBox 5"/>
@@ -3516,8 +3536,39 @@
         </p:nvSpPr>
         <p:spPr>
           <a:xfrm>
-            <a:off x="457200" y="5760720"/>
-            <a:ext cx="8229600" cy="548640"/>
+            <a:off x="1097280" y="2103120"/>
+            <a:ext cx="6949440" cy="1097280"/>
+          </a:xfrm>
+          <a:prstGeom prst="rect">
+            <a:avLst/>
+          </a:prstGeom>
+          <a:noFill/>
+        </p:spPr>
+        <p:txBody>
+          <a:bodyPr wrap="square">
+            <a:spAutoFit/>
+          </a:bodyPr>
+          <a:lstStyle/>
+          <a:p>
+            <a:pPr>
+              <a:defRPr sz="2200" i="1"/>
+            </a:pPr>
+            <a:r>
+              <a:t>"La percepción del género y la edad del hablante están entrelazadas. Los oyentes usan información sobre la edad para informar sus juicios de género"</a:t>
+            </a:r>
+          </a:p>
+        </p:txBody>
+      </p:sp>
+      <p:sp>
+        <p:nvSpPr>
+          <p:cNvPr id="7" name="TextBox 6"/>
+          <p:cNvSpPr txBox="1"/>
+          <p:nvPr/>
+        </p:nvSpPr>
+        <p:spPr>
+          <a:xfrm>
+            <a:off x="731520" y="3840480"/>
+            <a:ext cx="7680960" cy="548640"/>
           </a:xfrm>
           <a:prstGeom prst="rect">
             <a:avLst/>
@@ -3531,14 +3582,14 @@
           <a:lstStyle/>
           <a:p>
             <a:pPr>
-              <a:defRPr sz="1800" i="1">
+              <a:defRPr sz="2600" b="1">
                 <a:solidFill>
-                  <a:srgbClr val="7F8C8D"/>
+                  <a:srgbClr val="C0392B"/>
                 </a:solidFill>
               </a:defRPr>
             </a:pPr>
             <a:r>
-              <a:t>Interpretación: las barras de error muestran que los rangos de tono son muy similares entre niños y niñas.</a:t>
+              <a:t>Implicación: el contexto y las expectativas importan.</a:t>
             </a:r>
           </a:p>
         </p:txBody>
@@ -3570,13 +3621,13 @@
         <p:spPr>
           <a:xfrm>
             <a:off x="0" y="0"/>
-            <a:ext cx="9144000" cy="1005840"/>
+            <a:ext cx="9144000" cy="914400"/>
           </a:xfrm>
           <a:prstGeom prst="rect">
             <a:avLst/>
           </a:prstGeom>
           <a:solidFill>
-            <a:srgbClr val="3498DB"/>
+            <a:srgbClr val="C0392B"/>
           </a:solidFill>
           <a:ln>
             <a:noFill/>
@@ -3612,8 +3663,8 @@
         </p:nvSpPr>
         <p:spPr>
           <a:xfrm>
-            <a:off x="274320" y="228600"/>
-            <a:ext cx="8595360" cy="640080"/>
+            <a:off x="182880" y="137160"/>
+            <a:ext cx="8778240" cy="640080"/>
           </a:xfrm>
           <a:prstGeom prst="rect">
             <a:avLst/>
@@ -3627,14 +3678,14 @@
           <a:lstStyle/>
           <a:p>
             <a:pPr algn="ctr">
-              <a:defRPr sz="3600" b="1">
+              <a:defRPr sz="3400" b="1">
                 <a:solidFill>
                   <a:srgbClr val="FFFFFF"/>
                 </a:solidFill>
               </a:defRPr>
             </a:pPr>
             <a:r>
-              <a:t>La paradoja: ¿cómo diferenciamos entonces?</a:t>
+              <a:t>Lo que sabemos de la percepción (II)</a:t>
             </a:r>
           </a:p>
         </p:txBody>
@@ -3647,8 +3698,8 @@
         </p:nvSpPr>
         <p:spPr>
           <a:xfrm>
-            <a:off x="457200" y="1188720"/>
-            <a:ext cx="8229600" cy="457200"/>
+            <a:off x="457200" y="1097280"/>
+            <a:ext cx="8229600" cy="548640"/>
           </a:xfrm>
           <a:prstGeom prst="rect">
             <a:avLst/>
@@ -3662,14 +3713,14 @@
           <a:lstStyle/>
           <a:p>
             <a:pPr>
-              <a:defRPr sz="2600">
+              <a:defRPr sz="2600" b="1">
                 <a:solidFill>
-                  <a:srgbClr val="555555"/>
+                  <a:srgbClr val="34495E"/>
                 </a:solidFill>
               </a:defRPr>
             </a:pPr>
             <a:r>
-              <a:t>Lo que sabemos de la percepción</a:t>
+              <a:t>Funk &amp; Simpson (2023)</a:t>
             </a:r>
           </a:p>
         </p:txBody>
@@ -3682,8 +3733,8 @@
         </p:nvSpPr>
         <p:spPr>
           <a:xfrm>
-            <a:off x="731520" y="1737360"/>
-            <a:ext cx="7772400" cy="365760"/>
+            <a:off x="731520" y="1828800"/>
+            <a:ext cx="7680960" cy="502920"/>
           </a:xfrm>
           <a:prstGeom prst="rect">
             <a:avLst/>
@@ -3691,20 +3742,16 @@
           <a:noFill/>
         </p:spPr>
         <p:txBody>
-          <a:bodyPr wrap="none">
+          <a:bodyPr wrap="square">
             <a:spAutoFit/>
           </a:bodyPr>
           <a:lstStyle/>
           <a:p>
             <a:pPr>
-              <a:defRPr sz="2200" b="1">
-                <a:solidFill>
-                  <a:srgbClr val="2980B9"/>
-                </a:solidFill>
-              </a:defRPr>
+              <a:defRPr sz="2400"/>
             </a:pPr>
             <a:r>
-              <a:t>Barreda &amp; Assmann (2021)</a:t>
+              <a:t>• Pitch como predictor principal (aunque con mucho solapamiento)</a:t>
             </a:r>
           </a:p>
         </p:txBody>
@@ -3717,8 +3764,8 @@
         </p:nvSpPr>
         <p:spPr>
           <a:xfrm>
-            <a:off x="914400" y="2194560"/>
-            <a:ext cx="7315200" cy="822960"/>
+            <a:off x="731520" y="2377440"/>
+            <a:ext cx="7680960" cy="502920"/>
           </a:xfrm>
           <a:prstGeom prst="rect">
             <a:avLst/>
@@ -3726,20 +3773,16 @@
           <a:noFill/>
         </p:spPr>
         <p:txBody>
-          <a:bodyPr wrap="none">
+          <a:bodyPr wrap="square">
             <a:spAutoFit/>
           </a:bodyPr>
           <a:lstStyle/>
           <a:p>
             <a:pPr>
-              <a:defRPr sz="1900" i="1">
-                <a:solidFill>
-                  <a:srgbClr val="3498DB"/>
-                </a:solidFill>
-              </a:defRPr>
+              <a:defRPr sz="2400"/>
             </a:pPr>
             <a:r>
-              <a:t>"La percepción del género y la edad del hablante están entrelazadas. Los oyentes usan información sobre la edad para informar sus juicios de género"</a:t>
+              <a:t>• Espectro de sibilantes (/s/, /z/): los niños tienden a producirlas con energía más baja</a:t>
             </a:r>
           </a:p>
         </p:txBody>
@@ -3752,8 +3795,8 @@
         </p:nvSpPr>
         <p:spPr>
           <a:xfrm>
-            <a:off x="731520" y="3108960"/>
-            <a:ext cx="7772400" cy="457200"/>
+            <a:off x="731520" y="2926080"/>
+            <a:ext cx="7680960" cy="502920"/>
           </a:xfrm>
           <a:prstGeom prst="rect">
             <a:avLst/>
@@ -3761,16 +3804,16 @@
           <a:noFill/>
         </p:spPr>
         <p:txBody>
-          <a:bodyPr wrap="none">
+          <a:bodyPr wrap="square">
             <a:spAutoFit/>
           </a:bodyPr>
           <a:lstStyle/>
           <a:p>
             <a:pPr>
-              <a:defRPr sz="2000" b="1"/>
+              <a:defRPr sz="2400"/>
             </a:pPr>
             <a:r>
-              <a:t>Implicación: el contexto y las expectativas importan.</a:t>
+              <a:t>• Correlación con conformidad de género: los niños que expresan mayor conformidad muestran diferencias más marcadas</a:t>
             </a:r>
           </a:p>
         </p:txBody>
@@ -3802,13 +3845,13 @@
         <p:spPr>
           <a:xfrm>
             <a:off x="0" y="0"/>
-            <a:ext cx="9144000" cy="1005840"/>
+            <a:ext cx="9144000" cy="914400"/>
           </a:xfrm>
           <a:prstGeom prst="rect">
             <a:avLst/>
           </a:prstGeom>
           <a:solidFill>
-            <a:srgbClr val="3498DB"/>
+            <a:srgbClr val="C0392B"/>
           </a:solidFill>
           <a:ln>
             <a:noFill/>
@@ -3844,8 +3887,8 @@
         </p:nvSpPr>
         <p:spPr>
           <a:xfrm>
-            <a:off x="274320" y="228600"/>
-            <a:ext cx="8595360" cy="640080"/>
+            <a:off x="182880" y="137160"/>
+            <a:ext cx="8778240" cy="640080"/>
           </a:xfrm>
           <a:prstGeom prst="rect">
             <a:avLst/>
@@ -3859,14 +3902,14 @@
           <a:lstStyle/>
           <a:p>
             <a:pPr algn="ctr">
-              <a:defRPr sz="3600" b="1">
+              <a:defRPr sz="3400" b="1">
                 <a:solidFill>
                   <a:srgbClr val="FFFFFF"/>
                 </a:solidFill>
               </a:defRPr>
             </a:pPr>
             <a:r>
-              <a:t>Lo que sabemos de la percepción (II)</a:t>
+              <a:t>La respuesta: no es solo la anatomía</a:t>
             </a:r>
           </a:p>
         </p:txBody>
@@ -3879,7 +3922,7 @@
         </p:nvSpPr>
         <p:spPr>
           <a:xfrm>
-            <a:off x="457200" y="1188720"/>
+            <a:off x="457200" y="1097280"/>
             <a:ext cx="8229600" cy="548640"/>
           </a:xfrm>
           <a:prstGeom prst="rect">
@@ -3894,14 +3937,14 @@
           <a:lstStyle/>
           <a:p>
             <a:pPr>
-              <a:defRPr sz="2800">
+              <a:defRPr sz="2600" b="1">
                 <a:solidFill>
-                  <a:srgbClr val="555555"/>
+                  <a:srgbClr val="34495E"/>
                 </a:solidFill>
               </a:defRPr>
             </a:pPr>
             <a:r>
-              <a:t>Funk &amp; Simpson (2023) - Identificaron varios factores clave:</a:t>
+              <a:t>Factor 1: diferencias comportamentales</a:t>
             </a:r>
           </a:p>
         </p:txBody>
@@ -3915,7 +3958,7 @@
         <p:spPr>
           <a:xfrm>
             <a:off x="731520" y="1828800"/>
-            <a:ext cx="7772400" cy="457200"/>
+            <a:ext cx="7680960" cy="502920"/>
           </a:xfrm>
           <a:prstGeom prst="rect">
             <a:avLst/>
@@ -3923,16 +3966,16 @@
           <a:noFill/>
         </p:spPr>
         <p:txBody>
-          <a:bodyPr wrap="none">
+          <a:bodyPr wrap="square">
             <a:spAutoFit/>
           </a:bodyPr>
           <a:lstStyle/>
           <a:p>
             <a:pPr>
-              <a:defRPr sz="2200"/>
+              <a:defRPr sz="2400"/>
             </a:pPr>
             <a:r>
-              <a:t>Pitch como predictor principal (aunque con mucho solapamiento)</a:t>
+              <a:t>• Desde los 2-3 años, los niños internalizan estereotipos de género</a:t>
             </a:r>
           </a:p>
         </p:txBody>
@@ -3945,8 +3988,8 @@
         </p:nvSpPr>
         <p:spPr>
           <a:xfrm>
-            <a:off x="731520" y="2286000"/>
-            <a:ext cx="7772400" cy="457200"/>
+            <a:off x="731520" y="2377440"/>
+            <a:ext cx="7680960" cy="502920"/>
           </a:xfrm>
           <a:prstGeom prst="rect">
             <a:avLst/>
@@ -3954,16 +3997,16 @@
           <a:noFill/>
         </p:spPr>
         <p:txBody>
-          <a:bodyPr wrap="none">
+          <a:bodyPr wrap="square">
             <a:spAutoFit/>
           </a:bodyPr>
           <a:lstStyle/>
           <a:p>
             <a:pPr>
-              <a:defRPr sz="2200"/>
+              <a:defRPr sz="2400"/>
             </a:pPr>
             <a:r>
-              <a:t>Espectro de sibilantes (/s/, /z/): los niños tienden a producirlas con energía más baja</a:t>
+              <a:t>• Pueden modificar voluntariamente su voz para sonar más "masculinos" o "femeninos"</a:t>
             </a:r>
           </a:p>
         </p:txBody>
@@ -3976,8 +4019,8 @@
         </p:nvSpPr>
         <p:spPr>
           <a:xfrm>
-            <a:off x="731520" y="2743200"/>
-            <a:ext cx="7772400" cy="457200"/>
+            <a:off x="731520" y="2926080"/>
+            <a:ext cx="7680960" cy="502920"/>
           </a:xfrm>
           <a:prstGeom prst="rect">
             <a:avLst/>
@@ -3985,16 +4028,16 @@
           <a:noFill/>
         </p:spPr>
         <p:txBody>
-          <a:bodyPr wrap="none">
+          <a:bodyPr wrap="square">
             <a:spAutoFit/>
           </a:bodyPr>
           <a:lstStyle/>
           <a:p>
             <a:pPr>
-              <a:defRPr sz="2200"/>
+              <a:defRPr sz="2400"/>
             </a:pPr>
             <a:r>
-              <a:t>Correlación con conformidad de género: los niños que expresan mayor conformidad con estereotipos de género muestran diferencias más marcadas</a:t>
+              <a:t>• Cartei et al. (2019): niños de 6-10 años pueden controlar la expresión de masculinidad/feminidad</a:t>
             </a:r>
           </a:p>
         </p:txBody>
@@ -4026,13 +4069,13 @@
         <p:spPr>
           <a:xfrm>
             <a:off x="0" y="0"/>
-            <a:ext cx="9144000" cy="1005840"/>
+            <a:ext cx="9144000" cy="914400"/>
           </a:xfrm>
           <a:prstGeom prst="rect">
             <a:avLst/>
           </a:prstGeom>
           <a:solidFill>
-            <a:srgbClr val="3498DB"/>
+            <a:srgbClr val="C0392B"/>
           </a:solidFill>
           <a:ln>
             <a:noFill/>
@@ -4068,8 +4111,8 @@
         </p:nvSpPr>
         <p:spPr>
           <a:xfrm>
-            <a:off x="274320" y="228600"/>
-            <a:ext cx="8595360" cy="640080"/>
+            <a:off x="182880" y="137160"/>
+            <a:ext cx="8778240" cy="640080"/>
           </a:xfrm>
           <a:prstGeom prst="rect">
             <a:avLst/>
@@ -4083,14 +4126,14 @@
           <a:lstStyle/>
           <a:p>
             <a:pPr algn="ctr">
-              <a:defRPr sz="3600" b="1">
+              <a:defRPr sz="3400" b="1">
                 <a:solidFill>
                   <a:srgbClr val="FFFFFF"/>
                 </a:solidFill>
               </a:defRPr>
             </a:pPr>
             <a:r>
-              <a:t>La respuesta: no es solo la anatomía</a:t>
+              <a:t>La respuesta: no es solo la anatomía (II)</a:t>
             </a:r>
           </a:p>
         </p:txBody>
@@ -4103,7 +4146,7 @@
         </p:nvSpPr>
         <p:spPr>
           <a:xfrm>
-            <a:off x="457200" y="1188720"/>
+            <a:off x="457200" y="1097280"/>
             <a:ext cx="8229600" cy="548640"/>
           </a:xfrm>
           <a:prstGeom prst="rect">
@@ -4118,14 +4161,14 @@
           <a:lstStyle/>
           <a:p>
             <a:pPr>
-              <a:defRPr sz="2800">
+              <a:defRPr sz="2600" b="1">
                 <a:solidFill>
-                  <a:srgbClr val="555555"/>
+                  <a:srgbClr val="34495E"/>
                 </a:solidFill>
               </a:defRPr>
             </a:pPr>
             <a:r>
-              <a:t>Factor 1: diferencias comportamentales</a:t>
+              <a:t>Factor 2: información prosódica</a:t>
             </a:r>
           </a:p>
         </p:txBody>
@@ -4139,7 +4182,7 @@
         <p:spPr>
           <a:xfrm>
             <a:off x="731520" y="1828800"/>
-            <a:ext cx="7772400" cy="457200"/>
+            <a:ext cx="7680960" cy="502920"/>
           </a:xfrm>
           <a:prstGeom prst="rect">
             <a:avLst/>
@@ -4147,16 +4190,16 @@
           <a:noFill/>
         </p:spPr>
         <p:txBody>
-          <a:bodyPr wrap="none">
+          <a:bodyPr wrap="square">
             <a:spAutoFit/>
           </a:bodyPr>
           <a:lstStyle/>
           <a:p>
             <a:pPr>
-              <a:defRPr sz="2200"/>
+              <a:defRPr sz="2400"/>
             </a:pPr>
             <a:r>
-              <a:t>Desde los 2-3 años, los niños internalizan estereotipos de género</a:t>
+              <a:t>• Patrones de entonación</a:t>
             </a:r>
           </a:p>
         </p:txBody>
@@ -4169,8 +4212,8 @@
         </p:nvSpPr>
         <p:spPr>
           <a:xfrm>
-            <a:off x="731520" y="2286000"/>
-            <a:ext cx="7772400" cy="457200"/>
+            <a:off x="731520" y="2377440"/>
+            <a:ext cx="7680960" cy="502920"/>
           </a:xfrm>
           <a:prstGeom prst="rect">
             <a:avLst/>
@@ -4178,16 +4221,16 @@
           <a:noFill/>
         </p:spPr>
         <p:txBody>
-          <a:bodyPr wrap="none">
+          <a:bodyPr wrap="square">
             <a:spAutoFit/>
           </a:bodyPr>
           <a:lstStyle/>
           <a:p>
             <a:pPr>
-              <a:defRPr sz="2200"/>
+              <a:defRPr sz="2400"/>
             </a:pPr>
             <a:r>
-              <a:t>Pueden modificar voluntariamente su voz para sonar más "masculinos" o "femeninos"</a:t>
+              <a:t>• Ritmo del habla</a:t>
             </a:r>
           </a:p>
         </p:txBody>
@@ -4200,8 +4243,8 @@
         </p:nvSpPr>
         <p:spPr>
           <a:xfrm>
-            <a:off x="731520" y="2743200"/>
-            <a:ext cx="7772400" cy="457200"/>
+            <a:off x="731520" y="2926080"/>
+            <a:ext cx="7680960" cy="502920"/>
           </a:xfrm>
           <a:prstGeom prst="rect">
             <a:avLst/>
@@ -4209,16 +4252,47 @@
           <a:noFill/>
         </p:spPr>
         <p:txBody>
-          <a:bodyPr wrap="none">
+          <a:bodyPr wrap="square">
             <a:spAutoFit/>
           </a:bodyPr>
           <a:lstStyle/>
           <a:p>
             <a:pPr>
-              <a:defRPr sz="2200"/>
+              <a:defRPr sz="2400"/>
             </a:pPr>
             <a:r>
-              <a:t>Cartei et al. (2019): niños de 6-10 años pueden controlar la expresión de masculinidad/feminidad en su voz</a:t>
+              <a:t>• Variabilidad temporal y espectral</a:t>
+            </a:r>
+          </a:p>
+        </p:txBody>
+      </p:sp>
+      <p:sp>
+        <p:nvSpPr>
+          <p:cNvPr id="8" name="TextBox 7"/>
+          <p:cNvSpPr txBox="1"/>
+          <p:nvPr/>
+        </p:nvSpPr>
+        <p:spPr>
+          <a:xfrm>
+            <a:off x="731520" y="3474720"/>
+            <a:ext cx="7680960" cy="502920"/>
+          </a:xfrm>
+          <a:prstGeom prst="rect">
+            <a:avLst/>
+          </a:prstGeom>
+          <a:noFill/>
+        </p:spPr>
+        <p:txBody>
+          <a:bodyPr wrap="square">
+            <a:spAutoFit/>
+          </a:bodyPr>
+          <a:lstStyle/>
+          <a:p>
+            <a:pPr>
+              <a:defRPr sz="2400"/>
+            </a:pPr>
+            <a:r>
+              <a:t>• Mucho más evidente en frases completas que en sílabas aisladas</a:t>
             </a:r>
           </a:p>
         </p:txBody>
@@ -4250,13 +4324,13 @@
         <p:spPr>
           <a:xfrm>
             <a:off x="0" y="0"/>
-            <a:ext cx="9144000" cy="1005840"/>
+            <a:ext cx="9144000" cy="914400"/>
           </a:xfrm>
           <a:prstGeom prst="rect">
             <a:avLst/>
           </a:prstGeom>
           <a:solidFill>
-            <a:srgbClr val="3498DB"/>
+            <a:srgbClr val="C0392B"/>
           </a:solidFill>
           <a:ln>
             <a:noFill/>
@@ -4292,8 +4366,8 @@
         </p:nvSpPr>
         <p:spPr>
           <a:xfrm>
-            <a:off x="274320" y="228600"/>
-            <a:ext cx="8595360" cy="640080"/>
+            <a:off x="182880" y="137160"/>
+            <a:ext cx="8778240" cy="640080"/>
           </a:xfrm>
           <a:prstGeom prst="rect">
             <a:avLst/>
@@ -4307,14 +4381,14 @@
           <a:lstStyle/>
           <a:p>
             <a:pPr algn="ctr">
-              <a:defRPr sz="3600" b="1">
+              <a:defRPr sz="3400" b="1">
                 <a:solidFill>
                   <a:srgbClr val="FFFFFF"/>
                 </a:solidFill>
               </a:defRPr>
             </a:pPr>
             <a:r>
-              <a:t>La respuesta: no es solo la anatomía (II)</a:t>
+              <a:t>La respuesta: no es solo la anatomía (III)</a:t>
             </a:r>
           </a:p>
         </p:txBody>
@@ -4327,7 +4401,7 @@
         </p:nvSpPr>
         <p:spPr>
           <a:xfrm>
-            <a:off x="457200" y="1188720"/>
+            <a:off x="457200" y="1097280"/>
             <a:ext cx="8229600" cy="548640"/>
           </a:xfrm>
           <a:prstGeom prst="rect">
@@ -4342,14 +4416,14 @@
           <a:lstStyle/>
           <a:p>
             <a:pPr>
-              <a:defRPr sz="2800">
+              <a:defRPr sz="2600" b="1">
                 <a:solidFill>
-                  <a:srgbClr val="555555"/>
+                  <a:srgbClr val="34495E"/>
                 </a:solidFill>
               </a:defRPr>
             </a:pPr>
             <a:r>
-              <a:t>Factor 2: información prosódica</a:t>
+              <a:t>Factor 3: información contextual</a:t>
             </a:r>
           </a:p>
         </p:txBody>
@@ -4363,7 +4437,7 @@
         <p:spPr>
           <a:xfrm>
             <a:off x="731520" y="1828800"/>
-            <a:ext cx="7772400" cy="457200"/>
+            <a:ext cx="7680960" cy="502920"/>
           </a:xfrm>
           <a:prstGeom prst="rect">
             <a:avLst/>
@@ -4371,16 +4445,16 @@
           <a:noFill/>
         </p:spPr>
         <p:txBody>
-          <a:bodyPr wrap="none">
+          <a:bodyPr wrap="square">
             <a:spAutoFit/>
           </a:bodyPr>
           <a:lstStyle/>
           <a:p>
             <a:pPr>
-              <a:defRPr sz="2200"/>
+              <a:defRPr sz="2400"/>
             </a:pPr>
             <a:r>
-              <a:t>Patrones de entonación</a:t>
+              <a:t>• Duración del estímulo (mejor en oraciones que en vocales aisladas)</a:t>
             </a:r>
           </a:p>
         </p:txBody>
@@ -4393,8 +4467,8 @@
         </p:nvSpPr>
         <p:spPr>
           <a:xfrm>
-            <a:off x="731520" y="2286000"/>
-            <a:ext cx="7772400" cy="457200"/>
+            <a:off x="731520" y="2377440"/>
+            <a:ext cx="7680960" cy="502920"/>
           </a:xfrm>
           <a:prstGeom prst="rect">
             <a:avLst/>
@@ -4402,16 +4476,16 @@
           <a:noFill/>
         </p:spPr>
         <p:txBody>
-          <a:bodyPr wrap="none">
+          <a:bodyPr wrap="square">
             <a:spAutoFit/>
           </a:bodyPr>
           <a:lstStyle/>
           <a:p>
             <a:pPr>
-              <a:defRPr sz="2200"/>
+              <a:defRPr sz="2400"/>
             </a:pPr>
             <a:r>
-              <a:t>Ritmo del habla</a:t>
+              <a:t>• Conocimiento de la edad aproximada del hablante</a:t>
             </a:r>
           </a:p>
         </p:txBody>
@@ -4424,8 +4498,8 @@
         </p:nvSpPr>
         <p:spPr>
           <a:xfrm>
-            <a:off x="731520" y="2743200"/>
-            <a:ext cx="7772400" cy="457200"/>
+            <a:off x="731520" y="2926080"/>
+            <a:ext cx="7680960" cy="502920"/>
           </a:xfrm>
           <a:prstGeom prst="rect">
             <a:avLst/>
@@ -4433,47 +4507,16 @@
           <a:noFill/>
         </p:spPr>
         <p:txBody>
-          <a:bodyPr wrap="none">
+          <a:bodyPr wrap="square">
             <a:spAutoFit/>
           </a:bodyPr>
           <a:lstStyle/>
           <a:p>
             <a:pPr>
-              <a:defRPr sz="2200"/>
+              <a:defRPr sz="2400"/>
             </a:pPr>
             <a:r>
-              <a:t>Variabilidad temporal y espectral</a:t>
-            </a:r>
-          </a:p>
-        </p:txBody>
-      </p:sp>
-      <p:sp>
-        <p:nvSpPr>
-          <p:cNvPr id="8" name="TextBox 7"/>
-          <p:cNvSpPr txBox="1"/>
-          <p:nvPr/>
-        </p:nvSpPr>
-        <p:spPr>
-          <a:xfrm>
-            <a:off x="731520" y="3200400"/>
-            <a:ext cx="7772400" cy="457200"/>
-          </a:xfrm>
-          <a:prstGeom prst="rect">
-            <a:avLst/>
-          </a:prstGeom>
-          <a:noFill/>
-        </p:spPr>
-        <p:txBody>
-          <a:bodyPr wrap="none">
-            <a:spAutoFit/>
-          </a:bodyPr>
-          <a:lstStyle/>
-          <a:p>
-            <a:pPr>
-              <a:defRPr sz="2200"/>
-            </a:pPr>
-            <a:r>
-              <a:t>Mucho más evidente en frases completas que en sílabas aisladas</a:t>
+              <a:t>• Expectativas culturales</a:t>
             </a:r>
           </a:p>
         </p:txBody>
@@ -4505,13 +4548,13 @@
         <p:spPr>
           <a:xfrm>
             <a:off x="0" y="0"/>
-            <a:ext cx="9144000" cy="1005840"/>
+            <a:ext cx="9144000" cy="914400"/>
           </a:xfrm>
           <a:prstGeom prst="rect">
             <a:avLst/>
           </a:prstGeom>
           <a:solidFill>
-            <a:srgbClr val="3498DB"/>
+            <a:srgbClr val="C0392B"/>
           </a:solidFill>
           <a:ln>
             <a:noFill/>
@@ -4547,8 +4590,8 @@
         </p:nvSpPr>
         <p:spPr>
           <a:xfrm>
-            <a:off x="274320" y="228600"/>
-            <a:ext cx="8595360" cy="640080"/>
+            <a:off x="182880" y="137160"/>
+            <a:ext cx="8778240" cy="640080"/>
           </a:xfrm>
           <a:prstGeom prst="rect">
             <a:avLst/>
@@ -4562,14 +4605,14 @@
           <a:lstStyle/>
           <a:p>
             <a:pPr algn="ctr">
-              <a:defRPr sz="3600" b="1">
+              <a:defRPr sz="3400" b="1">
                 <a:solidFill>
                   <a:srgbClr val="FFFFFF"/>
                 </a:solidFill>
               </a:defRPr>
             </a:pPr>
             <a:r>
-              <a:t>La respuesta: no es solo la anatomía (III)</a:t>
+              <a:t>Conclusiones</a:t>
             </a:r>
           </a:p>
         </p:txBody>
@@ -4582,7 +4625,7 @@
         </p:nvSpPr>
         <p:spPr>
           <a:xfrm>
-            <a:off x="457200" y="1188720"/>
+            <a:off x="457200" y="1097280"/>
             <a:ext cx="8229600" cy="548640"/>
           </a:xfrm>
           <a:prstGeom prst="rect">
@@ -4597,14 +4640,14 @@
           <a:lstStyle/>
           <a:p>
             <a:pPr>
-              <a:defRPr sz="2800">
+              <a:defRPr sz="2600" b="1">
                 <a:solidFill>
-                  <a:srgbClr val="555555"/>
+                  <a:srgbClr val="34495E"/>
                 </a:solidFill>
               </a:defRPr>
             </a:pPr>
             <a:r>
-              <a:t>Factor 3: información contextual</a:t>
+              <a:t>Las diferencias acústicas prepuberales son sutiles</a:t>
             </a:r>
           </a:p>
         </p:txBody>
@@ -4618,7 +4661,7 @@
         <p:spPr>
           <a:xfrm>
             <a:off x="731520" y="1828800"/>
-            <a:ext cx="7772400" cy="457200"/>
+            <a:ext cx="7680960" cy="502920"/>
           </a:xfrm>
           <a:prstGeom prst="rect">
             <a:avLst/>
@@ -4626,16 +4669,16 @@
           <a:noFill/>
         </p:spPr>
         <p:txBody>
-          <a:bodyPr wrap="none">
+          <a:bodyPr wrap="square">
             <a:spAutoFit/>
           </a:bodyPr>
           <a:lstStyle/>
           <a:p>
             <a:pPr>
-              <a:defRPr sz="2200"/>
+              <a:defRPr sz="2400"/>
             </a:pPr>
             <a:r>
-              <a:t>Duración del estímulo (mejor en oraciones que en vocales aisladas)</a:t>
+              <a:t>• No hay dimorfismo sexual anatómico significativo antes de la pubertad</a:t>
             </a:r>
           </a:p>
         </p:txBody>
@@ -4648,8 +4691,8 @@
         </p:nvSpPr>
         <p:spPr>
           <a:xfrm>
-            <a:off x="731520" y="2286000"/>
-            <a:ext cx="7772400" cy="457200"/>
+            <a:off x="731520" y="2377440"/>
+            <a:ext cx="7680960" cy="502920"/>
           </a:xfrm>
           <a:prstGeom prst="rect">
             <a:avLst/>
@@ -4657,47 +4700,16 @@
           <a:noFill/>
         </p:spPr>
         <p:txBody>
-          <a:bodyPr wrap="none">
+          <a:bodyPr wrap="square">
             <a:spAutoFit/>
           </a:bodyPr>
           <a:lstStyle/>
           <a:p>
             <a:pPr>
-              <a:defRPr sz="2200"/>
+              <a:defRPr sz="2400"/>
             </a:pPr>
             <a:r>
-              <a:t>Conocimiento de la edad aproximada del hablante</a:t>
-            </a:r>
-          </a:p>
-        </p:txBody>
-      </p:sp>
-      <p:sp>
-        <p:nvSpPr>
-          <p:cNvPr id="7" name="TextBox 6"/>
-          <p:cNvSpPr txBox="1"/>
-          <p:nvPr/>
-        </p:nvSpPr>
-        <p:spPr>
-          <a:xfrm>
-            <a:off x="731520" y="2743200"/>
-            <a:ext cx="7772400" cy="457200"/>
-          </a:xfrm>
-          <a:prstGeom prst="rect">
-            <a:avLst/>
-          </a:prstGeom>
-          <a:noFill/>
-        </p:spPr>
-        <p:txBody>
-          <a:bodyPr wrap="none">
-            <a:spAutoFit/>
-          </a:bodyPr>
-          <a:lstStyle/>
-          <a:p>
-            <a:pPr>
-              <a:defRPr sz="2200"/>
-            </a:pPr>
-            <a:r>
-              <a:t>Expectativas culturales</a:t>
+              <a:t>• Los parámetros acústicos básicos (tono, formantes) se solapan completamente</a:t>
             </a:r>
           </a:p>
         </p:txBody>
@@ -4729,13 +4741,13 @@
         <p:spPr>
           <a:xfrm>
             <a:off x="0" y="0"/>
-            <a:ext cx="9144000" cy="1005840"/>
+            <a:ext cx="9144000" cy="914400"/>
           </a:xfrm>
           <a:prstGeom prst="rect">
             <a:avLst/>
           </a:prstGeom>
           <a:solidFill>
-            <a:srgbClr val="3498DB"/>
+            <a:srgbClr val="C0392B"/>
           </a:solidFill>
           <a:ln>
             <a:noFill/>
@@ -4771,8 +4783,8 @@
         </p:nvSpPr>
         <p:spPr>
           <a:xfrm>
-            <a:off x="274320" y="228600"/>
-            <a:ext cx="8595360" cy="640080"/>
+            <a:off x="182880" y="137160"/>
+            <a:ext cx="8778240" cy="640080"/>
           </a:xfrm>
           <a:prstGeom prst="rect">
             <a:avLst/>
@@ -4786,14 +4798,14 @@
           <a:lstStyle/>
           <a:p>
             <a:pPr algn="ctr">
-              <a:defRPr sz="3600" b="1">
+              <a:defRPr sz="3400" b="1">
                 <a:solidFill>
                   <a:srgbClr val="FFFFFF"/>
                 </a:solidFill>
               </a:defRPr>
             </a:pPr>
             <a:r>
-              <a:t>Conclusiones</a:t>
+              <a:t>Conclusiones (II)</a:t>
             </a:r>
           </a:p>
         </p:txBody>
@@ -4806,7 +4818,7 @@
         </p:nvSpPr>
         <p:spPr>
           <a:xfrm>
-            <a:off x="457200" y="1188720"/>
+            <a:off x="457200" y="1097280"/>
             <a:ext cx="8229600" cy="548640"/>
           </a:xfrm>
           <a:prstGeom prst="rect">
@@ -4823,12 +4835,12 @@
             <a:pPr>
               <a:defRPr sz="2600" b="1">
                 <a:solidFill>
-                  <a:srgbClr val="2980B9"/>
+                  <a:srgbClr val="34495E"/>
                 </a:solidFill>
               </a:defRPr>
             </a:pPr>
             <a:r>
-              <a:t>Las diferencias acústicas prepuberales son sutiles</a:t>
+              <a:t>Pero la percepción es robusta</a:t>
             </a:r>
           </a:p>
         </p:txBody>
@@ -4841,8 +4853,8 @@
         </p:nvSpPr>
         <p:spPr>
           <a:xfrm>
-            <a:off x="731520" y="1920240"/>
-            <a:ext cx="7772400" cy="457200"/>
+            <a:off x="731520" y="1828800"/>
+            <a:ext cx="7680960" cy="502920"/>
           </a:xfrm>
           <a:prstGeom prst="rect">
             <a:avLst/>
@@ -4850,16 +4862,16 @@
           <a:noFill/>
         </p:spPr>
         <p:txBody>
-          <a:bodyPr wrap="none">
+          <a:bodyPr wrap="square">
             <a:spAutoFit/>
           </a:bodyPr>
           <a:lstStyle/>
           <a:p>
             <a:pPr>
-              <a:defRPr sz="2000"/>
+              <a:defRPr sz="2400"/>
             </a:pPr>
             <a:r>
-              <a:t>• No hay dimorfismo sexual anatómico significativo antes de la pubertad</a:t>
+              <a:t>• Identificamos correctamente el género en ~70-80% de los casos</a:t>
             </a:r>
           </a:p>
         </p:txBody>
@@ -4872,8 +4884,8 @@
         </p:nvSpPr>
         <p:spPr>
           <a:xfrm>
-            <a:off x="731520" y="2468880"/>
-            <a:ext cx="7772400" cy="457200"/>
+            <a:off x="731520" y="2377440"/>
+            <a:ext cx="7680960" cy="502920"/>
           </a:xfrm>
           <a:prstGeom prst="rect">
             <a:avLst/>
@@ -4881,16 +4893,16 @@
           <a:noFill/>
         </p:spPr>
         <p:txBody>
-          <a:bodyPr wrap="none">
+          <a:bodyPr wrap="square">
             <a:spAutoFit/>
           </a:bodyPr>
           <a:lstStyle/>
           <a:p>
             <a:pPr>
-              <a:defRPr sz="2000"/>
+              <a:defRPr sz="2400"/>
             </a:pPr>
             <a:r>
-              <a:t>• Los parámetros acústicos básicos (tono, formantes) se solapan completamente</a:t>
+              <a:t>• La precisión mejora con más contexto (oraciones vs sílabas aisladas)</a:t>
             </a:r>
           </a:p>
         </p:txBody>
@@ -4922,13 +4934,13 @@
         <p:spPr>
           <a:xfrm>
             <a:off x="0" y="0"/>
-            <a:ext cx="9144000" cy="1005840"/>
+            <a:ext cx="9144000" cy="914400"/>
           </a:xfrm>
           <a:prstGeom prst="rect">
             <a:avLst/>
           </a:prstGeom>
           <a:solidFill>
-            <a:srgbClr val="3498DB"/>
+            <a:srgbClr val="C0392B"/>
           </a:solidFill>
           <a:ln>
             <a:noFill/>
@@ -4964,8 +4976,8 @@
         </p:nvSpPr>
         <p:spPr>
           <a:xfrm>
-            <a:off x="274320" y="228600"/>
-            <a:ext cx="8595360" cy="640080"/>
+            <a:off x="182880" y="137160"/>
+            <a:ext cx="8778240" cy="640080"/>
           </a:xfrm>
           <a:prstGeom prst="rect">
             <a:avLst/>
@@ -4979,14 +4991,14 @@
           <a:lstStyle/>
           <a:p>
             <a:pPr algn="ctr">
-              <a:defRPr sz="3600" b="1">
+              <a:defRPr sz="3400" b="1">
                 <a:solidFill>
                   <a:srgbClr val="FFFFFF"/>
                 </a:solidFill>
               </a:defRPr>
             </a:pPr>
             <a:r>
-              <a:t>Conclusiones (II)</a:t>
+              <a:t>Conclusiones (III)</a:t>
             </a:r>
           </a:p>
         </p:txBody>
@@ -4999,7 +5011,7 @@
         </p:nvSpPr>
         <p:spPr>
           <a:xfrm>
-            <a:off x="457200" y="1188720"/>
+            <a:off x="457200" y="1097280"/>
             <a:ext cx="8229600" cy="548640"/>
           </a:xfrm>
           <a:prstGeom prst="rect">
@@ -5016,12 +5028,12 @@
             <a:pPr>
               <a:defRPr sz="2600" b="1">
                 <a:solidFill>
-                  <a:srgbClr val="2980B9"/>
+                  <a:srgbClr val="34495E"/>
                 </a:solidFill>
               </a:defRPr>
             </a:pPr>
             <a:r>
-              <a:t>Pero la percepción es robusta</a:t>
+              <a:t>La voz como práctica social</a:t>
             </a:r>
           </a:p>
         </p:txBody>
@@ -5034,8 +5046,8 @@
         </p:nvSpPr>
         <p:spPr>
           <a:xfrm>
-            <a:off x="731520" y="1920240"/>
-            <a:ext cx="7772400" cy="457200"/>
+            <a:off x="731520" y="1828800"/>
+            <a:ext cx="7680960" cy="502920"/>
           </a:xfrm>
           <a:prstGeom prst="rect">
             <a:avLst/>
@@ -5043,16 +5055,16 @@
           <a:noFill/>
         </p:spPr>
         <p:txBody>
-          <a:bodyPr wrap="none">
+          <a:bodyPr wrap="square">
             <a:spAutoFit/>
           </a:bodyPr>
           <a:lstStyle/>
           <a:p>
             <a:pPr>
-              <a:defRPr sz="2000"/>
+              <a:defRPr sz="2400"/>
             </a:pPr>
             <a:r>
-              <a:t>• Identificamos correctamente el género en ~70-80% de los casos</a:t>
+              <a:t>• Los niños aprenden y practican patrones de habla asociados a su género</a:t>
             </a:r>
           </a:p>
         </p:txBody>
@@ -5065,8 +5077,8 @@
         </p:nvSpPr>
         <p:spPr>
           <a:xfrm>
-            <a:off x="731520" y="2468880"/>
-            <a:ext cx="7772400" cy="457200"/>
+            <a:off x="731520" y="2377440"/>
+            <a:ext cx="7680960" cy="502920"/>
           </a:xfrm>
           <a:prstGeom prst="rect">
             <a:avLst/>
@@ -5074,16 +5086,47 @@
           <a:noFill/>
         </p:spPr>
         <p:txBody>
-          <a:bodyPr wrap="none">
+          <a:bodyPr wrap="square">
             <a:spAutoFit/>
           </a:bodyPr>
           <a:lstStyle/>
           <a:p>
             <a:pPr>
-              <a:defRPr sz="2000"/>
+              <a:defRPr sz="2400"/>
             </a:pPr>
             <a:r>
-              <a:t>• La precisión mejora con más contexto (oraciones vs sílabas aisladas)</a:t>
+              <a:t>• La voz no solo refleja anatomía, sino identidad de género</a:t>
+            </a:r>
+          </a:p>
+        </p:txBody>
+      </p:sp>
+      <p:sp>
+        <p:nvSpPr>
+          <p:cNvPr id="7" name="TextBox 6"/>
+          <p:cNvSpPr txBox="1"/>
+          <p:nvPr/>
+        </p:nvSpPr>
+        <p:spPr>
+          <a:xfrm>
+            <a:off x="731520" y="2926080"/>
+            <a:ext cx="7680960" cy="502920"/>
+          </a:xfrm>
+          <a:prstGeom prst="rect">
+            <a:avLst/>
+          </a:prstGeom>
+          <a:noFill/>
+        </p:spPr>
+        <p:txBody>
+          <a:bodyPr wrap="square">
+            <a:spAutoFit/>
+          </a:bodyPr>
+          <a:lstStyle/>
+          <a:p>
+            <a:pPr>
+              <a:defRPr sz="2400"/>
+            </a:pPr>
+            <a:r>
+              <a:t>• Implicaciones: desarrollo del lenguaje, identidad de género, terapia de voz</a:t>
             </a:r>
           </a:p>
         </p:txBody>
@@ -5115,13 +5158,13 @@
         <p:spPr>
           <a:xfrm>
             <a:off x="0" y="0"/>
-            <a:ext cx="9144000" cy="1005840"/>
+            <a:ext cx="9144000" cy="914400"/>
           </a:xfrm>
           <a:prstGeom prst="rect">
             <a:avLst/>
           </a:prstGeom>
           <a:solidFill>
-            <a:srgbClr val="3498DB"/>
+            <a:srgbClr val="C0392B"/>
           </a:solidFill>
           <a:ln>
             <a:noFill/>
@@ -5157,8 +5200,8 @@
         </p:nvSpPr>
         <p:spPr>
           <a:xfrm>
-            <a:off x="274320" y="228600"/>
-            <a:ext cx="8595360" cy="640080"/>
+            <a:off x="182880" y="137160"/>
+            <a:ext cx="8778240" cy="640080"/>
           </a:xfrm>
           <a:prstGeom prst="rect">
             <a:avLst/>
@@ -5172,14 +5215,14 @@
           <a:lstStyle/>
           <a:p>
             <a:pPr algn="ctr">
-              <a:defRPr sz="3600" b="1">
+              <a:defRPr sz="3400" b="1">
                 <a:solidFill>
                   <a:srgbClr val="FFFFFF"/>
                 </a:solidFill>
               </a:defRPr>
             </a:pPr>
             <a:r>
-              <a:t>Conclusiones (III)</a:t>
+              <a:t>Reflexión final</a:t>
             </a:r>
           </a:p>
         </p:txBody>
@@ -5192,7 +5235,7 @@
         </p:nvSpPr>
         <p:spPr>
           <a:xfrm>
-            <a:off x="457200" y="1188720"/>
+            <a:off x="457200" y="1280160"/>
             <a:ext cx="8229600" cy="548640"/>
           </a:xfrm>
           <a:prstGeom prst="rect">
@@ -5206,29 +5249,60 @@
           </a:bodyPr>
           <a:lstStyle/>
           <a:p>
-            <a:pPr>
-              <a:defRPr sz="2600" b="1">
+            <a:pPr algn="ctr">
+              <a:defRPr sz="3000" b="1"/>
+            </a:pPr>
+            <a:r>
+              <a:t>La pregunta no es solo "¿cómo diferenciamos?"</a:t>
+            </a:r>
+          </a:p>
+        </p:txBody>
+      </p:sp>
+      <p:sp>
+        <p:nvSpPr>
+          <p:cNvPr id="5" name="TextBox 4"/>
+          <p:cNvSpPr txBox="1"/>
+          <p:nvPr/>
+        </p:nvSpPr>
+        <p:spPr>
+          <a:xfrm>
+            <a:off x="457200" y="2011680"/>
+            <a:ext cx="8229600" cy="731520"/>
+          </a:xfrm>
+          <a:prstGeom prst="rect">
+            <a:avLst/>
+          </a:prstGeom>
+          <a:noFill/>
+        </p:spPr>
+        <p:txBody>
+          <a:bodyPr wrap="square">
+            <a:spAutoFit/>
+          </a:bodyPr>
+          <a:lstStyle/>
+          <a:p>
+            <a:pPr algn="ctr">
+              <a:defRPr sz="2800" b="1">
                 <a:solidFill>
-                  <a:srgbClr val="2980B9"/>
+                  <a:srgbClr val="C0392B"/>
                 </a:solidFill>
               </a:defRPr>
             </a:pPr>
             <a:r>
-              <a:t>La voz como práctica social</a:t>
-            </a:r>
-          </a:p>
-        </p:txBody>
-      </p:sp>
-      <p:sp>
-        <p:nvSpPr>
-          <p:cNvPr id="5" name="TextBox 4"/>
+              <a:t>Es también: ¿Qué nos dice esto sobre cómo se construye el género?</a:t>
+            </a:r>
+          </a:p>
+        </p:txBody>
+      </p:sp>
+      <p:sp>
+        <p:nvSpPr>
+          <p:cNvPr id="6" name="TextBox 5"/>
           <p:cNvSpPr txBox="1"/>
           <p:nvPr/>
         </p:nvSpPr>
         <p:spPr>
           <a:xfrm>
-            <a:off x="731520" y="1920240"/>
-            <a:ext cx="7772400" cy="457200"/>
+            <a:off x="914400" y="3200400"/>
+            <a:ext cx="7315200" cy="548640"/>
           </a:xfrm>
           <a:prstGeom prst="rect">
             <a:avLst/>
@@ -5236,30 +5310,30 @@
           <a:noFill/>
         </p:spPr>
         <p:txBody>
-          <a:bodyPr wrap="none">
+          <a:bodyPr wrap="square">
             <a:spAutoFit/>
           </a:bodyPr>
           <a:lstStyle/>
           <a:p>
             <a:pPr>
-              <a:defRPr sz="2000"/>
+              <a:defRPr sz="2600" b="1"/>
             </a:pPr>
             <a:r>
-              <a:t>• Los niños aprenden y practican patrones de habla asociados a su género</a:t>
-            </a:r>
-          </a:p>
-        </p:txBody>
-      </p:sp>
-      <p:sp>
-        <p:nvSpPr>
-          <p:cNvPr id="6" name="TextBox 5"/>
+              <a:t>• Es performativo: se practica y se expresa</a:t>
+            </a:r>
+          </a:p>
+        </p:txBody>
+      </p:sp>
+      <p:sp>
+        <p:nvSpPr>
+          <p:cNvPr id="7" name="TextBox 6"/>
           <p:cNvSpPr txBox="1"/>
           <p:nvPr/>
         </p:nvSpPr>
         <p:spPr>
           <a:xfrm>
-            <a:off x="731520" y="2468880"/>
-            <a:ext cx="7772400" cy="457200"/>
+            <a:off x="914400" y="3931920"/>
+            <a:ext cx="7315200" cy="548640"/>
           </a:xfrm>
           <a:prstGeom prst="rect">
             <a:avLst/>
@@ -5267,30 +5341,30 @@
           <a:noFill/>
         </p:spPr>
         <p:txBody>
-          <a:bodyPr wrap="none">
+          <a:bodyPr wrap="square">
             <a:spAutoFit/>
           </a:bodyPr>
           <a:lstStyle/>
           <a:p>
             <a:pPr>
-              <a:defRPr sz="2000"/>
+              <a:defRPr sz="2600" b="1"/>
             </a:pPr>
             <a:r>
-              <a:t>• La voz no solo refleja anatomía, sino identidad de género</a:t>
-            </a:r>
-          </a:p>
-        </p:txBody>
-      </p:sp>
-      <p:sp>
-        <p:nvSpPr>
-          <p:cNvPr id="7" name="TextBox 6"/>
+              <a:t>• Es perceptivo: lo interpretamos con expectativas culturales</a:t>
+            </a:r>
+          </a:p>
+        </p:txBody>
+      </p:sp>
+      <p:sp>
+        <p:nvSpPr>
+          <p:cNvPr id="8" name="TextBox 7"/>
           <p:cNvSpPr txBox="1"/>
           <p:nvPr/>
         </p:nvSpPr>
         <p:spPr>
           <a:xfrm>
-            <a:off x="731520" y="3017520"/>
-            <a:ext cx="7772400" cy="457200"/>
+            <a:off x="914400" y="4663440"/>
+            <a:ext cx="7315200" cy="548640"/>
           </a:xfrm>
           <a:prstGeom prst="rect">
             <a:avLst/>
@@ -5298,16 +5372,16 @@
           <a:noFill/>
         </p:spPr>
         <p:txBody>
-          <a:bodyPr wrap="none">
+          <a:bodyPr wrap="square">
             <a:spAutoFit/>
           </a:bodyPr>
           <a:lstStyle/>
           <a:p>
             <a:pPr>
-              <a:defRPr sz="2000"/>
+              <a:defRPr sz="2600" b="1"/>
             </a:pPr>
             <a:r>
-              <a:t>• Implicaciones: desarrollo del lenguaje, identidad de género en la infancia, terapia de voz</a:t>
+              <a:t>• Es dinámico: evoluciona con el desarrollo</a:t>
             </a:r>
           </a:p>
         </p:txBody>
@@ -5339,13 +5413,13 @@
         <p:spPr>
           <a:xfrm>
             <a:off x="0" y="0"/>
-            <a:ext cx="9144000" cy="1005840"/>
+            <a:ext cx="9144000" cy="914400"/>
           </a:xfrm>
           <a:prstGeom prst="rect">
             <a:avLst/>
           </a:prstGeom>
           <a:solidFill>
-            <a:srgbClr val="3498DB"/>
+            <a:srgbClr val="C0392B"/>
           </a:solidFill>
           <a:ln>
             <a:noFill/>
@@ -5381,8 +5455,8 @@
         </p:nvSpPr>
         <p:spPr>
           <a:xfrm>
-            <a:off x="274320" y="228600"/>
-            <a:ext cx="8595360" cy="640080"/>
+            <a:off x="182880" y="137160"/>
+            <a:ext cx="8778240" cy="640080"/>
           </a:xfrm>
           <a:prstGeom prst="rect">
             <a:avLst/>
@@ -5396,7 +5470,7 @@
           <a:lstStyle/>
           <a:p>
             <a:pPr algn="ctr">
-              <a:defRPr sz="3600" b="1">
+              <a:defRPr sz="3400" b="1">
                 <a:solidFill>
                   <a:srgbClr val="FFFFFF"/>
                 </a:solidFill>
@@ -5416,7 +5490,7 @@
         </p:nvSpPr>
         <p:spPr>
           <a:xfrm>
-            <a:off x="457200" y="1188720"/>
+            <a:off x="457200" y="1097280"/>
             <a:ext cx="8229600" cy="548640"/>
           </a:xfrm>
           <a:prstGeom prst="rect">
@@ -5431,7 +5505,7 @@
           <a:lstStyle/>
           <a:p>
             <a:pPr algn="ctr">
-              <a:defRPr sz="2400"/>
+              <a:defRPr sz="2600" b="1"/>
             </a:pPr>
             <a:r>
               <a:t>Escuchad estas voces y responded: ¿es un niño o una niña?</a:t>
@@ -5447,8 +5521,8 @@
         </p:nvSpPr>
         <p:spPr>
           <a:xfrm>
-            <a:off x="1097280" y="1920240"/>
-            <a:ext cx="2743200" cy="1371600"/>
+            <a:off x="1645920" y="1920240"/>
+            <a:ext cx="2743200" cy="2743200"/>
           </a:xfrm>
           <a:prstGeom prst="roundRect">
             <a:avLst/>
@@ -5456,9 +5530,9 @@
           <a:solidFill>
             <a:srgbClr val="ECF0F1"/>
           </a:solidFill>
-          <a:ln w="25400">
+          <a:ln w="38100">
             <a:solidFill>
-              <a:srgbClr val="3498DB"/>
+              <a:srgbClr val="C0392B"/>
             </a:solidFill>
           </a:ln>
         </p:spPr>
@@ -5492,8 +5566,8 @@
         </p:nvSpPr>
         <p:spPr>
           <a:xfrm>
-            <a:off x="1188720" y="2011680"/>
-            <a:ext cx="2377440" cy="365760"/>
+            <a:off x="1828800" y="2194560"/>
+            <a:ext cx="2377440" cy="457200"/>
           </a:xfrm>
           <a:prstGeom prst="rect">
             <a:avLst/>
@@ -5507,7 +5581,7 @@
           <a:lstStyle/>
           <a:p>
             <a:pPr algn="ctr">
-              <a:defRPr sz="2200" b="1"/>
+              <a:defRPr sz="2800" b="1"/>
             </a:pPr>
             <a:r>
               <a:t>Audio 1</a:t>
@@ -5540,8 +5614,8 @@
         </p:blipFill>
         <p:spPr>
           <a:xfrm>
-            <a:off x="1828800" y="2377440"/>
-            <a:ext cx="914400" cy="731520"/>
+            <a:off x="2286000" y="2834640"/>
+            <a:ext cx="1371600" cy="1371600"/>
           </a:xfrm>
           <a:prstGeom prst="rect">
             <a:avLst/>
@@ -5556,8 +5630,8 @@
         </p:nvSpPr>
         <p:spPr>
           <a:xfrm>
-            <a:off x="5669280" y="1920240"/>
-            <a:ext cx="2743200" cy="1371600"/>
+            <a:off x="5303520" y="1920240"/>
+            <a:ext cx="2743200" cy="2743200"/>
           </a:xfrm>
           <a:prstGeom prst="roundRect">
             <a:avLst/>
@@ -5565,9 +5639,9 @@
           <a:solidFill>
             <a:srgbClr val="ECF0F1"/>
           </a:solidFill>
-          <a:ln w="25400">
+          <a:ln w="38100">
             <a:solidFill>
-              <a:srgbClr val="3498DB"/>
+              <a:srgbClr val="C0392B"/>
             </a:solidFill>
           </a:ln>
         </p:spPr>
@@ -5601,8 +5675,8 @@
         </p:nvSpPr>
         <p:spPr>
           <a:xfrm>
-            <a:off x="5760720" y="2011680"/>
-            <a:ext cx="2377440" cy="365760"/>
+            <a:off x="5486400" y="2194560"/>
+            <a:ext cx="2377440" cy="457200"/>
           </a:xfrm>
           <a:prstGeom prst="rect">
             <a:avLst/>
@@ -5616,7 +5690,7 @@
           <a:lstStyle/>
           <a:p>
             <a:pPr algn="ctr">
-              <a:defRPr sz="2200" b="1"/>
+              <a:defRPr sz="2800" b="1"/>
             </a:pPr>
             <a:r>
               <a:t>Audio 2</a:t>
@@ -5649,8 +5723,8 @@
         </p:blipFill>
         <p:spPr>
           <a:xfrm>
-            <a:off x="6400800" y="2377440"/>
-            <a:ext cx="914400" cy="731520"/>
+            <a:off x="5943600" y="2834640"/>
+            <a:ext cx="1371600" cy="1371600"/>
           </a:xfrm>
           <a:prstGeom prst="rect">
             <a:avLst/>
@@ -5718,13 +5792,13 @@
         <p:spPr>
           <a:xfrm>
             <a:off x="0" y="0"/>
-            <a:ext cx="9144000" cy="1005840"/>
+            <a:ext cx="9144000" cy="914400"/>
           </a:xfrm>
           <a:prstGeom prst="rect">
             <a:avLst/>
           </a:prstGeom>
           <a:solidFill>
-            <a:srgbClr val="3498DB"/>
+            <a:srgbClr val="C0392B"/>
           </a:solidFill>
           <a:ln>
             <a:noFill/>
@@ -5760,8 +5834,8 @@
         </p:nvSpPr>
         <p:spPr>
           <a:xfrm>
-            <a:off x="274320" y="228600"/>
-            <a:ext cx="8595360" cy="640080"/>
+            <a:off x="182880" y="137160"/>
+            <a:ext cx="8778240" cy="640080"/>
           </a:xfrm>
           <a:prstGeom prst="rect">
             <a:avLst/>
@@ -5775,14 +5849,14 @@
           <a:lstStyle/>
           <a:p>
             <a:pPr algn="ctr">
-              <a:defRPr sz="3600" b="1">
+              <a:defRPr sz="3400" b="1">
                 <a:solidFill>
                   <a:srgbClr val="FFFFFF"/>
                 </a:solidFill>
               </a:defRPr>
             </a:pPr>
             <a:r>
-              <a:t>Reflexión final</a:t>
+              <a:t>Preguntas para el debate</a:t>
             </a:r>
           </a:p>
         </p:txBody>
@@ -5795,8 +5869,8 @@
         </p:nvSpPr>
         <p:spPr>
           <a:xfrm>
-            <a:off x="457200" y="1188720"/>
-            <a:ext cx="8229600" cy="548640"/>
+            <a:off x="457200" y="1371600"/>
+            <a:ext cx="8229600" cy="731520"/>
           </a:xfrm>
           <a:prstGeom prst="rect">
             <a:avLst/>
@@ -5804,16 +5878,16 @@
           <a:noFill/>
         </p:spPr>
         <p:txBody>
-          <a:bodyPr wrap="none">
+          <a:bodyPr wrap="square">
             <a:spAutoFit/>
           </a:bodyPr>
           <a:lstStyle/>
           <a:p>
-            <a:pPr algn="ctr">
-              <a:defRPr sz="2800" b="1"/>
+            <a:pPr>
+              <a:defRPr sz="2200"/>
             </a:pPr>
             <a:r>
-              <a:t>La pregunta no es solo "¿cómo diferenciamos?"</a:t>
+              <a:t>1. ¿Creéis que los niños son conscientes de que modifican su voz para sonar más "masculinos" o "femeninos"?</a:t>
             </a:r>
           </a:p>
         </p:txBody>
@@ -5826,8 +5900,8 @@
         </p:nvSpPr>
         <p:spPr>
           <a:xfrm>
-            <a:off x="457200" y="1920240"/>
-            <a:ext cx="8229600" cy="548640"/>
+            <a:off x="457200" y="2468880"/>
+            <a:ext cx="8229600" cy="731520"/>
           </a:xfrm>
           <a:prstGeom prst="rect">
             <a:avLst/>
@@ -5835,20 +5909,16 @@
           <a:noFill/>
         </p:spPr>
         <p:txBody>
-          <a:bodyPr wrap="none">
+          <a:bodyPr wrap="square">
             <a:spAutoFit/>
           </a:bodyPr>
           <a:lstStyle/>
           <a:p>
-            <a:pPr algn="ctr">
-              <a:defRPr sz="2600" b="1">
-                <a:solidFill>
-                  <a:srgbClr val="C0392B"/>
-                </a:solidFill>
-              </a:defRPr>
+            <a:pPr>
+              <a:defRPr sz="2200"/>
             </a:pPr>
             <a:r>
-              <a:t>Es también: ¿Qué nos dice esto sobre cómo se construye el género?</a:t>
+              <a:t>2. Si las diferencias anatómicas son mínimas, ¿de dónde aprenden los niños estos patrones vocales?</a:t>
             </a:r>
           </a:p>
         </p:txBody>
@@ -5861,8 +5931,8 @@
         </p:nvSpPr>
         <p:spPr>
           <a:xfrm>
-            <a:off x="914400" y="2834640"/>
-            <a:ext cx="7315200" cy="457200"/>
+            <a:off x="457200" y="3566160"/>
+            <a:ext cx="8229600" cy="731520"/>
           </a:xfrm>
           <a:prstGeom prst="rect">
             <a:avLst/>
@@ -5870,16 +5940,16 @@
           <a:noFill/>
         </p:spPr>
         <p:txBody>
-          <a:bodyPr wrap="none">
+          <a:bodyPr wrap="square">
             <a:spAutoFit/>
           </a:bodyPr>
           <a:lstStyle/>
           <a:p>
             <a:pPr>
-              <a:defRPr sz="2400" b="1"/>
+              <a:defRPr sz="2200"/>
             </a:pPr>
             <a:r>
-              <a:t>• Es performativo: se practica y se expresa</a:t>
+              <a:t>3. ¿Qué implicaciones tiene esto para nuestra comprensión del género como constructo social vs biológico?</a:t>
             </a:r>
           </a:p>
         </p:txBody>
@@ -5892,8 +5962,8 @@
         </p:nvSpPr>
         <p:spPr>
           <a:xfrm>
-            <a:off x="914400" y="3383280"/>
-            <a:ext cx="7315200" cy="457200"/>
+            <a:off x="457200" y="4663440"/>
+            <a:ext cx="8229600" cy="731520"/>
           </a:xfrm>
           <a:prstGeom prst="rect">
             <a:avLst/>
@@ -5901,264 +5971,13 @@
           <a:noFill/>
         </p:spPr>
         <p:txBody>
-          <a:bodyPr wrap="none">
+          <a:bodyPr wrap="square">
             <a:spAutoFit/>
           </a:bodyPr>
           <a:lstStyle/>
           <a:p>
             <a:pPr>
-              <a:defRPr sz="2400" b="1"/>
-            </a:pPr>
-            <a:r>
-              <a:t>• Es perceptivo: lo interpretamos con expectativas culturales</a:t>
-            </a:r>
-          </a:p>
-        </p:txBody>
-      </p:sp>
-      <p:sp>
-        <p:nvSpPr>
-          <p:cNvPr id="8" name="TextBox 7"/>
-          <p:cNvSpPr txBox="1"/>
-          <p:nvPr/>
-        </p:nvSpPr>
-        <p:spPr>
-          <a:xfrm>
-            <a:off x="914400" y="3931920"/>
-            <a:ext cx="7315200" cy="457200"/>
-          </a:xfrm>
-          <a:prstGeom prst="rect">
-            <a:avLst/>
-          </a:prstGeom>
-          <a:noFill/>
-        </p:spPr>
-        <p:txBody>
-          <a:bodyPr wrap="none">
-            <a:spAutoFit/>
-          </a:bodyPr>
-          <a:lstStyle/>
-          <a:p>
-            <a:pPr>
-              <a:defRPr sz="2400" b="1"/>
-            </a:pPr>
-            <a:r>
-              <a:t>• Es dinámico: evoluciona con el desarrollo</a:t>
-            </a:r>
-          </a:p>
-        </p:txBody>
-      </p:sp>
-    </p:spTree>
-  </p:cSld>
-  <p:clrMapOvr>
-    <a:masterClrMapping/>
-  </p:clrMapOvr>
-</p:sld>
-</file>
-
-<file path=ppt/slides/slide21.xml><?xml version="1.0" encoding="utf-8"?>
-<p:sld xmlns:a="http://schemas.openxmlformats.org/drawingml/2006/main" xmlns:p="http://schemas.openxmlformats.org/presentationml/2006/main" xmlns:r="http://schemas.openxmlformats.org/officeDocument/2006/relationships">
-  <p:cSld>
-    <p:spTree>
-      <p:nvGrpSpPr>
-        <p:cNvPr id="1" name=""/>
-        <p:cNvGrpSpPr/>
-        <p:nvPr/>
-      </p:nvGrpSpPr>
-      <p:grpSpPr/>
-      <p:sp>
-        <p:nvSpPr>
-          <p:cNvPr id="2" name="Rectangle 1"/>
-          <p:cNvSpPr/>
-          <p:nvPr/>
-        </p:nvSpPr>
-        <p:spPr>
-          <a:xfrm>
-            <a:off x="0" y="0"/>
-            <a:ext cx="9144000" cy="1005840"/>
-          </a:xfrm>
-          <a:prstGeom prst="rect">
-            <a:avLst/>
-          </a:prstGeom>
-          <a:solidFill>
-            <a:srgbClr val="3498DB"/>
-          </a:solidFill>
-          <a:ln>
-            <a:noFill/>
-          </a:ln>
-        </p:spPr>
-        <p:style>
-          <a:lnRef idx="1">
-            <a:schemeClr val="accent1"/>
-          </a:lnRef>
-          <a:fillRef idx="3">
-            <a:schemeClr val="accent1"/>
-          </a:fillRef>
-          <a:effectRef idx="2">
-            <a:schemeClr val="accent1"/>
-          </a:effectRef>
-          <a:fontRef idx="minor">
-            <a:schemeClr val="lt1"/>
-          </a:fontRef>
-        </p:style>
-        <p:txBody>
-          <a:bodyPr rtlCol="0" anchor="ctr"/>
-          <a:lstStyle/>
-          <a:p>
-            <a:pPr algn="ctr"/>
-          </a:p>
-        </p:txBody>
-      </p:sp>
-      <p:sp>
-        <p:nvSpPr>
-          <p:cNvPr id="3" name="TextBox 2"/>
-          <p:cNvSpPr txBox="1"/>
-          <p:nvPr/>
-        </p:nvSpPr>
-        <p:spPr>
-          <a:xfrm>
-            <a:off x="274320" y="228600"/>
-            <a:ext cx="8595360" cy="640080"/>
-          </a:xfrm>
-          <a:prstGeom prst="rect">
-            <a:avLst/>
-          </a:prstGeom>
-          <a:noFill/>
-        </p:spPr>
-        <p:txBody>
-          <a:bodyPr wrap="none">
-            <a:spAutoFit/>
-          </a:bodyPr>
-          <a:lstStyle/>
-          <a:p>
-            <a:pPr algn="ctr">
-              <a:defRPr sz="3600" b="1">
-                <a:solidFill>
-                  <a:srgbClr val="FFFFFF"/>
-                </a:solidFill>
-              </a:defRPr>
-            </a:pPr>
-            <a:r>
-              <a:t>Preguntas para el debate</a:t>
-            </a:r>
-          </a:p>
-        </p:txBody>
-      </p:sp>
-      <p:sp>
-        <p:nvSpPr>
-          <p:cNvPr id="4" name="TextBox 3"/>
-          <p:cNvSpPr txBox="1"/>
-          <p:nvPr/>
-        </p:nvSpPr>
-        <p:spPr>
-          <a:xfrm>
-            <a:off x="457200" y="1188720"/>
-            <a:ext cx="8229600" cy="640080"/>
-          </a:xfrm>
-          <a:prstGeom prst="rect">
-            <a:avLst/>
-          </a:prstGeom>
-          <a:noFill/>
-        </p:spPr>
-        <p:txBody>
-          <a:bodyPr wrap="none">
-            <a:spAutoFit/>
-          </a:bodyPr>
-          <a:lstStyle/>
-          <a:p>
-            <a:pPr>
-              <a:defRPr sz="2000"/>
-            </a:pPr>
-            <a:r>
-              <a:t>1. ¿Creéis que los niños son conscientes de que modifican su voz para sonar más "masculinos" o "femeninos"?</a:t>
-            </a:r>
-          </a:p>
-        </p:txBody>
-      </p:sp>
-      <p:sp>
-        <p:nvSpPr>
-          <p:cNvPr id="5" name="TextBox 4"/>
-          <p:cNvSpPr txBox="1"/>
-          <p:nvPr/>
-        </p:nvSpPr>
-        <p:spPr>
-          <a:xfrm>
-            <a:off x="457200" y="1920240"/>
-            <a:ext cx="8229600" cy="640080"/>
-          </a:xfrm>
-          <a:prstGeom prst="rect">
-            <a:avLst/>
-          </a:prstGeom>
-          <a:noFill/>
-        </p:spPr>
-        <p:txBody>
-          <a:bodyPr wrap="none">
-            <a:spAutoFit/>
-          </a:bodyPr>
-          <a:lstStyle/>
-          <a:p>
-            <a:pPr>
-              <a:defRPr sz="2000"/>
-            </a:pPr>
-            <a:r>
-              <a:t>2. Si las diferencias anatómicas son mínimas, ¿de dónde aprenden los niños estos patrones vocales?</a:t>
-            </a:r>
-          </a:p>
-        </p:txBody>
-      </p:sp>
-      <p:sp>
-        <p:nvSpPr>
-          <p:cNvPr id="6" name="TextBox 5"/>
-          <p:cNvSpPr txBox="1"/>
-          <p:nvPr/>
-        </p:nvSpPr>
-        <p:spPr>
-          <a:xfrm>
-            <a:off x="457200" y="2651760"/>
-            <a:ext cx="8229600" cy="640080"/>
-          </a:xfrm>
-          <a:prstGeom prst="rect">
-            <a:avLst/>
-          </a:prstGeom>
-          <a:noFill/>
-        </p:spPr>
-        <p:txBody>
-          <a:bodyPr wrap="none">
-            <a:spAutoFit/>
-          </a:bodyPr>
-          <a:lstStyle/>
-          <a:p>
-            <a:pPr>
-              <a:defRPr sz="2000"/>
-            </a:pPr>
-            <a:r>
-              <a:t>3. ¿Qué implicaciones tiene esto para nuestra comprensión del género como constructo social vs biológico?</a:t>
-            </a:r>
-          </a:p>
-        </p:txBody>
-      </p:sp>
-      <p:sp>
-        <p:nvSpPr>
-          <p:cNvPr id="7" name="TextBox 6"/>
-          <p:cNvSpPr txBox="1"/>
-          <p:nvPr/>
-        </p:nvSpPr>
-        <p:spPr>
-          <a:xfrm>
-            <a:off x="457200" y="3383280"/>
-            <a:ext cx="8229600" cy="640080"/>
-          </a:xfrm>
-          <a:prstGeom prst="rect">
-            <a:avLst/>
-          </a:prstGeom>
-          <a:noFill/>
-        </p:spPr>
-        <p:txBody>
-          <a:bodyPr wrap="none">
-            <a:spAutoFit/>
-          </a:bodyPr>
-          <a:lstStyle/>
-          <a:p>
-            <a:pPr>
-              <a:defRPr sz="2000"/>
+              <a:defRPr sz="2200"/>
             </a:pPr>
             <a:r>
               <a:t>4. ¿Debería esto cambiar nuestra aproximación a la terapia de voz para niños transgénero?</a:t>
@@ -6193,13 +6012,13 @@
         <p:spPr>
           <a:xfrm>
             <a:off x="0" y="0"/>
-            <a:ext cx="9144000" cy="1005840"/>
+            <a:ext cx="9144000" cy="914400"/>
           </a:xfrm>
           <a:prstGeom prst="rect">
             <a:avLst/>
           </a:prstGeom>
           <a:solidFill>
-            <a:srgbClr val="3498DB"/>
+            <a:srgbClr val="C0392B"/>
           </a:solidFill>
           <a:ln>
             <a:noFill/>
@@ -6235,8 +6054,8 @@
         </p:nvSpPr>
         <p:spPr>
           <a:xfrm>
-            <a:off x="274320" y="228600"/>
-            <a:ext cx="8595360" cy="640080"/>
+            <a:off x="182880" y="137160"/>
+            <a:ext cx="8778240" cy="640080"/>
           </a:xfrm>
           <a:prstGeom prst="rect">
             <a:avLst/>
@@ -6250,14 +6069,14 @@
           <a:lstStyle/>
           <a:p>
             <a:pPr algn="ctr">
-              <a:defRPr sz="3600" b="1">
+              <a:defRPr sz="3400" b="1">
                 <a:solidFill>
                   <a:srgbClr val="FFFFFF"/>
                 </a:solidFill>
               </a:defRPr>
             </a:pPr>
             <a:r>
-              <a:t>Actividad inicial (III)</a:t>
+              <a:t>Actividad inicial (II)</a:t>
             </a:r>
           </a:p>
         </p:txBody>
@@ -6270,8 +6089,8 @@
         </p:nvSpPr>
         <p:spPr>
           <a:xfrm>
-            <a:off x="1097280" y="1463040"/>
-            <a:ext cx="2743200" cy="1371600"/>
+            <a:off x="1645920" y="1828800"/>
+            <a:ext cx="2743200" cy="3200400"/>
           </a:xfrm>
           <a:prstGeom prst="roundRect">
             <a:avLst/>
@@ -6279,9 +6098,9 @@
           <a:solidFill>
             <a:srgbClr val="ECF0F1"/>
           </a:solidFill>
-          <a:ln w="25400">
+          <a:ln w="38100">
             <a:solidFill>
-              <a:srgbClr val="3498DB"/>
+              <a:srgbClr val="C0392B"/>
             </a:solidFill>
           </a:ln>
         </p:spPr>
@@ -6315,8 +6134,8 @@
         </p:nvSpPr>
         <p:spPr>
           <a:xfrm>
-            <a:off x="1188720" y="1554480"/>
-            <a:ext cx="2377440" cy="365760"/>
+            <a:off x="1828800" y="2103120"/>
+            <a:ext cx="2377440" cy="457200"/>
           </a:xfrm>
           <a:prstGeom prst="rect">
             <a:avLst/>
@@ -6330,7 +6149,7 @@
           <a:lstStyle/>
           <a:p>
             <a:pPr algn="ctr">
-              <a:defRPr sz="2200" b="1"/>
+              <a:defRPr sz="2800" b="1"/>
             </a:pPr>
             <a:r>
               <a:t>Audio 3</a:t>
@@ -6363,8 +6182,8 @@
         </p:blipFill>
         <p:spPr>
           <a:xfrm>
-            <a:off x="1828800" y="1920240"/>
-            <a:ext cx="914400" cy="731520"/>
+            <a:off x="2286000" y="2926080"/>
+            <a:ext cx="1371600" cy="1371600"/>
           </a:xfrm>
           <a:prstGeom prst="rect">
             <a:avLst/>
@@ -6379,8 +6198,8 @@
         </p:nvSpPr>
         <p:spPr>
           <a:xfrm>
-            <a:off x="5669280" y="1463040"/>
-            <a:ext cx="2743200" cy="1371600"/>
+            <a:off x="5303520" y="1828800"/>
+            <a:ext cx="2743200" cy="3200400"/>
           </a:xfrm>
           <a:prstGeom prst="roundRect">
             <a:avLst/>
@@ -6388,9 +6207,9 @@
           <a:solidFill>
             <a:srgbClr val="ECF0F1"/>
           </a:solidFill>
-          <a:ln w="25400">
+          <a:ln w="38100">
             <a:solidFill>
-              <a:srgbClr val="3498DB"/>
+              <a:srgbClr val="C0392B"/>
             </a:solidFill>
           </a:ln>
         </p:spPr>
@@ -6424,8 +6243,8 @@
         </p:nvSpPr>
         <p:spPr>
           <a:xfrm>
-            <a:off x="5760720" y="1554480"/>
-            <a:ext cx="2377440" cy="365760"/>
+            <a:off x="5486400" y="2103120"/>
+            <a:ext cx="2377440" cy="457200"/>
           </a:xfrm>
           <a:prstGeom prst="rect">
             <a:avLst/>
@@ -6439,7 +6258,7 @@
           <a:lstStyle/>
           <a:p>
             <a:pPr algn="ctr">
-              <a:defRPr sz="2200" b="1"/>
+              <a:defRPr sz="2800" b="1"/>
             </a:pPr>
             <a:r>
               <a:t>Audio 4</a:t>
@@ -6472,8 +6291,8 @@
         </p:blipFill>
         <p:spPr>
           <a:xfrm>
-            <a:off x="6400800" y="1920240"/>
-            <a:ext cx="914400" cy="731520"/>
+            <a:off x="5943600" y="2926080"/>
+            <a:ext cx="1371600" cy="1371600"/>
           </a:xfrm>
           <a:prstGeom prst="rect">
             <a:avLst/>
@@ -6541,13 +6360,13 @@
         <p:spPr>
           <a:xfrm>
             <a:off x="0" y="0"/>
-            <a:ext cx="9144000" cy="1005840"/>
+            <a:ext cx="9144000" cy="914400"/>
           </a:xfrm>
           <a:prstGeom prst="rect">
             <a:avLst/>
           </a:prstGeom>
           <a:solidFill>
-            <a:srgbClr val="3498DB"/>
+            <a:srgbClr val="C0392B"/>
           </a:solidFill>
           <a:ln>
             <a:noFill/>
@@ -6583,8 +6402,8 @@
         </p:nvSpPr>
         <p:spPr>
           <a:xfrm>
-            <a:off x="274320" y="228600"/>
-            <a:ext cx="8595360" cy="640080"/>
+            <a:off x="182880" y="137160"/>
+            <a:ext cx="8778240" cy="640080"/>
           </a:xfrm>
           <a:prstGeom prst="rect">
             <a:avLst/>
@@ -6598,14 +6417,14 @@
           <a:lstStyle/>
           <a:p>
             <a:pPr algn="ctr">
-              <a:defRPr sz="3600" b="1">
+              <a:defRPr sz="3400" b="1">
                 <a:solidFill>
                   <a:srgbClr val="FFFFFF"/>
                 </a:solidFill>
               </a:defRPr>
             </a:pPr>
             <a:r>
-              <a:t>Actividad inicial</a:t>
+              <a:t>Actividad inicial (III)</a:t>
             </a:r>
           </a:p>
         </p:txBody>
@@ -6618,8 +6437,8 @@
         </p:nvSpPr>
         <p:spPr>
           <a:xfrm>
-            <a:off x="1097280" y="1463040"/>
-            <a:ext cx="2743200" cy="1371600"/>
+            <a:off x="1645920" y="1371600"/>
+            <a:ext cx="2743200" cy="2743200"/>
           </a:xfrm>
           <a:prstGeom prst="roundRect">
             <a:avLst/>
@@ -6627,9 +6446,9 @@
           <a:solidFill>
             <a:srgbClr val="ECF0F1"/>
           </a:solidFill>
-          <a:ln w="25400">
+          <a:ln w="38100">
             <a:solidFill>
-              <a:srgbClr val="3498DB"/>
+              <a:srgbClr val="C0392B"/>
             </a:solidFill>
           </a:ln>
         </p:spPr>
@@ -6663,8 +6482,8 @@
         </p:nvSpPr>
         <p:spPr>
           <a:xfrm>
-            <a:off x="1188720" y="1554480"/>
-            <a:ext cx="2377440" cy="365760"/>
+            <a:off x="1828800" y="1645920"/>
+            <a:ext cx="2377440" cy="457200"/>
           </a:xfrm>
           <a:prstGeom prst="rect">
             <a:avLst/>
@@ -6678,7 +6497,7 @@
           <a:lstStyle/>
           <a:p>
             <a:pPr algn="ctr">
-              <a:defRPr sz="2200" b="1"/>
+              <a:defRPr sz="2800" b="1"/>
             </a:pPr>
             <a:r>
               <a:t>Audio 5</a:t>
@@ -6711,8 +6530,8 @@
         </p:blipFill>
         <p:spPr>
           <a:xfrm>
-            <a:off x="1828800" y="1920240"/>
-            <a:ext cx="914400" cy="731520"/>
+            <a:off x="2286000" y="2286000"/>
+            <a:ext cx="1371600" cy="1371600"/>
           </a:xfrm>
           <a:prstGeom prst="rect">
             <a:avLst/>
@@ -6727,8 +6546,8 @@
         </p:nvSpPr>
         <p:spPr>
           <a:xfrm>
-            <a:off x="5669280" y="1463040"/>
-            <a:ext cx="2743200" cy="1371600"/>
+            <a:off x="5303520" y="1371600"/>
+            <a:ext cx="2743200" cy="2743200"/>
           </a:xfrm>
           <a:prstGeom prst="roundRect">
             <a:avLst/>
@@ -6736,9 +6555,9 @@
           <a:solidFill>
             <a:srgbClr val="ECF0F1"/>
           </a:solidFill>
-          <a:ln w="25400">
+          <a:ln w="38100">
             <a:solidFill>
-              <a:srgbClr val="3498DB"/>
+              <a:srgbClr val="C0392B"/>
             </a:solidFill>
           </a:ln>
         </p:spPr>
@@ -6772,8 +6591,8 @@
         </p:nvSpPr>
         <p:spPr>
           <a:xfrm>
-            <a:off x="5760720" y="1554480"/>
-            <a:ext cx="2377440" cy="365760"/>
+            <a:off x="5486400" y="1645920"/>
+            <a:ext cx="2377440" cy="457200"/>
           </a:xfrm>
           <a:prstGeom prst="rect">
             <a:avLst/>
@@ -6787,7 +6606,7 @@
           <a:lstStyle/>
           <a:p>
             <a:pPr algn="ctr">
-              <a:defRPr sz="2200" b="1"/>
+              <a:defRPr sz="2800" b="1"/>
             </a:pPr>
             <a:r>
               <a:t>Audio 6</a:t>
@@ -6820,8 +6639,8 @@
         </p:blipFill>
         <p:spPr>
           <a:xfrm>
-            <a:off x="6400800" y="1920240"/>
-            <a:ext cx="914400" cy="731520"/>
+            <a:off x="5943600" y="2286000"/>
+            <a:ext cx="1371600" cy="1371600"/>
           </a:xfrm>
           <a:prstGeom prst="rect">
             <a:avLst/>
@@ -6836,8 +6655,8 @@
         </p:nvSpPr>
         <p:spPr>
           <a:xfrm>
-            <a:off x="457200" y="5943600"/>
-            <a:ext cx="8229600" cy="731520"/>
+            <a:off x="457200" y="5029200"/>
+            <a:ext cx="8229600" cy="1371600"/>
           </a:xfrm>
           <a:prstGeom prst="rect">
             <a:avLst/>
@@ -6845,20 +6664,25 @@
           <a:noFill/>
         </p:spPr>
         <p:txBody>
-          <a:bodyPr wrap="none">
+          <a:bodyPr wrap="square">
             <a:spAutoFit/>
           </a:bodyPr>
           <a:lstStyle/>
           <a:p>
             <a:pPr algn="ctr">
-              <a:defRPr sz="2000" b="1">
+              <a:defRPr sz="2400" b="1">
                 <a:solidFill>
                   <a:srgbClr val="C0392B"/>
                 </a:solidFill>
               </a:defRPr>
             </a:pPr>
             <a:r>
-              <a:t>Pregunta: ¿habéis podido identificar el género de cada voz? ¿Con qué grado de certeza?</a:t>
+              <a:t>Pregunta: ¿habéis podido identificar el género de cada voz?</a:t>
+            </a:r>
+          </a:p>
+          <a:p>
+            <a:r>
+              <a:t>¿Con qué grado de certeza?</a:t>
             </a:r>
           </a:p>
         </p:txBody>
@@ -6917,25 +6741,23 @@
       <p:grpSpPr/>
       <p:sp>
         <p:nvSpPr>
-          <p:cNvPr id="7" name="Rounded Rectangle 6"/>
+          <p:cNvPr id="2" name="Rectangle 1"/>
           <p:cNvSpPr/>
           <p:nvPr/>
         </p:nvSpPr>
         <p:spPr>
           <a:xfrm>
-            <a:off x="914400" y="2651760"/>
-            <a:ext cx="7315200" cy="1280160"/>
-          </a:xfrm>
-          <a:prstGeom prst="roundRect">
+            <a:off x="0" y="0"/>
+            <a:ext cx="9144000" cy="914400"/>
+          </a:xfrm>
+          <a:prstGeom prst="rect">
             <a:avLst/>
           </a:prstGeom>
           <a:solidFill>
-            <a:srgbClr val="ECF0F1"/>
+            <a:srgbClr val="C0392B"/>
           </a:solidFill>
           <a:ln>
-            <a:solidFill>
-              <a:srgbClr val="3498DB"/>
-            </a:solidFill>
+            <a:noFill/>
           </a:ln>
         </p:spPr>
         <p:style>
@@ -6962,23 +6784,126 @@
       </p:sp>
       <p:sp>
         <p:nvSpPr>
-          <p:cNvPr id="2" name="Rectangle 1"/>
+          <p:cNvPr id="3" name="TextBox 2"/>
+          <p:cNvSpPr txBox="1"/>
+          <p:nvPr/>
+        </p:nvSpPr>
+        <p:spPr>
+          <a:xfrm>
+            <a:off x="182880" y="137160"/>
+            <a:ext cx="8778240" cy="640080"/>
+          </a:xfrm>
+          <a:prstGeom prst="rect">
+            <a:avLst/>
+          </a:prstGeom>
+          <a:noFill/>
+        </p:spPr>
+        <p:txBody>
+          <a:bodyPr wrap="none">
+            <a:spAutoFit/>
+          </a:bodyPr>
+          <a:lstStyle/>
+          <a:p>
+            <a:pPr algn="ctr">
+              <a:defRPr sz="3400" b="1">
+                <a:solidFill>
+                  <a:srgbClr val="FFFFFF"/>
+                </a:solidFill>
+              </a:defRPr>
+            </a:pPr>
+            <a:r>
+              <a:t>El enigma científico</a:t>
+            </a:r>
+          </a:p>
+        </p:txBody>
+      </p:sp>
+      <p:sp>
+        <p:nvSpPr>
+          <p:cNvPr id="4" name="TextBox 3"/>
+          <p:cNvSpPr txBox="1"/>
+          <p:nvPr/>
+        </p:nvSpPr>
+        <p:spPr>
+          <a:xfrm>
+            <a:off x="457200" y="1188720"/>
+            <a:ext cx="8229600" cy="457200"/>
+          </a:xfrm>
+          <a:prstGeom prst="rect">
+            <a:avLst/>
+          </a:prstGeom>
+          <a:noFill/>
+        </p:spPr>
+        <p:txBody>
+          <a:bodyPr wrap="none">
+            <a:spAutoFit/>
+          </a:bodyPr>
+          <a:lstStyle/>
+          <a:p>
+            <a:pPr>
+              <a:defRPr sz="2800" b="1">
+                <a:solidFill>
+                  <a:srgbClr val="34495E"/>
+                </a:solidFill>
+              </a:defRPr>
+            </a:pPr>
+            <a:r>
+              <a:t>Lo que dice la investigación</a:t>
+            </a:r>
+          </a:p>
+        </p:txBody>
+      </p:sp>
+      <p:sp>
+        <p:nvSpPr>
+          <p:cNvPr id="5" name="TextBox 4"/>
+          <p:cNvSpPr txBox="1"/>
+          <p:nvPr/>
+        </p:nvSpPr>
+        <p:spPr>
+          <a:xfrm>
+            <a:off x="640080" y="1828800"/>
+            <a:ext cx="7863840" cy="914400"/>
+          </a:xfrm>
+          <a:prstGeom prst="rect">
+            <a:avLst/>
+          </a:prstGeom>
+          <a:noFill/>
+        </p:spPr>
+        <p:txBody>
+          <a:bodyPr wrap="square">
+            <a:spAutoFit/>
+          </a:bodyPr>
+          <a:lstStyle/>
+          <a:p>
+            <a:pPr>
+              <a:defRPr sz="2400"/>
+            </a:pPr>
+            <a:r>
+              <a:t>Según Funk &amp; Simpson (2023), identificamos el género de voces infantiles con una precisión del 70-84%, muy por encima del azar, pero:</a:t>
+            </a:r>
+          </a:p>
+        </p:txBody>
+      </p:sp>
+      <p:sp>
+        <p:nvSpPr>
+          <p:cNvPr id="6" name="Rounded Rectangle 5"/>
           <p:cNvSpPr/>
           <p:nvPr/>
         </p:nvSpPr>
         <p:spPr>
           <a:xfrm>
-            <a:off x="0" y="0"/>
-            <a:ext cx="9144000" cy="1005840"/>
-          </a:xfrm>
-          <a:prstGeom prst="rect">
+            <a:off x="731520" y="2926080"/>
+            <a:ext cx="7680960" cy="1645920"/>
+          </a:xfrm>
+          <a:prstGeom prst="roundRect">
             <a:avLst/>
           </a:prstGeom>
           <a:solidFill>
-            <a:srgbClr val="3498DB"/>
+            <a:srgbClr val="ECF0F1"/>
           </a:solidFill>
-          <a:ln>
-            <a:noFill/>
+          <a:ln w="25400">
+            <a:solidFill>
+              <a:srgbClr val="C0392B"/>
+            </a:solidFill>
           </a:ln>
         </p:spPr>
         <p:style>
@@ -7005,14 +6930,55 @@
       </p:sp>
       <p:sp>
         <p:nvSpPr>
-          <p:cNvPr id="3" name="TextBox 2"/>
+          <p:cNvPr id="7" name="TextBox 6"/>
           <p:cNvSpPr txBox="1"/>
           <p:nvPr/>
         </p:nvSpPr>
         <p:spPr>
           <a:xfrm>
-            <a:off x="274320" y="228600"/>
-            <a:ext cx="8595360" cy="640080"/>
+            <a:off x="1097280" y="3108960"/>
+            <a:ext cx="6949440" cy="1280160"/>
+          </a:xfrm>
+          <a:prstGeom prst="rect">
+            <a:avLst/>
+          </a:prstGeom>
+          <a:noFill/>
+        </p:spPr>
+        <p:txBody>
+          <a:bodyPr wrap="square">
+            <a:spAutoFit/>
+          </a:bodyPr>
+          <a:lstStyle/>
+          <a:p>
+            <a:pPr>
+              <a:defRPr sz="2200" i="1">
+                <a:solidFill>
+                  <a:srgbClr val="34495E"/>
+                </a:solidFill>
+              </a:defRPr>
+            </a:pPr>
+            <a:r>
+              <a:t>"Las diferencias en el aparato fonador entre niños y niñas antes de la pubertad son prácticamente inexistentes"</a:t>
+            </a:r>
+          </a:p>
+          <a:p/>
+          <a:p>
+            <a:r>
+              <a:t>— Fitch &amp; Giedd (1999)</a:t>
+            </a:r>
+          </a:p>
+        </p:txBody>
+      </p:sp>
+      <p:sp>
+        <p:nvSpPr>
+          <p:cNvPr id="8" name="TextBox 7"/>
+          <p:cNvSpPr txBox="1"/>
+          <p:nvPr/>
+        </p:nvSpPr>
+        <p:spPr>
+          <a:xfrm>
+            <a:off x="457200" y="4754880"/>
+            <a:ext cx="8229600" cy="731520"/>
           </a:xfrm>
           <a:prstGeom prst="rect">
             <a:avLst/>
@@ -7026,149 +6992,7 @@
           <a:lstStyle/>
           <a:p>
             <a:pPr algn="ctr">
-              <a:defRPr sz="3600" b="1">
-                <a:solidFill>
-                  <a:srgbClr val="FFFFFF"/>
-                </a:solidFill>
-              </a:defRPr>
-            </a:pPr>
-            <a:r>
-              <a:t>El enigma científico</a:t>
-            </a:r>
-          </a:p>
-        </p:txBody>
-      </p:sp>
-      <p:sp>
-        <p:nvSpPr>
-          <p:cNvPr id="4" name="TextBox 3"/>
-          <p:cNvSpPr txBox="1"/>
-          <p:nvPr/>
-        </p:nvSpPr>
-        <p:spPr>
-          <a:xfrm>
-            <a:off x="457200" y="1188720"/>
-            <a:ext cx="8229600" cy="548640"/>
-          </a:xfrm>
-          <a:prstGeom prst="rect">
-            <a:avLst/>
-          </a:prstGeom>
-          <a:noFill/>
-        </p:spPr>
-        <p:txBody>
-          <a:bodyPr wrap="none">
-            <a:spAutoFit/>
-          </a:bodyPr>
-          <a:lstStyle/>
-          <a:p>
-            <a:pPr>
-              <a:defRPr sz="2600">
-                <a:solidFill>
-                  <a:srgbClr val="555555"/>
-                </a:solidFill>
-              </a:defRPr>
-            </a:pPr>
-            <a:r>
-              <a:t>Lo que dice la investigación</a:t>
-            </a:r>
-          </a:p>
-        </p:txBody>
-      </p:sp>
-      <p:sp>
-        <p:nvSpPr>
-          <p:cNvPr id="5" name="TextBox 4"/>
-          <p:cNvSpPr txBox="1"/>
-          <p:nvPr/>
-        </p:nvSpPr>
-        <p:spPr>
-          <a:xfrm>
-            <a:off x="731520" y="1828800"/>
-            <a:ext cx="7772400" cy="731520"/>
-          </a:xfrm>
-          <a:prstGeom prst="rect">
-            <a:avLst/>
-          </a:prstGeom>
-          <a:noFill/>
-        </p:spPr>
-        <p:txBody>
-          <a:bodyPr wrap="none">
-            <a:spAutoFit/>
-          </a:bodyPr>
-          <a:lstStyle/>
-          <a:p>
-            <a:pPr>
-              <a:defRPr sz="2200"/>
-            </a:pPr>
-            <a:r>
-              <a:t>Según Funk &amp; Simpson (2023), identificamos el género de voces infantiles con una precisión del 70-84%, muy por encima del azar, pero:</a:t>
-            </a:r>
-          </a:p>
-        </p:txBody>
-      </p:sp>
-      <p:sp>
-        <p:nvSpPr>
-          <p:cNvPr id="6" name="TextBox 5"/>
-          <p:cNvSpPr txBox="1"/>
-          <p:nvPr/>
-        </p:nvSpPr>
-        <p:spPr>
-          <a:xfrm>
-            <a:off x="1097280" y="2743200"/>
-            <a:ext cx="6949440" cy="1097280"/>
-          </a:xfrm>
-          <a:prstGeom prst="rect">
-            <a:avLst/>
-          </a:prstGeom>
-          <a:noFill/>
-        </p:spPr>
-        <p:txBody>
-          <a:bodyPr wrap="none">
-            <a:spAutoFit/>
-          </a:bodyPr>
-          <a:lstStyle/>
-          <a:p>
-            <a:pPr>
-              <a:defRPr sz="2000" i="1">
-                <a:solidFill>
-                  <a:srgbClr val="3498DB"/>
-                </a:solidFill>
-              </a:defRPr>
-            </a:pPr>
-            <a:r>
-              <a:t>"Las diferencias en el aparato fonador entre niños y niñas antes de la pubertad son prácticamente inexistentes"</a:t>
-            </a:r>
-          </a:p>
-          <a:p/>
-          <a:p>
-            <a:r>
-              <a:t>— Fitch &amp; Giedd (1999)</a:t>
-            </a:r>
-          </a:p>
-        </p:txBody>
-      </p:sp>
-      <p:sp>
-        <p:nvSpPr>
-          <p:cNvPr id="8" name="TextBox 7"/>
-          <p:cNvSpPr txBox="1"/>
-          <p:nvPr/>
-        </p:nvSpPr>
-        <p:spPr>
-          <a:xfrm>
-            <a:off x="457200" y="4206240"/>
-            <a:ext cx="8229600" cy="548640"/>
-          </a:xfrm>
-          <a:prstGeom prst="rect">
-            <a:avLst/>
-          </a:prstGeom>
-          <a:noFill/>
-        </p:spPr>
-        <p:txBody>
-          <a:bodyPr wrap="none">
-            <a:spAutoFit/>
-          </a:bodyPr>
-          <a:lstStyle/>
-          <a:p>
-            <a:pPr algn="ctr">
-              <a:defRPr sz="2800" b="1">
+              <a:defRPr sz="3200" b="1">
                 <a:solidFill>
                   <a:srgbClr val="C0392B"/>
                 </a:solidFill>
@@ -7207,13 +7031,13 @@
         <p:spPr>
           <a:xfrm>
             <a:off x="0" y="0"/>
-            <a:ext cx="9144000" cy="1005840"/>
+            <a:ext cx="9144000" cy="914400"/>
           </a:xfrm>
           <a:prstGeom prst="rect">
             <a:avLst/>
           </a:prstGeom>
           <a:solidFill>
-            <a:srgbClr val="3498DB"/>
+            <a:srgbClr val="C0392B"/>
           </a:solidFill>
           <a:ln>
             <a:noFill/>
@@ -7249,8 +7073,8 @@
         </p:nvSpPr>
         <p:spPr>
           <a:xfrm>
-            <a:off x="274320" y="228600"/>
-            <a:ext cx="8595360" cy="640080"/>
+            <a:off x="182880" y="137160"/>
+            <a:ext cx="8778240" cy="640080"/>
           </a:xfrm>
           <a:prstGeom prst="rect">
             <a:avLst/>
@@ -7264,7 +7088,7 @@
           <a:lstStyle/>
           <a:p>
             <a:pPr algn="ctr">
-              <a:defRPr sz="3600" b="1">
+              <a:defRPr sz="3400" b="1">
                 <a:solidFill>
                   <a:srgbClr val="FFFFFF"/>
                 </a:solidFill>
@@ -7284,8 +7108,8 @@
         </p:nvSpPr>
         <p:spPr>
           <a:xfrm>
-            <a:off x="457200" y="1188720"/>
-            <a:ext cx="8229600" cy="457200"/>
+            <a:off x="457200" y="1097280"/>
+            <a:ext cx="8229600" cy="365760"/>
           </a:xfrm>
           <a:prstGeom prst="rect">
             <a:avLst/>
@@ -7301,7 +7125,7 @@
             <a:pPr>
               <a:defRPr sz="2400">
                 <a:solidFill>
-                  <a:srgbClr val="555555"/>
+                  <a:srgbClr val="34495E"/>
                 </a:solidFill>
               </a:defRPr>
             </a:pPr>
@@ -7320,8 +7144,8 @@
           <p:nvPr/>
         </p:nvGraphicFramePr>
         <p:xfrm>
-          <a:off x="274320" y="1737360"/>
-          <a:ext cx="8595360" cy="3200400"/>
+          <a:off x="182880" y="1645920"/>
+          <a:ext cx="8778240" cy="4114800"/>
         </p:xfrm>
         <a:graphic>
           <a:graphicData uri="http://schemas.openxmlformats.org/drawingml/2006/table">
@@ -7330,22 +7154,22 @@
                 <a:tableStyleId>{5C22544A-7EE6-4342-B048-85BDC9FD1C3A}</a:tableStyleId>
               </a:tblPr>
               <a:tblGrid>
-                <a:gridCol w="1227908"/>
-                <a:gridCol w="1227908"/>
-                <a:gridCol w="1227908"/>
-                <a:gridCol w="1227908"/>
-                <a:gridCol w="1227908"/>
-                <a:gridCol w="1227908"/>
-                <a:gridCol w="1227912"/>
+                <a:gridCol w="1254034"/>
+                <a:gridCol w="1254034"/>
+                <a:gridCol w="1254034"/>
+                <a:gridCol w="1254034"/>
+                <a:gridCol w="1254034"/>
+                <a:gridCol w="1254034"/>
+                <a:gridCol w="1254036"/>
               </a:tblGrid>
-              <a:tr h="457200">
+              <a:tr h="587828">
                 <a:tc>
                   <a:txBody>
                     <a:bodyPr/>
                     <a:lstStyle/>
                     <a:p>
                       <a:pPr algn="ctr">
-                        <a:defRPr sz="1600" b="1">
+                        <a:defRPr sz="1800" b="1">
                           <a:solidFill>
                             <a:srgbClr val="FFFFFF"/>
                           </a:solidFill>
@@ -7358,7 +7182,7 @@
                   </a:txBody>
                   <a:tcPr>
                     <a:solidFill>
-                      <a:srgbClr val="3498DB"/>
+                      <a:srgbClr val="C0392B"/>
                     </a:solidFill>
                   </a:tcPr>
                 </a:tc>
@@ -7368,7 +7192,7 @@
                     <a:lstStyle/>
                     <a:p>
                       <a:pPr algn="ctr">
-                        <a:defRPr sz="1600" b="1">
+                        <a:defRPr sz="1800" b="1">
                           <a:solidFill>
                             <a:srgbClr val="FFFFFF"/>
                           </a:solidFill>
@@ -7381,7 +7205,7 @@
                   </a:txBody>
                   <a:tcPr>
                     <a:solidFill>
-                      <a:srgbClr val="3498DB"/>
+                      <a:srgbClr val="C0392B"/>
                     </a:solidFill>
                   </a:tcPr>
                 </a:tc>
@@ -7391,7 +7215,7 @@
                     <a:lstStyle/>
                     <a:p>
                       <a:pPr algn="ctr">
-                        <a:defRPr sz="1600" b="1">
+                        <a:defRPr sz="1800" b="1">
                           <a:solidFill>
                             <a:srgbClr val="FFFFFF"/>
                           </a:solidFill>
@@ -7404,7 +7228,7 @@
                   </a:txBody>
                   <a:tcPr>
                     <a:solidFill>
-                      <a:srgbClr val="3498DB"/>
+                      <a:srgbClr val="C0392B"/>
                     </a:solidFill>
                   </a:tcPr>
                 </a:tc>
@@ -7414,7 +7238,7 @@
                     <a:lstStyle/>
                     <a:p>
                       <a:pPr algn="ctr">
-                        <a:defRPr sz="1600" b="1">
+                        <a:defRPr sz="1800" b="1">
                           <a:solidFill>
                             <a:srgbClr val="FFFFFF"/>
                           </a:solidFill>
@@ -7427,7 +7251,7 @@
                   </a:txBody>
                   <a:tcPr>
                     <a:solidFill>
-                      <a:srgbClr val="3498DB"/>
+                      <a:srgbClr val="C0392B"/>
                     </a:solidFill>
                   </a:tcPr>
                 </a:tc>
@@ -7437,7 +7261,7 @@
                     <a:lstStyle/>
                     <a:p>
                       <a:pPr algn="ctr">
-                        <a:defRPr sz="1600" b="1">
+                        <a:defRPr sz="1800" b="1">
                           <a:solidFill>
                             <a:srgbClr val="FFFFFF"/>
                           </a:solidFill>
@@ -7450,7 +7274,7 @@
                   </a:txBody>
                   <a:tcPr>
                     <a:solidFill>
-                      <a:srgbClr val="3498DB"/>
+                      <a:srgbClr val="C0392B"/>
                     </a:solidFill>
                   </a:tcPr>
                 </a:tc>
@@ -7460,7 +7284,7 @@
                     <a:lstStyle/>
                     <a:p>
                       <a:pPr algn="ctr">
-                        <a:defRPr sz="1600" b="1">
+                        <a:defRPr sz="1800" b="1">
                           <a:solidFill>
                             <a:srgbClr val="FFFFFF"/>
                           </a:solidFill>
@@ -7473,7 +7297,7 @@
                   </a:txBody>
                   <a:tcPr>
                     <a:solidFill>
-                      <a:srgbClr val="3498DB"/>
+                      <a:srgbClr val="C0392B"/>
                     </a:solidFill>
                   </a:tcPr>
                 </a:tc>
@@ -7483,7 +7307,7 @@
                     <a:lstStyle/>
                     <a:p>
                       <a:pPr algn="ctr">
-                        <a:defRPr sz="1600" b="1">
+                        <a:defRPr sz="1800" b="1">
                           <a:solidFill>
                             <a:srgbClr val="FFFFFF"/>
                           </a:solidFill>
@@ -7496,19 +7320,19 @@
                   </a:txBody>
                   <a:tcPr>
                     <a:solidFill>
-                      <a:srgbClr val="3498DB"/>
+                      <a:srgbClr val="C0392B"/>
                     </a:solidFill>
                   </a:tcPr>
                 </a:tc>
               </a:tr>
-              <a:tr h="457200">
+              <a:tr h="587828">
                 <a:tc>
                   <a:txBody>
                     <a:bodyPr/>
                     <a:lstStyle/>
                     <a:p>
                       <a:pPr algn="ctr">
-                        <a:defRPr sz="1500"/>
+                        <a:defRPr sz="1600"/>
                       </a:pPr>
                       <a:r>
                         <a:t>Niña 1</a:t>
@@ -7517,7 +7341,7 @@
                   </a:txBody>
                   <a:tcPr>
                     <a:solidFill>
-                      <a:srgbClr val="F5F5F5"/>
+                      <a:srgbClr val="FAFAFA"/>
                     </a:solidFill>
                   </a:tcPr>
                 </a:tc>
@@ -7527,7 +7351,7 @@
                     <a:lstStyle/>
                     <a:p>
                       <a:pPr algn="ctr">
-                        <a:defRPr sz="1500"/>
+                        <a:defRPr sz="1600"/>
                       </a:pPr>
                       <a:r>
                         <a:t>4</a:t>
@@ -7536,7 +7360,7 @@
                   </a:txBody>
                   <a:tcPr>
                     <a:solidFill>
-                      <a:srgbClr val="F5F5F5"/>
+                      <a:srgbClr val="FAFAFA"/>
                     </a:solidFill>
                   </a:tcPr>
                 </a:tc>
@@ -7546,7 +7370,7 @@
                     <a:lstStyle/>
                     <a:p>
                       <a:pPr algn="ctr">
-                        <a:defRPr sz="1500"/>
+                        <a:defRPr sz="1600"/>
                       </a:pPr>
                       <a:r>
                         <a:t>28</a:t>
@@ -7555,7 +7379,7 @@
                   </a:txBody>
                   <a:tcPr>
                     <a:solidFill>
-                      <a:srgbClr val="F5F5F5"/>
+                      <a:srgbClr val="FAFAFA"/>
                     </a:solidFill>
                   </a:tcPr>
                 </a:tc>
@@ -7565,7 +7389,7 @@
                     <a:lstStyle/>
                     <a:p>
                       <a:pPr algn="ctr">
-                        <a:defRPr sz="1500"/>
+                        <a:defRPr sz="1600"/>
                       </a:pPr>
                       <a:r>
                         <a:t>300±38</a:t>
@@ -7574,7 +7398,7 @@
                   </a:txBody>
                   <a:tcPr>
                     <a:solidFill>
-                      <a:srgbClr val="F5F5F5"/>
+                      <a:srgbClr val="FAFAFA"/>
                     </a:solidFill>
                   </a:tcPr>
                 </a:tc>
@@ -7584,7 +7408,7 @@
                     <a:lstStyle/>
                     <a:p>
                       <a:pPr algn="ctr">
-                        <a:defRPr sz="1500"/>
+                        <a:defRPr sz="1600"/>
                       </a:pPr>
                       <a:r>
                         <a:t>678±206</a:t>
@@ -7593,7 +7417,7 @@
                   </a:txBody>
                   <a:tcPr>
                     <a:solidFill>
-                      <a:srgbClr val="F5F5F5"/>
+                      <a:srgbClr val="FAFAFA"/>
                     </a:solidFill>
                   </a:tcPr>
                 </a:tc>
@@ -7603,7 +7427,7 @@
                     <a:lstStyle/>
                     <a:p>
                       <a:pPr algn="ctr">
-                        <a:defRPr sz="1500"/>
+                        <a:defRPr sz="1600"/>
                       </a:pPr>
                       <a:r>
                         <a:t>1603±682</a:t>
@@ -7612,7 +7436,7 @@
                   </a:txBody>
                   <a:tcPr>
                     <a:solidFill>
-                      <a:srgbClr val="F5F5F5"/>
+                      <a:srgbClr val="FAFAFA"/>
                     </a:solidFill>
                   </a:tcPr>
                 </a:tc>
@@ -7622,7 +7446,7 @@
                     <a:lstStyle/>
                     <a:p>
                       <a:pPr algn="ctr">
-                        <a:defRPr sz="1500"/>
+                        <a:defRPr sz="1600"/>
                       </a:pPr>
                       <a:r>
                         <a:t>2918±494</a:t>
@@ -7631,19 +7455,19 @@
                   </a:txBody>
                   <a:tcPr>
                     <a:solidFill>
-                      <a:srgbClr val="F5F5F5"/>
+                      <a:srgbClr val="FAFAFA"/>
                     </a:solidFill>
                   </a:tcPr>
                 </a:tc>
               </a:tr>
-              <a:tr h="457200">
+              <a:tr h="587828">
                 <a:tc>
                   <a:txBody>
                     <a:bodyPr/>
                     <a:lstStyle/>
                     <a:p>
                       <a:pPr algn="ctr">
-                        <a:defRPr sz="1500"/>
+                        <a:defRPr sz="1600"/>
                       </a:pPr>
                       <a:r>
                         <a:t>Niña 2</a:t>
@@ -7658,7 +7482,7 @@
                     <a:lstStyle/>
                     <a:p>
                       <a:pPr algn="ctr">
-                        <a:defRPr sz="1500"/>
+                        <a:defRPr sz="1600"/>
                       </a:pPr>
                       <a:r>
                         <a:t>1</a:t>
@@ -7673,7 +7497,7 @@
                     <a:lstStyle/>
                     <a:p>
                       <a:pPr algn="ctr">
-                        <a:defRPr sz="1500"/>
+                        <a:defRPr sz="1600"/>
                       </a:pPr>
                       <a:r>
                         <a:t>16</a:t>
@@ -7688,7 +7512,7 @@
                     <a:lstStyle/>
                     <a:p>
                       <a:pPr algn="ctr">
-                        <a:defRPr sz="1500"/>
+                        <a:defRPr sz="1600"/>
                       </a:pPr>
                       <a:r>
                         <a:t>259±39</a:t>
@@ -7703,7 +7527,7 @@
                     <a:lstStyle/>
                     <a:p>
                       <a:pPr algn="ctr">
-                        <a:defRPr sz="1500"/>
+                        <a:defRPr sz="1600"/>
                       </a:pPr>
                       <a:r>
                         <a:t>702±186</a:t>
@@ -7718,7 +7542,7 @@
                     <a:lstStyle/>
                     <a:p>
                       <a:pPr algn="ctr">
-                        <a:defRPr sz="1500"/>
+                        <a:defRPr sz="1600"/>
                       </a:pPr>
                       <a:r>
                         <a:t>1376±339</a:t>
@@ -7733,7 +7557,7 @@
                     <a:lstStyle/>
                     <a:p>
                       <a:pPr algn="ctr">
-                        <a:defRPr sz="1500"/>
+                        <a:defRPr sz="1600"/>
                       </a:pPr>
                       <a:r>
                         <a:t>2568±583</a:t>
@@ -7743,14 +7567,14 @@
                   <a:tcPr/>
                 </a:tc>
               </a:tr>
-              <a:tr h="457200">
+              <a:tr h="587828">
                 <a:tc>
                   <a:txBody>
                     <a:bodyPr/>
                     <a:lstStyle/>
                     <a:p>
                       <a:pPr algn="ctr">
-                        <a:defRPr sz="1500"/>
+                        <a:defRPr sz="1600"/>
                       </a:pPr>
                       <a:r>
                         <a:t>Niña 3</a:t>
@@ -7759,7 +7583,7 @@
                   </a:txBody>
                   <a:tcPr>
                     <a:solidFill>
-                      <a:srgbClr val="F5F5F5"/>
+                      <a:srgbClr val="FAFAFA"/>
                     </a:solidFill>
                   </a:tcPr>
                 </a:tc>
@@ -7769,7 +7593,7 @@
                     <a:lstStyle/>
                     <a:p>
                       <a:pPr algn="ctr">
-                        <a:defRPr sz="1500"/>
+                        <a:defRPr sz="1600"/>
                       </a:pPr>
                       <a:r>
                         <a:t>3</a:t>
@@ -7778,7 +7602,7 @@
                   </a:txBody>
                   <a:tcPr>
                     <a:solidFill>
-                      <a:srgbClr val="F5F5F5"/>
+                      <a:srgbClr val="FAFAFA"/>
                     </a:solidFill>
                   </a:tcPr>
                 </a:tc>
@@ -7788,7 +7612,7 @@
                     <a:lstStyle/>
                     <a:p>
                       <a:pPr algn="ctr">
-                        <a:defRPr sz="1500"/>
+                        <a:defRPr sz="1600"/>
                       </a:pPr>
                       <a:r>
                         <a:t>13</a:t>
@@ -7797,7 +7621,7 @@
                   </a:txBody>
                   <a:tcPr>
                     <a:solidFill>
-                      <a:srgbClr val="F5F5F5"/>
+                      <a:srgbClr val="FAFAFA"/>
                     </a:solidFill>
                   </a:tcPr>
                 </a:tc>
@@ -7807,7 +7631,7 @@
                     <a:lstStyle/>
                     <a:p>
                       <a:pPr algn="ctr">
-                        <a:defRPr sz="1500"/>
+                        <a:defRPr sz="1600"/>
                       </a:pPr>
                       <a:r>
                         <a:t>238±23</a:t>
@@ -7816,7 +7640,7 @@
                   </a:txBody>
                   <a:tcPr>
                     <a:solidFill>
-                      <a:srgbClr val="F5F5F5"/>
+                      <a:srgbClr val="FAFAFA"/>
                     </a:solidFill>
                   </a:tcPr>
                 </a:tc>
@@ -7826,7 +7650,7 @@
                     <a:lstStyle/>
                     <a:p>
                       <a:pPr algn="ctr">
-                        <a:defRPr sz="1500"/>
+                        <a:defRPr sz="1600"/>
                       </a:pPr>
                       <a:r>
                         <a:t>687±130</a:t>
@@ -7835,7 +7659,7 @@
                   </a:txBody>
                   <a:tcPr>
                     <a:solidFill>
-                      <a:srgbClr val="F5F5F5"/>
+                      <a:srgbClr val="FAFAFA"/>
                     </a:solidFill>
                   </a:tcPr>
                 </a:tc>
@@ -7845,7 +7669,7 @@
                     <a:lstStyle/>
                     <a:p>
                       <a:pPr algn="ctr">
-                        <a:defRPr sz="1500"/>
+                        <a:defRPr sz="1600"/>
                       </a:pPr>
                       <a:r>
                         <a:t>1220±356</a:t>
@@ -7854,7 +7678,7 @@
                   </a:txBody>
                   <a:tcPr>
                     <a:solidFill>
-                      <a:srgbClr val="F5F5F5"/>
+                      <a:srgbClr val="FAFAFA"/>
                     </a:solidFill>
                   </a:tcPr>
                 </a:tc>
@@ -7864,7 +7688,7 @@
                     <a:lstStyle/>
                     <a:p>
                       <a:pPr algn="ctr">
-                        <a:defRPr sz="1500"/>
+                        <a:defRPr sz="1600"/>
                       </a:pPr>
                       <a:r>
                         <a:t>2844±633</a:t>
@@ -7873,19 +7697,19 @@
                   </a:txBody>
                   <a:tcPr>
                     <a:solidFill>
-                      <a:srgbClr val="F5F5F5"/>
+                      <a:srgbClr val="FAFAFA"/>
                     </a:solidFill>
                   </a:tcPr>
                 </a:tc>
               </a:tr>
-              <a:tr h="457200">
+              <a:tr h="587828">
                 <a:tc>
                   <a:txBody>
                     <a:bodyPr/>
                     <a:lstStyle/>
                     <a:p>
                       <a:pPr algn="ctr">
-                        <a:defRPr sz="1500"/>
+                        <a:defRPr sz="1600"/>
                       </a:pPr>
                       <a:r>
                         <a:t>Niño 1</a:t>
@@ -7900,7 +7724,7 @@
                     <a:lstStyle/>
                     <a:p>
                       <a:pPr algn="ctr">
-                        <a:defRPr sz="1500"/>
+                        <a:defRPr sz="1600"/>
                       </a:pPr>
                       <a:r>
                         <a:t>7</a:t>
@@ -7915,7 +7739,7 @@
                     <a:lstStyle/>
                     <a:p>
                       <a:pPr algn="ctr">
-                        <a:defRPr sz="1500"/>
+                        <a:defRPr sz="1600"/>
                       </a:pPr>
                       <a:r>
                         <a:t>23</a:t>
@@ -7930,7 +7754,7 @@
                     <a:lstStyle/>
                     <a:p>
                       <a:pPr algn="ctr">
-                        <a:defRPr sz="1500"/>
+                        <a:defRPr sz="1600"/>
                       </a:pPr>
                       <a:r>
                         <a:t>280±34</a:t>
@@ -7945,7 +7769,7 @@
                     <a:lstStyle/>
                     <a:p>
                       <a:pPr algn="ctr">
-                        <a:defRPr sz="1500"/>
+                        <a:defRPr sz="1600"/>
                       </a:pPr>
                       <a:r>
                         <a:t>660±132</a:t>
@@ -7960,7 +7784,7 @@
                     <a:lstStyle/>
                     <a:p>
                       <a:pPr algn="ctr">
-                        <a:defRPr sz="1500"/>
+                        <a:defRPr sz="1600"/>
                       </a:pPr>
                       <a:r>
                         <a:t>1741±494</a:t>
@@ -7975,7 +7799,7 @@
                     <a:lstStyle/>
                     <a:p>
                       <a:pPr algn="ctr">
-                        <a:defRPr sz="1500"/>
+                        <a:defRPr sz="1600"/>
                       </a:pPr>
                       <a:r>
                         <a:t>2697±406</a:t>
@@ -7985,14 +7809,14 @@
                   <a:tcPr/>
                 </a:tc>
               </a:tr>
-              <a:tr h="457200">
+              <a:tr h="587828">
                 <a:tc>
                   <a:txBody>
                     <a:bodyPr/>
                     <a:lstStyle/>
                     <a:p>
                       <a:pPr algn="ctr">
-                        <a:defRPr sz="1500"/>
+                        <a:defRPr sz="1600"/>
                       </a:pPr>
                       <a:r>
                         <a:t>Niño 2</a:t>
@@ -8001,7 +7825,7 @@
                   </a:txBody>
                   <a:tcPr>
                     <a:solidFill>
-                      <a:srgbClr val="F5F5F5"/>
+                      <a:srgbClr val="FAFAFA"/>
                     </a:solidFill>
                   </a:tcPr>
                 </a:tc>
@@ -8011,7 +7835,7 @@
                     <a:lstStyle/>
                     <a:p>
                       <a:pPr algn="ctr">
-                        <a:defRPr sz="1500"/>
+                        <a:defRPr sz="1600"/>
                       </a:pPr>
                       <a:r>
                         <a:t>2</a:t>
@@ -8020,7 +7844,7 @@
                   </a:txBody>
                   <a:tcPr>
                     <a:solidFill>
-                      <a:srgbClr val="F5F5F5"/>
+                      <a:srgbClr val="FAFAFA"/>
                     </a:solidFill>
                   </a:tcPr>
                 </a:tc>
@@ -8030,7 +7854,7 @@
                     <a:lstStyle/>
                     <a:p>
                       <a:pPr algn="ctr">
-                        <a:defRPr sz="1500"/>
+                        <a:defRPr sz="1600"/>
                       </a:pPr>
                       <a:r>
                         <a:t>9</a:t>
@@ -8039,7 +7863,7 @@
                   </a:txBody>
                   <a:tcPr>
                     <a:solidFill>
-                      <a:srgbClr val="F5F5F5"/>
+                      <a:srgbClr val="FAFAFA"/>
                     </a:solidFill>
                   </a:tcPr>
                 </a:tc>
@@ -8049,7 +7873,7 @@
                     <a:lstStyle/>
                     <a:p>
                       <a:pPr algn="ctr">
-                        <a:defRPr sz="1500"/>
+                        <a:defRPr sz="1600"/>
                       </a:pPr>
                       <a:r>
                         <a:t>268±39</a:t>
@@ -8058,7 +7882,7 @@
                   </a:txBody>
                   <a:tcPr>
                     <a:solidFill>
-                      <a:srgbClr val="F5F5F5"/>
+                      <a:srgbClr val="FAFAFA"/>
                     </a:solidFill>
                   </a:tcPr>
                 </a:tc>
@@ -8068,7 +7892,7 @@
                     <a:lstStyle/>
                     <a:p>
                       <a:pPr algn="ctr">
-                        <a:defRPr sz="1500"/>
+                        <a:defRPr sz="1600"/>
                       </a:pPr>
                       <a:r>
                         <a:t>666±57</a:t>
@@ -8077,7 +7901,7 @@
                   </a:txBody>
                   <a:tcPr>
                     <a:solidFill>
-                      <a:srgbClr val="F5F5F5"/>
+                      <a:srgbClr val="FAFAFA"/>
                     </a:solidFill>
                   </a:tcPr>
                 </a:tc>
@@ -8087,7 +7911,7 @@
                     <a:lstStyle/>
                     <a:p>
                       <a:pPr algn="ctr">
-                        <a:defRPr sz="1500"/>
+                        <a:defRPr sz="1600"/>
                       </a:pPr>
                       <a:r>
                         <a:t>1750±292</a:t>
@@ -8096,7 +7920,7 @@
                   </a:txBody>
                   <a:tcPr>
                     <a:solidFill>
-                      <a:srgbClr val="F5F5F5"/>
+                      <a:srgbClr val="FAFAFA"/>
                     </a:solidFill>
                   </a:tcPr>
                 </a:tc>
@@ -8106,7 +7930,7 @@
                     <a:lstStyle/>
                     <a:p>
                       <a:pPr algn="ctr">
-                        <a:defRPr sz="1500"/>
+                        <a:defRPr sz="1600"/>
                       </a:pPr>
                       <a:r>
                         <a:t>2879±500</a:t>
@@ -8115,19 +7939,19 @@
                   </a:txBody>
                   <a:tcPr>
                     <a:solidFill>
-                      <a:srgbClr val="F5F5F5"/>
+                      <a:srgbClr val="FAFAFA"/>
                     </a:solidFill>
                   </a:tcPr>
                 </a:tc>
               </a:tr>
-              <a:tr h="457200">
+              <a:tr h="587832">
                 <a:tc>
                   <a:txBody>
                     <a:bodyPr/>
                     <a:lstStyle/>
                     <a:p>
                       <a:pPr algn="ctr">
-                        <a:defRPr sz="1500"/>
+                        <a:defRPr sz="1600"/>
                       </a:pPr>
                       <a:r>
                         <a:t>Niño 3</a:t>
@@ -8142,7 +7966,7 @@
                     <a:lstStyle/>
                     <a:p>
                       <a:pPr algn="ctr">
-                        <a:defRPr sz="1500"/>
+                        <a:defRPr sz="1600"/>
                       </a:pPr>
                       <a:r>
                         <a:t>5</a:t>
@@ -8157,7 +7981,7 @@
                     <a:lstStyle/>
                     <a:p>
                       <a:pPr algn="ctr">
-                        <a:defRPr sz="1500"/>
+                        <a:defRPr sz="1600"/>
                       </a:pPr>
                       <a:r>
                         <a:t>15</a:t>
@@ -8172,7 +7996,7 @@
                     <a:lstStyle/>
                     <a:p>
                       <a:pPr algn="ctr">
-                        <a:defRPr sz="1500"/>
+                        <a:defRPr sz="1600"/>
                       </a:pPr>
                       <a:r>
                         <a:t>302±44</a:t>
@@ -8187,7 +8011,7 @@
                     <a:lstStyle/>
                     <a:p>
                       <a:pPr algn="ctr">
-                        <a:defRPr sz="1500"/>
+                        <a:defRPr sz="1600"/>
                       </a:pPr>
                       <a:r>
                         <a:t>681±140</a:t>
@@ -8202,7 +8026,7 @@
                     <a:lstStyle/>
                     <a:p>
                       <a:pPr algn="ctr">
-                        <a:defRPr sz="1500"/>
+                        <a:defRPr sz="1600"/>
                       </a:pPr>
                       <a:r>
                         <a:t>1598±501</a:t>
@@ -8217,7 +8041,7 @@
                     <a:lstStyle/>
                     <a:p>
                       <a:pPr algn="ctr">
-                        <a:defRPr sz="1500"/>
+                        <a:defRPr sz="1600"/>
                       </a:pPr>
                       <a:r>
                         <a:t>2800±573</a:t>
@@ -8231,6 +8055,41 @@
           </a:graphicData>
         </a:graphic>
       </p:graphicFrame>
+      <p:sp>
+        <p:nvSpPr>
+          <p:cNvPr id="6" name="TextBox 5"/>
+          <p:cNvSpPr txBox="1"/>
+          <p:nvPr/>
+        </p:nvSpPr>
+        <p:spPr>
+          <a:xfrm>
+            <a:off x="457200" y="5943600"/>
+            <a:ext cx="8229600" cy="731520"/>
+          </a:xfrm>
+          <a:prstGeom prst="rect">
+            <a:avLst/>
+          </a:prstGeom>
+          <a:noFill/>
+        </p:spPr>
+        <p:txBody>
+          <a:bodyPr wrap="none">
+            <a:spAutoFit/>
+          </a:bodyPr>
+          <a:lstStyle/>
+          <a:p>
+            <a:pPr algn="ctr">
+              <a:defRPr sz="2400" b="1">
+                <a:solidFill>
+                  <a:srgbClr val="C0392B"/>
+                </a:solidFill>
+              </a:defRPr>
+            </a:pPr>
+            <a:r>
+              <a:t>Los rangos se solapan completamente</a:t>
+            </a:r>
+          </a:p>
+        </p:txBody>
+      </p:sp>
     </p:spTree>
   </p:cSld>
   <p:clrMapOvr>
@@ -8258,13 +8117,13 @@
         <p:spPr>
           <a:xfrm>
             <a:off x="0" y="0"/>
-            <a:ext cx="9144000" cy="1005840"/>
+            <a:ext cx="9144000" cy="914400"/>
           </a:xfrm>
           <a:prstGeom prst="rect">
             <a:avLst/>
           </a:prstGeom>
           <a:solidFill>
-            <a:srgbClr val="3498DB"/>
+            <a:srgbClr val="C0392B"/>
           </a:solidFill>
           <a:ln>
             <a:noFill/>
@@ -8300,8 +8159,8 @@
         </p:nvSpPr>
         <p:spPr>
           <a:xfrm>
-            <a:off x="274320" y="228600"/>
-            <a:ext cx="8595360" cy="640080"/>
+            <a:off x="182880" y="137160"/>
+            <a:ext cx="8778240" cy="640080"/>
           </a:xfrm>
           <a:prstGeom prst="rect">
             <a:avLst/>
@@ -8315,14 +8174,14 @@
           <a:lstStyle/>
           <a:p>
             <a:pPr algn="ctr">
-              <a:defRPr sz="3600" b="1">
+              <a:defRPr sz="3400" b="1">
                 <a:solidFill>
                   <a:srgbClr val="FFFFFF"/>
                 </a:solidFill>
               </a:defRPr>
             </a:pPr>
             <a:r>
-              <a:t>Los datos acústicos (II)</a:t>
+              <a:t>Entendiendo la acústica de la voz</a:t>
             </a:r>
           </a:p>
         </p:txBody>
@@ -8350,14 +8209,14 @@
           <a:lstStyle/>
           <a:p>
             <a:pPr>
-              <a:defRPr sz="2800">
+              <a:defRPr sz="2600" b="1">
                 <a:solidFill>
-                  <a:srgbClr val="555555"/>
+                  <a:srgbClr val="34495E"/>
                 </a:solidFill>
               </a:defRPr>
             </a:pPr>
             <a:r>
-              <a:t>Observación clave</a:t>
+              <a:t>El tono (frecuencia fundamental, F₀)</a:t>
             </a:r>
           </a:p>
         </p:txBody>
@@ -8370,8 +8229,8 @@
         </p:nvSpPr>
         <p:spPr>
           <a:xfrm>
-            <a:off x="914400" y="2743200"/>
-            <a:ext cx="7315200" cy="1371600"/>
+            <a:off x="731520" y="1920240"/>
+            <a:ext cx="7680960" cy="502920"/>
           </a:xfrm>
           <a:prstGeom prst="rect">
             <a:avLst/>
@@ -8379,41 +8238,109 @@
           <a:noFill/>
         </p:spPr>
         <p:txBody>
-          <a:bodyPr wrap="none">
+          <a:bodyPr wrap="square">
             <a:spAutoFit/>
           </a:bodyPr>
           <a:lstStyle/>
           <a:p>
-            <a:pPr algn="ctr">
-              <a:defRPr sz="3200" b="1">
-                <a:solidFill>
-                  <a:srgbClr val="C0392B"/>
-                </a:solidFill>
-              </a:defRPr>
+            <a:pPr>
+              <a:defRPr sz="2400"/>
             </a:pPr>
             <a:r>
-              <a:t>Los rangos se solapan completamente.</a:t>
-            </a:r>
-          </a:p>
-          <a:p>
-            <a:pPr algn="ctr">
-              <a:defRPr sz="3200" b="1">
-                <a:solidFill>
-                  <a:srgbClr val="C0392B"/>
-                </a:solidFill>
-              </a:defRPr>
+              <a:t>• la "altura" de la voz (grave o aguda)</a:t>
+            </a:r>
+          </a:p>
+        </p:txBody>
+      </p:sp>
+      <p:sp>
+        <p:nvSpPr>
+          <p:cNvPr id="6" name="TextBox 5"/>
+          <p:cNvSpPr txBox="1"/>
+          <p:nvPr/>
+        </p:nvSpPr>
+        <p:spPr>
+          <a:xfrm>
+            <a:off x="731520" y="2468880"/>
+            <a:ext cx="7680960" cy="502920"/>
+          </a:xfrm>
+          <a:prstGeom prst="rect">
+            <a:avLst/>
+          </a:prstGeom>
+          <a:noFill/>
+        </p:spPr>
+        <p:txBody>
+          <a:bodyPr wrap="square">
+            <a:spAutoFit/>
+          </a:bodyPr>
+          <a:lstStyle/>
+          <a:p>
+            <a:pPr>
+              <a:defRPr sz="2400"/>
             </a:pPr>
-          </a:p>
-          <a:p>
-            <a:pPr algn="ctr">
-              <a:defRPr sz="3200" b="1">
-                <a:solidFill>
-                  <a:srgbClr val="C0392B"/>
-                </a:solidFill>
-              </a:defRPr>
+            <a:r>
+              <a:t>• producido por la vibración de las cuerdas vocales</a:t>
+            </a:r>
+          </a:p>
+        </p:txBody>
+      </p:sp>
+      <p:sp>
+        <p:nvSpPr>
+          <p:cNvPr id="7" name="TextBox 6"/>
+          <p:cNvSpPr txBox="1"/>
+          <p:nvPr/>
+        </p:nvSpPr>
+        <p:spPr>
+          <a:xfrm>
+            <a:off x="731520" y="3017520"/>
+            <a:ext cx="7680960" cy="502920"/>
+          </a:xfrm>
+          <a:prstGeom prst="rect">
+            <a:avLst/>
+          </a:prstGeom>
+          <a:noFill/>
+        </p:spPr>
+        <p:txBody>
+          <a:bodyPr wrap="square">
+            <a:spAutoFit/>
+          </a:bodyPr>
+          <a:lstStyle/>
+          <a:p>
+            <a:pPr>
+              <a:defRPr sz="2400"/>
             </a:pPr>
             <a:r>
-              <a:t>No hay diferencias estadísticamente significativas.</a:t>
+              <a:t>• en niños prepuberales: 200-350 Hz (similar en ambos géneros)</a:t>
+            </a:r>
+          </a:p>
+        </p:txBody>
+      </p:sp>
+      <p:sp>
+        <p:nvSpPr>
+          <p:cNvPr id="8" name="TextBox 7"/>
+          <p:cNvSpPr txBox="1"/>
+          <p:nvPr/>
+        </p:nvSpPr>
+        <p:spPr>
+          <a:xfrm>
+            <a:off x="731520" y="3566160"/>
+            <a:ext cx="7680960" cy="502920"/>
+          </a:xfrm>
+          <a:prstGeom prst="rect">
+            <a:avLst/>
+          </a:prstGeom>
+          <a:noFill/>
+        </p:spPr>
+        <p:txBody>
+          <a:bodyPr wrap="square">
+            <a:spAutoFit/>
+          </a:bodyPr>
+          <a:lstStyle/>
+          <a:p>
+            <a:pPr>
+              <a:defRPr sz="2400"/>
+            </a:pPr>
+            <a:r>
+              <a:t>• para comparar: adultos varones ~120 Hz, mujeres adultas ~220 Hz</a:t>
             </a:r>
           </a:p>
         </p:txBody>
@@ -8445,13 +8372,13 @@
         <p:spPr>
           <a:xfrm>
             <a:off x="0" y="0"/>
-            <a:ext cx="9144000" cy="1005840"/>
+            <a:ext cx="9144000" cy="914400"/>
           </a:xfrm>
           <a:prstGeom prst="rect">
             <a:avLst/>
           </a:prstGeom>
           <a:solidFill>
-            <a:srgbClr val="3498DB"/>
+            <a:srgbClr val="C0392B"/>
           </a:solidFill>
           <a:ln>
             <a:noFill/>
@@ -8487,8 +8414,8 @@
         </p:nvSpPr>
         <p:spPr>
           <a:xfrm>
-            <a:off x="274320" y="228600"/>
-            <a:ext cx="8595360" cy="640080"/>
+            <a:off x="182880" y="137160"/>
+            <a:ext cx="8778240" cy="640080"/>
           </a:xfrm>
           <a:prstGeom prst="rect">
             <a:avLst/>
@@ -8502,14 +8429,14 @@
           <a:lstStyle/>
           <a:p>
             <a:pPr algn="ctr">
-              <a:defRPr sz="3600" b="1">
+              <a:defRPr sz="3400" b="1">
                 <a:solidFill>
                   <a:srgbClr val="FFFFFF"/>
                 </a:solidFill>
               </a:defRPr>
             </a:pPr>
             <a:r>
-              <a:t>Entendiendo la acústica de la voz</a:t>
+              <a:t>Entendiendo la acústica de la voz (II)</a:t>
             </a:r>
           </a:p>
         </p:txBody>
@@ -8523,7 +8450,7 @@
         <p:spPr>
           <a:xfrm>
             <a:off x="457200" y="1188720"/>
-            <a:ext cx="8229600" cy="548640"/>
+            <a:ext cx="8229600" cy="457200"/>
           </a:xfrm>
           <a:prstGeom prst="rect">
             <a:avLst/>
@@ -8537,14 +8464,14 @@
           <a:lstStyle/>
           <a:p>
             <a:pPr>
-              <a:defRPr sz="2800">
+              <a:defRPr sz="2600" b="1">
                 <a:solidFill>
-                  <a:srgbClr val="555555"/>
+                  <a:srgbClr val="34495E"/>
                 </a:solidFill>
               </a:defRPr>
             </a:pPr>
             <a:r>
-              <a:t>El tono (frecuencia fundamental, F₀)</a:t>
+              <a:t>Los formantes (F1, F2, F3)</a:t>
             </a:r>
           </a:p>
         </p:txBody>
@@ -8558,7 +8485,7 @@
         <p:spPr>
           <a:xfrm>
             <a:off x="731520" y="1828800"/>
-            <a:ext cx="7772400" cy="457200"/>
+            <a:ext cx="7680960" cy="457200"/>
           </a:xfrm>
           <a:prstGeom prst="rect">
             <a:avLst/>
@@ -8572,10 +8499,10 @@
           <a:lstStyle/>
           <a:p>
             <a:pPr>
-              <a:defRPr sz="2200"/>
+              <a:defRPr sz="2400"/>
             </a:pPr>
             <a:r>
-              <a:t>la "altura" de la voz (grave o aguda)</a:t>
+              <a:t>• frecuencias de resonancia del tracto vocal</a:t>
             </a:r>
           </a:p>
         </p:txBody>
@@ -8588,8 +8515,8 @@
         </p:nvSpPr>
         <p:spPr>
           <a:xfrm>
-            <a:off x="731520" y="2286000"/>
-            <a:ext cx="7772400" cy="457200"/>
+            <a:off x="731520" y="2377440"/>
+            <a:ext cx="7680960" cy="457200"/>
           </a:xfrm>
           <a:prstGeom prst="rect">
             <a:avLst/>
@@ -8603,10 +8530,10 @@
           <a:lstStyle/>
           <a:p>
             <a:pPr>
-              <a:defRPr sz="2200"/>
+              <a:defRPr sz="2400"/>
             </a:pPr>
             <a:r>
-              <a:t>producido por la vibración de las cuerdas vocales</a:t>
+              <a:t>• determinan la calidad de las vocales (/a/, /e/, /i/, /o/, /u/)</a:t>
             </a:r>
           </a:p>
         </p:txBody>
@@ -8619,8 +8546,8 @@
         </p:nvSpPr>
         <p:spPr>
           <a:xfrm>
-            <a:off x="731520" y="2743200"/>
-            <a:ext cx="7772400" cy="457200"/>
+            <a:off x="731520" y="2926080"/>
+            <a:ext cx="7680960" cy="457200"/>
           </a:xfrm>
           <a:prstGeom prst="rect">
             <a:avLst/>
@@ -8634,10 +8561,10 @@
           <a:lstStyle/>
           <a:p>
             <a:pPr>
-              <a:defRPr sz="2200"/>
+              <a:defRPr sz="2400"/>
             </a:pPr>
             <a:r>
-              <a:t>en niños prepuberales: 200-350 Hz (similar en ambos géneros)</a:t>
+              <a:t>• relacionados con la longitud del tracto vocal</a:t>
             </a:r>
           </a:p>
         </p:txBody>
@@ -8650,8 +8577,8 @@
         </p:nvSpPr>
         <p:spPr>
           <a:xfrm>
-            <a:off x="731520" y="3200400"/>
-            <a:ext cx="7772400" cy="457200"/>
+            <a:off x="731520" y="3657600"/>
+            <a:ext cx="7680960" cy="457200"/>
           </a:xfrm>
           <a:prstGeom prst="rect">
             <a:avLst/>
@@ -8659,16 +8586,90 @@
           <a:noFill/>
         </p:spPr>
         <p:txBody>
-          <a:bodyPr wrap="none">
+          <a:bodyPr wrap="square">
             <a:spAutoFit/>
           </a:bodyPr>
           <a:lstStyle/>
           <a:p>
             <a:pPr>
-              <a:defRPr sz="2200"/>
+              <a:defRPr sz="2200" b="1">
+                <a:solidFill>
+                  <a:srgbClr val="C0392B"/>
+                </a:solidFill>
+              </a:defRPr>
             </a:pPr>
             <a:r>
-              <a:t>para comparar: adultos varones ~120 Hz, mujeres adultas ~220 Hz</a:t>
+              <a:t>F1: apertura de la boca (bajo = cerrada /i/, alto = abierta /a/)</a:t>
+            </a:r>
+          </a:p>
+        </p:txBody>
+      </p:sp>
+      <p:sp>
+        <p:nvSpPr>
+          <p:cNvPr id="9" name="TextBox 8"/>
+          <p:cNvSpPr txBox="1"/>
+          <p:nvPr/>
+        </p:nvSpPr>
+        <p:spPr>
+          <a:xfrm>
+            <a:off x="731520" y="4206240"/>
+            <a:ext cx="7680960" cy="457200"/>
+          </a:xfrm>
+          <a:prstGeom prst="rect">
+            <a:avLst/>
+          </a:prstGeom>
+          <a:noFill/>
+        </p:spPr>
+        <p:txBody>
+          <a:bodyPr wrap="square">
+            <a:spAutoFit/>
+          </a:bodyPr>
+          <a:lstStyle/>
+          <a:p>
+            <a:pPr>
+              <a:defRPr sz="2200" b="1">
+                <a:solidFill>
+                  <a:srgbClr val="C0392B"/>
+                </a:solidFill>
+              </a:defRPr>
+            </a:pPr>
+            <a:r>
+              <a:t>F2: posición de la lengua (bajo = posterior /u/, alto = anterior /i/)</a:t>
+            </a:r>
+          </a:p>
+        </p:txBody>
+      </p:sp>
+      <p:sp>
+        <p:nvSpPr>
+          <p:cNvPr id="10" name="TextBox 9"/>
+          <p:cNvSpPr txBox="1"/>
+          <p:nvPr/>
+        </p:nvSpPr>
+        <p:spPr>
+          <a:xfrm>
+            <a:off x="731520" y="4754879"/>
+            <a:ext cx="7680960" cy="457200"/>
+          </a:xfrm>
+          <a:prstGeom prst="rect">
+            <a:avLst/>
+          </a:prstGeom>
+          <a:noFill/>
+        </p:spPr>
+        <p:txBody>
+          <a:bodyPr wrap="square">
+            <a:spAutoFit/>
+          </a:bodyPr>
+          <a:lstStyle/>
+          <a:p>
+            <a:pPr>
+              <a:defRPr sz="2200" b="1">
+                <a:solidFill>
+                  <a:srgbClr val="C0392B"/>
+                </a:solidFill>
+              </a:defRPr>
+            </a:pPr>
+            <a:r>
+              <a:t>F3: configuración más compleja del tracto vocal</a:t>
             </a:r>
           </a:p>
         </p:txBody>
@@ -8700,13 +8701,13 @@
         <p:spPr>
           <a:xfrm>
             <a:off x="0" y="0"/>
-            <a:ext cx="9144000" cy="1005840"/>
+            <a:ext cx="9144000" cy="914400"/>
           </a:xfrm>
           <a:prstGeom prst="rect">
             <a:avLst/>
           </a:prstGeom>
           <a:solidFill>
-            <a:srgbClr val="3498DB"/>
+            <a:srgbClr val="C0392B"/>
           </a:solidFill>
           <a:ln>
             <a:noFill/>
@@ -8742,8 +8743,8 @@
         </p:nvSpPr>
         <p:spPr>
           <a:xfrm>
-            <a:off x="274320" y="228600"/>
-            <a:ext cx="8595360" cy="640080"/>
+            <a:off x="182880" y="137160"/>
+            <a:ext cx="8778240" cy="640080"/>
           </a:xfrm>
           <a:prstGeom prst="rect">
             <a:avLst/>
@@ -8757,14 +8758,14 @@
           <a:lstStyle/>
           <a:p>
             <a:pPr algn="ctr">
-              <a:defRPr sz="3600" b="1">
+              <a:defRPr sz="3400" b="1">
                 <a:solidFill>
                   <a:srgbClr val="FFFFFF"/>
                 </a:solidFill>
               </a:defRPr>
             </a:pPr>
             <a:r>
-              <a:t>Entendiendo la acústica de la voz (II)</a:t>
+              <a:t>Las visualizaciones acústicas</a:t>
             </a:r>
           </a:p>
         </p:txBody>
@@ -8777,8 +8778,8 @@
         </p:nvSpPr>
         <p:spPr>
           <a:xfrm>
-            <a:off x="457200" y="1188720"/>
-            <a:ext cx="8229600" cy="548640"/>
+            <a:off x="457200" y="1097280"/>
+            <a:ext cx="8229600" cy="457200"/>
           </a:xfrm>
           <a:prstGeom prst="rect">
             <a:avLst/>
@@ -8792,28 +8793,52 @@
           <a:lstStyle/>
           <a:p>
             <a:pPr>
-              <a:defRPr sz="2600">
+              <a:defRPr sz="2400">
                 <a:solidFill>
-                  <a:srgbClr val="555555"/>
+                  <a:srgbClr val="34495E"/>
                 </a:solidFill>
               </a:defRPr>
             </a:pPr>
             <a:r>
-              <a:t>Los formantes (F1, F2, F3)</a:t>
-            </a:r>
-          </a:p>
-        </p:txBody>
-      </p:sp>
-      <p:sp>
-        <p:nvSpPr>
-          <p:cNvPr id="5" name="TextBox 4"/>
+              <a:t>Espacio vocálico F1-F2</a:t>
+            </a:r>
+          </a:p>
+        </p:txBody>
+      </p:sp>
+      <p:pic>
+        <p:nvPicPr>
+          <p:cNvPr id="5" name="Picture 4" descr="vowel_spaces_overlap_small.png"/>
+          <p:cNvPicPr>
+            <a:picLocks noChangeAspect="1"/>
+          </p:cNvPicPr>
+          <p:nvPr/>
+        </p:nvPicPr>
+        <p:blipFill>
+          <a:blip r:embed="rId2"/>
+          <a:stretch>
+            <a:fillRect/>
+          </a:stretch>
+        </p:blipFill>
+        <p:spPr>
+          <a:xfrm>
+            <a:off x="1371600" y="1737360"/>
+            <a:ext cx="4743014" cy="4114800"/>
+          </a:xfrm>
+          <a:prstGeom prst="rect">
+            <a:avLst/>
+          </a:prstGeom>
+        </p:spPr>
+      </p:pic>
+      <p:sp>
+        <p:nvSpPr>
+          <p:cNvPr id="6" name="TextBox 5"/>
           <p:cNvSpPr txBox="1"/>
           <p:nvPr/>
         </p:nvSpPr>
         <p:spPr>
           <a:xfrm>
-            <a:off x="731520" y="1828800"/>
-            <a:ext cx="7772400" cy="411480"/>
+            <a:off x="457200" y="6035040"/>
+            <a:ext cx="8229600" cy="640080"/>
           </a:xfrm>
           <a:prstGeom prst="rect">
             <a:avLst/>
@@ -8821,183 +8846,20 @@
           <a:noFill/>
         </p:spPr>
         <p:txBody>
-          <a:bodyPr wrap="none">
+          <a:bodyPr wrap="square">
             <a:spAutoFit/>
           </a:bodyPr>
           <a:lstStyle/>
           <a:p>
             <a:pPr>
-              <a:defRPr sz="2200"/>
-            </a:pPr>
-            <a:r>
-              <a:t>• frecuencias de resonancia del tracto vocal</a:t>
-            </a:r>
-          </a:p>
-        </p:txBody>
-      </p:sp>
-      <p:sp>
-        <p:nvSpPr>
-          <p:cNvPr id="6" name="TextBox 5"/>
-          <p:cNvSpPr txBox="1"/>
-          <p:nvPr/>
-        </p:nvSpPr>
-        <p:spPr>
-          <a:xfrm>
-            <a:off x="731520" y="2286000"/>
-            <a:ext cx="7772400" cy="411480"/>
-          </a:xfrm>
-          <a:prstGeom prst="rect">
-            <a:avLst/>
-          </a:prstGeom>
-          <a:noFill/>
-        </p:spPr>
-        <p:txBody>
-          <a:bodyPr wrap="none">
-            <a:spAutoFit/>
-          </a:bodyPr>
-          <a:lstStyle/>
-          <a:p>
-            <a:pPr>
-              <a:defRPr sz="2200"/>
-            </a:pPr>
-            <a:r>
-              <a:t>• determinan la calidad de las vocales (/a/, /e/, /i/, /o/, /u/)</a:t>
-            </a:r>
-          </a:p>
-        </p:txBody>
-      </p:sp>
-      <p:sp>
-        <p:nvSpPr>
-          <p:cNvPr id="7" name="TextBox 6"/>
-          <p:cNvSpPr txBox="1"/>
-          <p:nvPr/>
-        </p:nvSpPr>
-        <p:spPr>
-          <a:xfrm>
-            <a:off x="731520" y="2743200"/>
-            <a:ext cx="7772400" cy="411480"/>
-          </a:xfrm>
-          <a:prstGeom prst="rect">
-            <a:avLst/>
-          </a:prstGeom>
-          <a:noFill/>
-        </p:spPr>
-        <p:txBody>
-          <a:bodyPr wrap="none">
-            <a:spAutoFit/>
-          </a:bodyPr>
-          <a:lstStyle/>
-          <a:p>
-            <a:pPr>
-              <a:defRPr sz="2200"/>
-            </a:pPr>
-            <a:r>
-              <a:t>• relacionados con la longitud del tracto vocal</a:t>
-            </a:r>
-          </a:p>
-        </p:txBody>
-      </p:sp>
-      <p:sp>
-        <p:nvSpPr>
-          <p:cNvPr id="8" name="TextBox 7"/>
-          <p:cNvSpPr txBox="1"/>
-          <p:nvPr/>
-        </p:nvSpPr>
-        <p:spPr>
-          <a:xfrm>
-            <a:off x="731520" y="3474720"/>
-            <a:ext cx="7772400" cy="411480"/>
-          </a:xfrm>
-          <a:prstGeom prst="rect">
-            <a:avLst/>
-          </a:prstGeom>
-          <a:noFill/>
-        </p:spPr>
-        <p:txBody>
-          <a:bodyPr wrap="none">
-            <a:spAutoFit/>
-          </a:bodyPr>
-          <a:lstStyle/>
-          <a:p>
-            <a:pPr>
-              <a:defRPr sz="2000" b="1">
+              <a:defRPr sz="2000" i="1">
                 <a:solidFill>
-                  <a:srgbClr val="3498DB"/>
+                  <a:srgbClr val="34495E"/>
                 </a:solidFill>
               </a:defRPr>
             </a:pPr>
             <a:r>
-              <a:t>F1: apertura de la boca (bajo = cerrada /i/, alto = abierta /a/)</a:t>
-            </a:r>
-          </a:p>
-        </p:txBody>
-      </p:sp>
-      <p:sp>
-        <p:nvSpPr>
-          <p:cNvPr id="9" name="TextBox 8"/>
-          <p:cNvSpPr txBox="1"/>
-          <p:nvPr/>
-        </p:nvSpPr>
-        <p:spPr>
-          <a:xfrm>
-            <a:off x="731520" y="3931920"/>
-            <a:ext cx="7772400" cy="411480"/>
-          </a:xfrm>
-          <a:prstGeom prst="rect">
-            <a:avLst/>
-          </a:prstGeom>
-          <a:noFill/>
-        </p:spPr>
-        <p:txBody>
-          <a:bodyPr wrap="none">
-            <a:spAutoFit/>
-          </a:bodyPr>
-          <a:lstStyle/>
-          <a:p>
-            <a:pPr>
-              <a:defRPr sz="2000" b="1">
-                <a:solidFill>
-                  <a:srgbClr val="3498DB"/>
-                </a:solidFill>
-              </a:defRPr>
-            </a:pPr>
-            <a:r>
-              <a:t>F2: posición de la lengua (bajo = posterior /u/, alto = anterior /i/)</a:t>
-            </a:r>
-          </a:p>
-        </p:txBody>
-      </p:sp>
-      <p:sp>
-        <p:nvSpPr>
-          <p:cNvPr id="10" name="TextBox 9"/>
-          <p:cNvSpPr txBox="1"/>
-          <p:nvPr/>
-        </p:nvSpPr>
-        <p:spPr>
-          <a:xfrm>
-            <a:off x="731520" y="4389120"/>
-            <a:ext cx="7772400" cy="411480"/>
-          </a:xfrm>
-          <a:prstGeom prst="rect">
-            <a:avLst/>
-          </a:prstGeom>
-          <a:noFill/>
-        </p:spPr>
-        <p:txBody>
-          <a:bodyPr wrap="none">
-            <a:spAutoFit/>
-          </a:bodyPr>
-          <a:lstStyle/>
-          <a:p>
-            <a:pPr>
-              <a:defRPr sz="2000" b="1">
-                <a:solidFill>
-                  <a:srgbClr val="3498DB"/>
-                </a:solidFill>
-              </a:defRPr>
-            </a:pPr>
-            <a:r>
-              <a:t>F3: configuración más compleja del tracto vocal</a:t>
+              <a:t>Interpretación: las elipses muestran la distribución de las vocales de cada hablante. El solapamiento es evidente.</a:t>
             </a:r>
           </a:p>
         </p:txBody>

</xml_diff>

<commit_message>
Versión final PowerPoint con espaciado correcto y audios funcionales
CORRECCIONES CRÍTICAS:
- word_wrap=True en TODAS las cajas para evitar desbordamientos
- Alturas de cajas calculadas para contener el texto completo
- Espaciado vertical reducido (0.6-0.7 inches entre elementos)
- Audios con add_movie() en todas las diapositivas
- Cajas de audio: 3.3x4 inches (suficientemente grandes)
- Eliminación de espacios en blanco excesivos
- 20 diapositivas optimizadas
</commit_message>
<xml_diff>
--- a/presentacion.pptx
+++ b/presentacion.pptx
@@ -3123,8 +3123,8 @@
         </p:nvSpPr>
         <p:spPr>
           <a:xfrm>
-            <a:off x="457200" y="1828800"/>
-            <a:ext cx="8229600" cy="3200400"/>
+            <a:off x="914400" y="2011680"/>
+            <a:ext cx="7315200" cy="2743200"/>
           </a:xfrm>
           <a:prstGeom prst="rect">
             <a:avLst/>
@@ -3138,7 +3138,7 @@
           <a:lstStyle/>
           <a:p>
             <a:pPr algn="ctr">
-              <a:defRPr sz="5400" b="1">
+              <a:defRPr sz="5200" b="1">
                 <a:solidFill>
                   <a:srgbClr val="FFFFFF"/>
                 </a:solidFill>
@@ -3150,7 +3150,7 @@
           </a:p>
           <a:p>
             <a:pPr algn="ctr">
-              <a:defRPr sz="3800">
+              <a:defRPr sz="3600">
                 <a:solidFill>
                   <a:srgbClr val="C0392B"/>
                 </a:solidFill>
@@ -3189,7 +3189,7 @@
         <p:spPr>
           <a:xfrm>
             <a:off x="0" y="0"/>
-            <a:ext cx="9144000" cy="914400"/>
+            <a:ext cx="9144000" cy="777240"/>
           </a:xfrm>
           <a:prstGeom prst="rect">
             <a:avLst/>
@@ -3231,8 +3231,8 @@
         </p:nvSpPr>
         <p:spPr>
           <a:xfrm>
-            <a:off x="182880" y="137160"/>
-            <a:ext cx="8778240" cy="640080"/>
+            <a:off x="182880" y="164592"/>
+            <a:ext cx="8778240" cy="457200"/>
           </a:xfrm>
           <a:prstGeom prst="rect">
             <a:avLst/>
@@ -3246,7 +3246,7 @@
           <a:lstStyle/>
           <a:p>
             <a:pPr algn="ctr">
-              <a:defRPr sz="3400" b="1">
+              <a:defRPr sz="3000" b="1">
                 <a:solidFill>
                   <a:srgbClr val="FFFFFF"/>
                 </a:solidFill>
@@ -3266,7 +3266,7 @@
         </p:nvSpPr>
         <p:spPr>
           <a:xfrm>
-            <a:off x="457200" y="1097280"/>
+            <a:off x="457200" y="914400"/>
             <a:ext cx="8229600" cy="457200"/>
           </a:xfrm>
           <a:prstGeom prst="rect">
@@ -3281,7 +3281,7 @@
           <a:lstStyle/>
           <a:p>
             <a:pPr>
-              <a:defRPr sz="2400">
+              <a:defRPr sz="2300">
                 <a:solidFill>
                   <a:srgbClr val="34495E"/>
                 </a:solidFill>
@@ -3309,8 +3309,8 @@
         </p:blipFill>
         <p:spPr>
           <a:xfrm>
-            <a:off x="1371600" y="1737360"/>
-            <a:ext cx="5813351" cy="4114800"/>
+            <a:off x="1371600" y="1554480"/>
+            <a:ext cx="5942537" cy="4206240"/>
           </a:xfrm>
           <a:prstGeom prst="rect">
             <a:avLst/>
@@ -3325,8 +3325,8 @@
         </p:nvSpPr>
         <p:spPr>
           <a:xfrm>
-            <a:off x="457200" y="6035040"/>
-            <a:ext cx="8229600" cy="640080"/>
+            <a:off x="457200" y="5943600"/>
+            <a:ext cx="8229600" cy="731520"/>
           </a:xfrm>
           <a:prstGeom prst="rect">
             <a:avLst/>
@@ -3340,7 +3340,7 @@
           <a:lstStyle/>
           <a:p>
             <a:pPr>
-              <a:defRPr sz="2000" i="1">
+              <a:defRPr sz="1900" i="1">
                 <a:solidFill>
                   <a:srgbClr val="34495E"/>
                 </a:solidFill>
@@ -3379,7 +3379,7 @@
         <p:spPr>
           <a:xfrm>
             <a:off x="0" y="0"/>
-            <a:ext cx="9144000" cy="914400"/>
+            <a:ext cx="9144000" cy="777240"/>
           </a:xfrm>
           <a:prstGeom prst="rect">
             <a:avLst/>
@@ -3421,8 +3421,8 @@
         </p:nvSpPr>
         <p:spPr>
           <a:xfrm>
-            <a:off x="182880" y="137160"/>
-            <a:ext cx="8778240" cy="640080"/>
+            <a:off x="182880" y="164592"/>
+            <a:ext cx="8778240" cy="457200"/>
           </a:xfrm>
           <a:prstGeom prst="rect">
             <a:avLst/>
@@ -3436,7 +3436,7 @@
           <a:lstStyle/>
           <a:p>
             <a:pPr algn="ctr">
-              <a:defRPr sz="3400" b="1">
+              <a:defRPr sz="3000" b="1">
                 <a:solidFill>
                   <a:srgbClr val="FFFFFF"/>
                 </a:solidFill>
@@ -3456,7 +3456,7 @@
         </p:nvSpPr>
         <p:spPr>
           <a:xfrm>
-            <a:off x="457200" y="1188720"/>
+            <a:off x="457200" y="960120"/>
             <a:ext cx="8229600" cy="457200"/>
           </a:xfrm>
           <a:prstGeom prst="rect">
@@ -3471,7 +3471,7 @@
           <a:lstStyle/>
           <a:p>
             <a:pPr>
-              <a:defRPr sz="2400" b="1">
+              <a:defRPr sz="2300" b="1">
                 <a:solidFill>
                   <a:srgbClr val="34495E"/>
                 </a:solidFill>
@@ -3491,14 +3491,14 @@
         </p:nvSpPr>
         <p:spPr>
           <a:xfrm>
-            <a:off x="731520" y="1920240"/>
+            <a:off x="731520" y="1645920"/>
             <a:ext cx="7680960" cy="1463040"/>
           </a:xfrm>
           <a:prstGeom prst="roundRect">
             <a:avLst/>
           </a:prstGeom>
           <a:solidFill>
-            <a:srgbClr val="ECF0F1"/>
+            <a:srgbClr val="F5F5F5"/>
           </a:solidFill>
           <a:ln w="25400">
             <a:solidFill>
@@ -3536,7 +3536,7 @@
         </p:nvSpPr>
         <p:spPr>
           <a:xfrm>
-            <a:off x="1097280" y="2103120"/>
+            <a:off x="1097280" y="1828800"/>
             <a:ext cx="6949440" cy="1097280"/>
           </a:xfrm>
           <a:prstGeom prst="rect">
@@ -3551,7 +3551,7 @@
           <a:lstStyle/>
           <a:p>
             <a:pPr>
-              <a:defRPr sz="2200" i="1"/>
+              <a:defRPr sz="2100" i="1"/>
             </a:pPr>
             <a:r>
               <a:t>"La percepción del género y la edad del hablante están entrelazadas. Los oyentes usan información sobre la edad para informar sus juicios de género"</a:t>
@@ -3567,8 +3567,8 @@
         </p:nvSpPr>
         <p:spPr>
           <a:xfrm>
-            <a:off x="731520" y="3840480"/>
-            <a:ext cx="7680960" cy="548640"/>
+            <a:off x="731520" y="3383280"/>
+            <a:ext cx="7680960" cy="640080"/>
           </a:xfrm>
           <a:prstGeom prst="rect">
             <a:avLst/>
@@ -3576,7 +3576,7 @@
           <a:noFill/>
         </p:spPr>
         <p:txBody>
-          <a:bodyPr wrap="none">
+          <a:bodyPr wrap="square">
             <a:spAutoFit/>
           </a:bodyPr>
           <a:lstStyle/>
@@ -3621,7 +3621,7 @@
         <p:spPr>
           <a:xfrm>
             <a:off x="0" y="0"/>
-            <a:ext cx="9144000" cy="914400"/>
+            <a:ext cx="9144000" cy="777240"/>
           </a:xfrm>
           <a:prstGeom prst="rect">
             <a:avLst/>
@@ -3663,8 +3663,8 @@
         </p:nvSpPr>
         <p:spPr>
           <a:xfrm>
-            <a:off x="182880" y="137160"/>
-            <a:ext cx="8778240" cy="640080"/>
+            <a:off x="182880" y="164592"/>
+            <a:ext cx="8778240" cy="457200"/>
           </a:xfrm>
           <a:prstGeom prst="rect">
             <a:avLst/>
@@ -3678,7 +3678,7 @@
           <a:lstStyle/>
           <a:p>
             <a:pPr algn="ctr">
-              <a:defRPr sz="3400" b="1">
+              <a:defRPr sz="3000" b="1">
                 <a:solidFill>
                   <a:srgbClr val="FFFFFF"/>
                 </a:solidFill>
@@ -3698,8 +3698,8 @@
         </p:nvSpPr>
         <p:spPr>
           <a:xfrm>
-            <a:off x="457200" y="1097280"/>
-            <a:ext cx="8229600" cy="548640"/>
+            <a:off x="457200" y="960120"/>
+            <a:ext cx="8229600" cy="594360"/>
           </a:xfrm>
           <a:prstGeom prst="rect">
             <a:avLst/>
@@ -3707,13 +3707,13 @@
           <a:noFill/>
         </p:spPr>
         <p:txBody>
-          <a:bodyPr wrap="none">
+          <a:bodyPr wrap="square">
             <a:spAutoFit/>
           </a:bodyPr>
           <a:lstStyle/>
           <a:p>
             <a:pPr>
-              <a:defRPr sz="2600" b="1">
+              <a:defRPr sz="2500" b="1">
                 <a:solidFill>
                   <a:srgbClr val="34495E"/>
                 </a:solidFill>
@@ -3733,8 +3733,8 @@
         </p:nvSpPr>
         <p:spPr>
           <a:xfrm>
-            <a:off x="731520" y="1828800"/>
-            <a:ext cx="7680960" cy="502920"/>
+            <a:off x="731520" y="1645920"/>
+            <a:ext cx="7680960" cy="640080"/>
           </a:xfrm>
           <a:prstGeom prst="rect">
             <a:avLst/>
@@ -3748,7 +3748,7 @@
           <a:lstStyle/>
           <a:p>
             <a:pPr>
-              <a:defRPr sz="2400"/>
+              <a:defRPr sz="2300"/>
             </a:pPr>
             <a:r>
               <a:t>• Pitch como predictor principal (aunque con mucho solapamiento)</a:t>
@@ -3764,8 +3764,8 @@
         </p:nvSpPr>
         <p:spPr>
           <a:xfrm>
-            <a:off x="731520" y="2377440"/>
-            <a:ext cx="7680960" cy="502920"/>
+            <a:off x="731520" y="2286000"/>
+            <a:ext cx="7680960" cy="640080"/>
           </a:xfrm>
           <a:prstGeom prst="rect">
             <a:avLst/>
@@ -3779,7 +3779,7 @@
           <a:lstStyle/>
           <a:p>
             <a:pPr>
-              <a:defRPr sz="2400"/>
+              <a:defRPr sz="2300"/>
             </a:pPr>
             <a:r>
               <a:t>• Espectro de sibilantes (/s/, /z/): los niños tienden a producirlas con energía más baja</a:t>
@@ -3796,7 +3796,7 @@
         <p:spPr>
           <a:xfrm>
             <a:off x="731520" y="2926080"/>
-            <a:ext cx="7680960" cy="502920"/>
+            <a:ext cx="7680960" cy="640080"/>
           </a:xfrm>
           <a:prstGeom prst="rect">
             <a:avLst/>
@@ -3810,7 +3810,7 @@
           <a:lstStyle/>
           <a:p>
             <a:pPr>
-              <a:defRPr sz="2400"/>
+              <a:defRPr sz="2300"/>
             </a:pPr>
             <a:r>
               <a:t>• Correlación con conformidad de género: los niños que expresan mayor conformidad muestran diferencias más marcadas</a:t>
@@ -3845,7 +3845,7 @@
         <p:spPr>
           <a:xfrm>
             <a:off x="0" y="0"/>
-            <a:ext cx="9144000" cy="914400"/>
+            <a:ext cx="9144000" cy="777240"/>
           </a:xfrm>
           <a:prstGeom prst="rect">
             <a:avLst/>
@@ -3887,8 +3887,8 @@
         </p:nvSpPr>
         <p:spPr>
           <a:xfrm>
-            <a:off x="182880" y="137160"/>
-            <a:ext cx="8778240" cy="640080"/>
+            <a:off x="182880" y="164592"/>
+            <a:ext cx="8778240" cy="457200"/>
           </a:xfrm>
           <a:prstGeom prst="rect">
             <a:avLst/>
@@ -3902,7 +3902,7 @@
           <a:lstStyle/>
           <a:p>
             <a:pPr algn="ctr">
-              <a:defRPr sz="3400" b="1">
+              <a:defRPr sz="3000" b="1">
                 <a:solidFill>
                   <a:srgbClr val="FFFFFF"/>
                 </a:solidFill>
@@ -3922,8 +3922,8 @@
         </p:nvSpPr>
         <p:spPr>
           <a:xfrm>
-            <a:off x="457200" y="1097280"/>
-            <a:ext cx="8229600" cy="548640"/>
+            <a:off x="457200" y="960120"/>
+            <a:ext cx="8229600" cy="594360"/>
           </a:xfrm>
           <a:prstGeom prst="rect">
             <a:avLst/>
@@ -3931,13 +3931,13 @@
           <a:noFill/>
         </p:spPr>
         <p:txBody>
-          <a:bodyPr wrap="none">
+          <a:bodyPr wrap="square">
             <a:spAutoFit/>
           </a:bodyPr>
           <a:lstStyle/>
           <a:p>
             <a:pPr>
-              <a:defRPr sz="2600" b="1">
+              <a:defRPr sz="2500" b="1">
                 <a:solidFill>
                   <a:srgbClr val="34495E"/>
                 </a:solidFill>
@@ -3957,8 +3957,8 @@
         </p:nvSpPr>
         <p:spPr>
           <a:xfrm>
-            <a:off x="731520" y="1828800"/>
-            <a:ext cx="7680960" cy="502920"/>
+            <a:off x="731520" y="1645920"/>
+            <a:ext cx="7680960" cy="640080"/>
           </a:xfrm>
           <a:prstGeom prst="rect">
             <a:avLst/>
@@ -3972,7 +3972,7 @@
           <a:lstStyle/>
           <a:p>
             <a:pPr>
-              <a:defRPr sz="2400"/>
+              <a:defRPr sz="2300"/>
             </a:pPr>
             <a:r>
               <a:t>• Desde los 2-3 años, los niños internalizan estereotipos de género</a:t>
@@ -3988,8 +3988,8 @@
         </p:nvSpPr>
         <p:spPr>
           <a:xfrm>
-            <a:off x="731520" y="2377440"/>
-            <a:ext cx="7680960" cy="502920"/>
+            <a:off x="731520" y="2286000"/>
+            <a:ext cx="7680960" cy="640080"/>
           </a:xfrm>
           <a:prstGeom prst="rect">
             <a:avLst/>
@@ -4003,7 +4003,7 @@
           <a:lstStyle/>
           <a:p>
             <a:pPr>
-              <a:defRPr sz="2400"/>
+              <a:defRPr sz="2300"/>
             </a:pPr>
             <a:r>
               <a:t>• Pueden modificar voluntariamente su voz para sonar más "masculinos" o "femeninos"</a:t>
@@ -4020,7 +4020,7 @@
         <p:spPr>
           <a:xfrm>
             <a:off x="731520" y="2926080"/>
-            <a:ext cx="7680960" cy="502920"/>
+            <a:ext cx="7680960" cy="640080"/>
           </a:xfrm>
           <a:prstGeom prst="rect">
             <a:avLst/>
@@ -4034,7 +4034,7 @@
           <a:lstStyle/>
           <a:p>
             <a:pPr>
-              <a:defRPr sz="2400"/>
+              <a:defRPr sz="2300"/>
             </a:pPr>
             <a:r>
               <a:t>• Cartei et al. (2019): niños de 6-10 años pueden controlar la expresión de masculinidad/feminidad</a:t>
@@ -4069,7 +4069,7 @@
         <p:spPr>
           <a:xfrm>
             <a:off x="0" y="0"/>
-            <a:ext cx="9144000" cy="914400"/>
+            <a:ext cx="9144000" cy="777240"/>
           </a:xfrm>
           <a:prstGeom prst="rect">
             <a:avLst/>
@@ -4111,8 +4111,8 @@
         </p:nvSpPr>
         <p:spPr>
           <a:xfrm>
-            <a:off x="182880" y="137160"/>
-            <a:ext cx="8778240" cy="640080"/>
+            <a:off x="182880" y="164592"/>
+            <a:ext cx="8778240" cy="457200"/>
           </a:xfrm>
           <a:prstGeom prst="rect">
             <a:avLst/>
@@ -4126,7 +4126,7 @@
           <a:lstStyle/>
           <a:p>
             <a:pPr algn="ctr">
-              <a:defRPr sz="3400" b="1">
+              <a:defRPr sz="3000" b="1">
                 <a:solidFill>
                   <a:srgbClr val="FFFFFF"/>
                 </a:solidFill>
@@ -4146,8 +4146,8 @@
         </p:nvSpPr>
         <p:spPr>
           <a:xfrm>
-            <a:off x="457200" y="1097280"/>
-            <a:ext cx="8229600" cy="548640"/>
+            <a:off x="457200" y="960120"/>
+            <a:ext cx="8229600" cy="594360"/>
           </a:xfrm>
           <a:prstGeom prst="rect">
             <a:avLst/>
@@ -4155,13 +4155,13 @@
           <a:noFill/>
         </p:spPr>
         <p:txBody>
-          <a:bodyPr wrap="none">
+          <a:bodyPr wrap="square">
             <a:spAutoFit/>
           </a:bodyPr>
           <a:lstStyle/>
           <a:p>
             <a:pPr>
-              <a:defRPr sz="2600" b="1">
+              <a:defRPr sz="2500" b="1">
                 <a:solidFill>
                   <a:srgbClr val="34495E"/>
                 </a:solidFill>
@@ -4181,8 +4181,8 @@
         </p:nvSpPr>
         <p:spPr>
           <a:xfrm>
-            <a:off x="731520" y="1828800"/>
-            <a:ext cx="7680960" cy="502920"/>
+            <a:off x="731520" y="1645920"/>
+            <a:ext cx="7680960" cy="640080"/>
           </a:xfrm>
           <a:prstGeom prst="rect">
             <a:avLst/>
@@ -4196,7 +4196,7 @@
           <a:lstStyle/>
           <a:p>
             <a:pPr>
-              <a:defRPr sz="2400"/>
+              <a:defRPr sz="2300"/>
             </a:pPr>
             <a:r>
               <a:t>• Patrones de entonación</a:t>
@@ -4212,8 +4212,8 @@
         </p:nvSpPr>
         <p:spPr>
           <a:xfrm>
-            <a:off x="731520" y="2377440"/>
-            <a:ext cx="7680960" cy="502920"/>
+            <a:off x="731520" y="2286000"/>
+            <a:ext cx="7680960" cy="640080"/>
           </a:xfrm>
           <a:prstGeom prst="rect">
             <a:avLst/>
@@ -4227,7 +4227,7 @@
           <a:lstStyle/>
           <a:p>
             <a:pPr>
-              <a:defRPr sz="2400"/>
+              <a:defRPr sz="2300"/>
             </a:pPr>
             <a:r>
               <a:t>• Ritmo del habla</a:t>
@@ -4244,7 +4244,7 @@
         <p:spPr>
           <a:xfrm>
             <a:off x="731520" y="2926080"/>
-            <a:ext cx="7680960" cy="502920"/>
+            <a:ext cx="7680960" cy="640080"/>
           </a:xfrm>
           <a:prstGeom prst="rect">
             <a:avLst/>
@@ -4258,7 +4258,7 @@
           <a:lstStyle/>
           <a:p>
             <a:pPr>
-              <a:defRPr sz="2400"/>
+              <a:defRPr sz="2300"/>
             </a:pPr>
             <a:r>
               <a:t>• Variabilidad temporal y espectral</a:t>
@@ -4274,8 +4274,8 @@
         </p:nvSpPr>
         <p:spPr>
           <a:xfrm>
-            <a:off x="731520" y="3474720"/>
-            <a:ext cx="7680960" cy="502920"/>
+            <a:off x="731520" y="3566160"/>
+            <a:ext cx="7680960" cy="640080"/>
           </a:xfrm>
           <a:prstGeom prst="rect">
             <a:avLst/>
@@ -4289,7 +4289,7 @@
           <a:lstStyle/>
           <a:p>
             <a:pPr>
-              <a:defRPr sz="2400"/>
+              <a:defRPr sz="2300"/>
             </a:pPr>
             <a:r>
               <a:t>• Mucho más evidente en frases completas que en sílabas aisladas</a:t>
@@ -4324,7 +4324,7 @@
         <p:spPr>
           <a:xfrm>
             <a:off x="0" y="0"/>
-            <a:ext cx="9144000" cy="914400"/>
+            <a:ext cx="9144000" cy="777240"/>
           </a:xfrm>
           <a:prstGeom prst="rect">
             <a:avLst/>
@@ -4366,8 +4366,8 @@
         </p:nvSpPr>
         <p:spPr>
           <a:xfrm>
-            <a:off x="182880" y="137160"/>
-            <a:ext cx="8778240" cy="640080"/>
+            <a:off x="182880" y="164592"/>
+            <a:ext cx="8778240" cy="457200"/>
           </a:xfrm>
           <a:prstGeom prst="rect">
             <a:avLst/>
@@ -4381,7 +4381,7 @@
           <a:lstStyle/>
           <a:p>
             <a:pPr algn="ctr">
-              <a:defRPr sz="3400" b="1">
+              <a:defRPr sz="3000" b="1">
                 <a:solidFill>
                   <a:srgbClr val="FFFFFF"/>
                 </a:solidFill>
@@ -4401,8 +4401,8 @@
         </p:nvSpPr>
         <p:spPr>
           <a:xfrm>
-            <a:off x="457200" y="1097280"/>
-            <a:ext cx="8229600" cy="548640"/>
+            <a:off x="457200" y="960120"/>
+            <a:ext cx="8229600" cy="594360"/>
           </a:xfrm>
           <a:prstGeom prst="rect">
             <a:avLst/>
@@ -4410,13 +4410,13 @@
           <a:noFill/>
         </p:spPr>
         <p:txBody>
-          <a:bodyPr wrap="none">
+          <a:bodyPr wrap="square">
             <a:spAutoFit/>
           </a:bodyPr>
           <a:lstStyle/>
           <a:p>
             <a:pPr>
-              <a:defRPr sz="2600" b="1">
+              <a:defRPr sz="2500" b="1">
                 <a:solidFill>
                   <a:srgbClr val="34495E"/>
                 </a:solidFill>
@@ -4436,8 +4436,8 @@
         </p:nvSpPr>
         <p:spPr>
           <a:xfrm>
-            <a:off x="731520" y="1828800"/>
-            <a:ext cx="7680960" cy="502920"/>
+            <a:off x="731520" y="1645920"/>
+            <a:ext cx="7680960" cy="640080"/>
           </a:xfrm>
           <a:prstGeom prst="rect">
             <a:avLst/>
@@ -4451,7 +4451,7 @@
           <a:lstStyle/>
           <a:p>
             <a:pPr>
-              <a:defRPr sz="2400"/>
+              <a:defRPr sz="2300"/>
             </a:pPr>
             <a:r>
               <a:t>• Duración del estímulo (mejor en oraciones que en vocales aisladas)</a:t>
@@ -4467,8 +4467,8 @@
         </p:nvSpPr>
         <p:spPr>
           <a:xfrm>
-            <a:off x="731520" y="2377440"/>
-            <a:ext cx="7680960" cy="502920"/>
+            <a:off x="731520" y="2286000"/>
+            <a:ext cx="7680960" cy="640080"/>
           </a:xfrm>
           <a:prstGeom prst="rect">
             <a:avLst/>
@@ -4482,7 +4482,7 @@
           <a:lstStyle/>
           <a:p>
             <a:pPr>
-              <a:defRPr sz="2400"/>
+              <a:defRPr sz="2300"/>
             </a:pPr>
             <a:r>
               <a:t>• Conocimiento de la edad aproximada del hablante</a:t>
@@ -4499,7 +4499,7 @@
         <p:spPr>
           <a:xfrm>
             <a:off x="731520" y="2926080"/>
-            <a:ext cx="7680960" cy="502920"/>
+            <a:ext cx="7680960" cy="640080"/>
           </a:xfrm>
           <a:prstGeom prst="rect">
             <a:avLst/>
@@ -4513,7 +4513,7 @@
           <a:lstStyle/>
           <a:p>
             <a:pPr>
-              <a:defRPr sz="2400"/>
+              <a:defRPr sz="2300"/>
             </a:pPr>
             <a:r>
               <a:t>• Expectativas culturales</a:t>
@@ -4548,7 +4548,7 @@
         <p:spPr>
           <a:xfrm>
             <a:off x="0" y="0"/>
-            <a:ext cx="9144000" cy="914400"/>
+            <a:ext cx="9144000" cy="777240"/>
           </a:xfrm>
           <a:prstGeom prst="rect">
             <a:avLst/>
@@ -4590,8 +4590,8 @@
         </p:nvSpPr>
         <p:spPr>
           <a:xfrm>
-            <a:off x="182880" y="137160"/>
-            <a:ext cx="8778240" cy="640080"/>
+            <a:off x="182880" y="164592"/>
+            <a:ext cx="8778240" cy="457200"/>
           </a:xfrm>
           <a:prstGeom prst="rect">
             <a:avLst/>
@@ -4605,7 +4605,7 @@
           <a:lstStyle/>
           <a:p>
             <a:pPr algn="ctr">
-              <a:defRPr sz="3400" b="1">
+              <a:defRPr sz="3000" b="1">
                 <a:solidFill>
                   <a:srgbClr val="FFFFFF"/>
                 </a:solidFill>
@@ -4625,8 +4625,8 @@
         </p:nvSpPr>
         <p:spPr>
           <a:xfrm>
-            <a:off x="457200" y="1097280"/>
-            <a:ext cx="8229600" cy="548640"/>
+            <a:off x="457200" y="960120"/>
+            <a:ext cx="8229600" cy="594360"/>
           </a:xfrm>
           <a:prstGeom prst="rect">
             <a:avLst/>
@@ -4634,13 +4634,13 @@
           <a:noFill/>
         </p:spPr>
         <p:txBody>
-          <a:bodyPr wrap="none">
+          <a:bodyPr wrap="square">
             <a:spAutoFit/>
           </a:bodyPr>
           <a:lstStyle/>
           <a:p>
             <a:pPr>
-              <a:defRPr sz="2600" b="1">
+              <a:defRPr sz="2500" b="1">
                 <a:solidFill>
                   <a:srgbClr val="34495E"/>
                 </a:solidFill>
@@ -4660,8 +4660,8 @@
         </p:nvSpPr>
         <p:spPr>
           <a:xfrm>
-            <a:off x="731520" y="1828800"/>
-            <a:ext cx="7680960" cy="502920"/>
+            <a:off x="731520" y="1645920"/>
+            <a:ext cx="7680960" cy="640080"/>
           </a:xfrm>
           <a:prstGeom prst="rect">
             <a:avLst/>
@@ -4675,7 +4675,7 @@
           <a:lstStyle/>
           <a:p>
             <a:pPr>
-              <a:defRPr sz="2400"/>
+              <a:defRPr sz="2300"/>
             </a:pPr>
             <a:r>
               <a:t>• No hay dimorfismo sexual anatómico significativo antes de la pubertad</a:t>
@@ -4691,8 +4691,8 @@
         </p:nvSpPr>
         <p:spPr>
           <a:xfrm>
-            <a:off x="731520" y="2377440"/>
-            <a:ext cx="7680960" cy="502920"/>
+            <a:off x="731520" y="2286000"/>
+            <a:ext cx="7680960" cy="640080"/>
           </a:xfrm>
           <a:prstGeom prst="rect">
             <a:avLst/>
@@ -4706,7 +4706,7 @@
           <a:lstStyle/>
           <a:p>
             <a:pPr>
-              <a:defRPr sz="2400"/>
+              <a:defRPr sz="2300"/>
             </a:pPr>
             <a:r>
               <a:t>• Los parámetros acústicos básicos (tono, formantes) se solapan completamente</a:t>
@@ -4741,7 +4741,7 @@
         <p:spPr>
           <a:xfrm>
             <a:off x="0" y="0"/>
-            <a:ext cx="9144000" cy="914400"/>
+            <a:ext cx="9144000" cy="777240"/>
           </a:xfrm>
           <a:prstGeom prst="rect">
             <a:avLst/>
@@ -4783,8 +4783,8 @@
         </p:nvSpPr>
         <p:spPr>
           <a:xfrm>
-            <a:off x="182880" y="137160"/>
-            <a:ext cx="8778240" cy="640080"/>
+            <a:off x="182880" y="164592"/>
+            <a:ext cx="8778240" cy="457200"/>
           </a:xfrm>
           <a:prstGeom prst="rect">
             <a:avLst/>
@@ -4798,7 +4798,7 @@
           <a:lstStyle/>
           <a:p>
             <a:pPr algn="ctr">
-              <a:defRPr sz="3400" b="1">
+              <a:defRPr sz="3000" b="1">
                 <a:solidFill>
                   <a:srgbClr val="FFFFFF"/>
                 </a:solidFill>
@@ -4818,8 +4818,8 @@
         </p:nvSpPr>
         <p:spPr>
           <a:xfrm>
-            <a:off x="457200" y="1097280"/>
-            <a:ext cx="8229600" cy="548640"/>
+            <a:off x="457200" y="960120"/>
+            <a:ext cx="8229600" cy="594360"/>
           </a:xfrm>
           <a:prstGeom prst="rect">
             <a:avLst/>
@@ -4827,13 +4827,13 @@
           <a:noFill/>
         </p:spPr>
         <p:txBody>
-          <a:bodyPr wrap="none">
+          <a:bodyPr wrap="square">
             <a:spAutoFit/>
           </a:bodyPr>
           <a:lstStyle/>
           <a:p>
             <a:pPr>
-              <a:defRPr sz="2600" b="1">
+              <a:defRPr sz="2500" b="1">
                 <a:solidFill>
                   <a:srgbClr val="34495E"/>
                 </a:solidFill>
@@ -4853,8 +4853,8 @@
         </p:nvSpPr>
         <p:spPr>
           <a:xfrm>
-            <a:off x="731520" y="1828800"/>
-            <a:ext cx="7680960" cy="502920"/>
+            <a:off x="731520" y="1645920"/>
+            <a:ext cx="7680960" cy="640080"/>
           </a:xfrm>
           <a:prstGeom prst="rect">
             <a:avLst/>
@@ -4868,7 +4868,7 @@
           <a:lstStyle/>
           <a:p>
             <a:pPr>
-              <a:defRPr sz="2400"/>
+              <a:defRPr sz="2300"/>
             </a:pPr>
             <a:r>
               <a:t>• Identificamos correctamente el género en ~70-80% de los casos</a:t>
@@ -4884,8 +4884,8 @@
         </p:nvSpPr>
         <p:spPr>
           <a:xfrm>
-            <a:off x="731520" y="2377440"/>
-            <a:ext cx="7680960" cy="502920"/>
+            <a:off x="731520" y="2286000"/>
+            <a:ext cx="7680960" cy="640080"/>
           </a:xfrm>
           <a:prstGeom prst="rect">
             <a:avLst/>
@@ -4899,7 +4899,7 @@
           <a:lstStyle/>
           <a:p>
             <a:pPr>
-              <a:defRPr sz="2400"/>
+              <a:defRPr sz="2300"/>
             </a:pPr>
             <a:r>
               <a:t>• La precisión mejora con más contexto (oraciones vs sílabas aisladas)</a:t>
@@ -4934,7 +4934,7 @@
         <p:spPr>
           <a:xfrm>
             <a:off x="0" y="0"/>
-            <a:ext cx="9144000" cy="914400"/>
+            <a:ext cx="9144000" cy="777240"/>
           </a:xfrm>
           <a:prstGeom prst="rect">
             <a:avLst/>
@@ -4976,8 +4976,8 @@
         </p:nvSpPr>
         <p:spPr>
           <a:xfrm>
-            <a:off x="182880" y="137160"/>
-            <a:ext cx="8778240" cy="640080"/>
+            <a:off x="182880" y="164592"/>
+            <a:ext cx="8778240" cy="457200"/>
           </a:xfrm>
           <a:prstGeom prst="rect">
             <a:avLst/>
@@ -4991,7 +4991,7 @@
           <a:lstStyle/>
           <a:p>
             <a:pPr algn="ctr">
-              <a:defRPr sz="3400" b="1">
+              <a:defRPr sz="3000" b="1">
                 <a:solidFill>
                   <a:srgbClr val="FFFFFF"/>
                 </a:solidFill>
@@ -5011,8 +5011,8 @@
         </p:nvSpPr>
         <p:spPr>
           <a:xfrm>
-            <a:off x="457200" y="1097280"/>
-            <a:ext cx="8229600" cy="548640"/>
+            <a:off x="457200" y="960120"/>
+            <a:ext cx="8229600" cy="594360"/>
           </a:xfrm>
           <a:prstGeom prst="rect">
             <a:avLst/>
@@ -5020,13 +5020,13 @@
           <a:noFill/>
         </p:spPr>
         <p:txBody>
-          <a:bodyPr wrap="none">
+          <a:bodyPr wrap="square">
             <a:spAutoFit/>
           </a:bodyPr>
           <a:lstStyle/>
           <a:p>
             <a:pPr>
-              <a:defRPr sz="2600" b="1">
+              <a:defRPr sz="2500" b="1">
                 <a:solidFill>
                   <a:srgbClr val="34495E"/>
                 </a:solidFill>
@@ -5046,8 +5046,8 @@
         </p:nvSpPr>
         <p:spPr>
           <a:xfrm>
-            <a:off x="731520" y="1828800"/>
-            <a:ext cx="7680960" cy="502920"/>
+            <a:off x="731520" y="1645920"/>
+            <a:ext cx="7680960" cy="640080"/>
           </a:xfrm>
           <a:prstGeom prst="rect">
             <a:avLst/>
@@ -5061,7 +5061,7 @@
           <a:lstStyle/>
           <a:p>
             <a:pPr>
-              <a:defRPr sz="2400"/>
+              <a:defRPr sz="2300"/>
             </a:pPr>
             <a:r>
               <a:t>• Los niños aprenden y practican patrones de habla asociados a su género</a:t>
@@ -5077,8 +5077,8 @@
         </p:nvSpPr>
         <p:spPr>
           <a:xfrm>
-            <a:off x="731520" y="2377440"/>
-            <a:ext cx="7680960" cy="502920"/>
+            <a:off x="731520" y="2286000"/>
+            <a:ext cx="7680960" cy="640080"/>
           </a:xfrm>
           <a:prstGeom prst="rect">
             <a:avLst/>
@@ -5092,7 +5092,7 @@
           <a:lstStyle/>
           <a:p>
             <a:pPr>
-              <a:defRPr sz="2400"/>
+              <a:defRPr sz="2300"/>
             </a:pPr>
             <a:r>
               <a:t>• La voz no solo refleja anatomía, sino identidad de género</a:t>
@@ -5109,7 +5109,7 @@
         <p:spPr>
           <a:xfrm>
             <a:off x="731520" y="2926080"/>
-            <a:ext cx="7680960" cy="502920"/>
+            <a:ext cx="7680960" cy="640080"/>
           </a:xfrm>
           <a:prstGeom prst="rect">
             <a:avLst/>
@@ -5123,7 +5123,7 @@
           <a:lstStyle/>
           <a:p>
             <a:pPr>
-              <a:defRPr sz="2400"/>
+              <a:defRPr sz="2300"/>
             </a:pPr>
             <a:r>
               <a:t>• Implicaciones: desarrollo del lenguaje, identidad de género, terapia de voz</a:t>
@@ -5158,7 +5158,7 @@
         <p:spPr>
           <a:xfrm>
             <a:off x="0" y="0"/>
-            <a:ext cx="9144000" cy="914400"/>
+            <a:ext cx="9144000" cy="777240"/>
           </a:xfrm>
           <a:prstGeom prst="rect">
             <a:avLst/>
@@ -5200,8 +5200,8 @@
         </p:nvSpPr>
         <p:spPr>
           <a:xfrm>
-            <a:off x="182880" y="137160"/>
-            <a:ext cx="8778240" cy="640080"/>
+            <a:off x="182880" y="164592"/>
+            <a:ext cx="8778240" cy="457200"/>
           </a:xfrm>
           <a:prstGeom prst="rect">
             <a:avLst/>
@@ -5215,7 +5215,7 @@
           <a:lstStyle/>
           <a:p>
             <a:pPr algn="ctr">
-              <a:defRPr sz="3400" b="1">
+              <a:defRPr sz="3000" b="1">
                 <a:solidFill>
                   <a:srgbClr val="FFFFFF"/>
                 </a:solidFill>
@@ -5235,39 +5235,8 @@
         </p:nvSpPr>
         <p:spPr>
           <a:xfrm>
-            <a:off x="457200" y="1280160"/>
-            <a:ext cx="8229600" cy="548640"/>
-          </a:xfrm>
-          <a:prstGeom prst="rect">
-            <a:avLst/>
-          </a:prstGeom>
-          <a:noFill/>
-        </p:spPr>
-        <p:txBody>
-          <a:bodyPr wrap="none">
-            <a:spAutoFit/>
-          </a:bodyPr>
-          <a:lstStyle/>
-          <a:p>
-            <a:pPr algn="ctr">
-              <a:defRPr sz="3000" b="1"/>
-            </a:pPr>
-            <a:r>
-              <a:t>La pregunta no es solo "¿cómo diferenciamos?"</a:t>
-            </a:r>
-          </a:p>
-        </p:txBody>
-      </p:sp>
-      <p:sp>
-        <p:nvSpPr>
-          <p:cNvPr id="5" name="TextBox 4"/>
-          <p:cNvSpPr txBox="1"/>
-          <p:nvPr/>
-        </p:nvSpPr>
-        <p:spPr>
-          <a:xfrm>
-            <a:off x="457200" y="2011680"/>
-            <a:ext cx="8229600" cy="731520"/>
+            <a:off x="457200" y="1097280"/>
+            <a:ext cx="8229600" cy="640080"/>
           </a:xfrm>
           <a:prstGeom prst="rect">
             <a:avLst/>
@@ -5281,7 +5250,38 @@
           <a:lstStyle/>
           <a:p>
             <a:pPr algn="ctr">
-              <a:defRPr sz="2800" b="1">
+              <a:defRPr sz="2900" b="1"/>
+            </a:pPr>
+            <a:r>
+              <a:t>La pregunta no es solo "¿cómo diferenciamos?"</a:t>
+            </a:r>
+          </a:p>
+        </p:txBody>
+      </p:sp>
+      <p:sp>
+        <p:nvSpPr>
+          <p:cNvPr id="5" name="TextBox 4"/>
+          <p:cNvSpPr txBox="1"/>
+          <p:nvPr/>
+        </p:nvSpPr>
+        <p:spPr>
+          <a:xfrm>
+            <a:off x="457200" y="1828800"/>
+            <a:ext cx="8229600" cy="822960"/>
+          </a:xfrm>
+          <a:prstGeom prst="rect">
+            <a:avLst/>
+          </a:prstGeom>
+          <a:noFill/>
+        </p:spPr>
+        <p:txBody>
+          <a:bodyPr wrap="square">
+            <a:spAutoFit/>
+          </a:bodyPr>
+          <a:lstStyle/>
+          <a:p>
+            <a:pPr algn="ctr">
+              <a:defRPr sz="2700" b="1">
                 <a:solidFill>
                   <a:srgbClr val="C0392B"/>
                 </a:solidFill>
@@ -5301,8 +5301,8 @@
         </p:nvSpPr>
         <p:spPr>
           <a:xfrm>
-            <a:off x="914400" y="3200400"/>
-            <a:ext cx="7315200" cy="548640"/>
+            <a:off x="914400" y="2926080"/>
+            <a:ext cx="7315200" cy="640080"/>
           </a:xfrm>
           <a:prstGeom prst="rect">
             <a:avLst/>
@@ -5316,7 +5316,7 @@
           <a:lstStyle/>
           <a:p>
             <a:pPr>
-              <a:defRPr sz="2600" b="1"/>
+              <a:defRPr sz="2500" b="1"/>
             </a:pPr>
             <a:r>
               <a:t>• Es performativo: se practica y se expresa</a:t>
@@ -5332,8 +5332,8 @@
         </p:nvSpPr>
         <p:spPr>
           <a:xfrm>
-            <a:off x="914400" y="3931920"/>
-            <a:ext cx="7315200" cy="548640"/>
+            <a:off x="914400" y="3657600"/>
+            <a:ext cx="7315200" cy="640080"/>
           </a:xfrm>
           <a:prstGeom prst="rect">
             <a:avLst/>
@@ -5347,7 +5347,7 @@
           <a:lstStyle/>
           <a:p>
             <a:pPr>
-              <a:defRPr sz="2600" b="1"/>
+              <a:defRPr sz="2500" b="1"/>
             </a:pPr>
             <a:r>
               <a:t>• Es perceptivo: lo interpretamos con expectativas culturales</a:t>
@@ -5363,8 +5363,8 @@
         </p:nvSpPr>
         <p:spPr>
           <a:xfrm>
-            <a:off x="914400" y="4663440"/>
-            <a:ext cx="7315200" cy="548640"/>
+            <a:off x="914400" y="4389120"/>
+            <a:ext cx="7315200" cy="640080"/>
           </a:xfrm>
           <a:prstGeom prst="rect">
             <a:avLst/>
@@ -5378,7 +5378,7 @@
           <a:lstStyle/>
           <a:p>
             <a:pPr>
-              <a:defRPr sz="2600" b="1"/>
+              <a:defRPr sz="2500" b="1"/>
             </a:pPr>
             <a:r>
               <a:t>• Es dinámico: evoluciona con el desarrollo</a:t>
@@ -5413,7 +5413,7 @@
         <p:spPr>
           <a:xfrm>
             <a:off x="0" y="0"/>
-            <a:ext cx="9144000" cy="914400"/>
+            <a:ext cx="9144000" cy="777240"/>
           </a:xfrm>
           <a:prstGeom prst="rect">
             <a:avLst/>
@@ -5455,8 +5455,8 @@
         </p:nvSpPr>
         <p:spPr>
           <a:xfrm>
-            <a:off x="182880" y="137160"/>
-            <a:ext cx="8778240" cy="640080"/>
+            <a:off x="182880" y="164592"/>
+            <a:ext cx="8778240" cy="457200"/>
           </a:xfrm>
           <a:prstGeom prst="rect">
             <a:avLst/>
@@ -5470,7 +5470,7 @@
           <a:lstStyle/>
           <a:p>
             <a:pPr algn="ctr">
-              <a:defRPr sz="3400" b="1">
+              <a:defRPr sz="3000" b="1">
                 <a:solidFill>
                   <a:srgbClr val="FFFFFF"/>
                 </a:solidFill>
@@ -5490,7 +5490,7 @@
         </p:nvSpPr>
         <p:spPr>
           <a:xfrm>
-            <a:off x="457200" y="1097280"/>
+            <a:off x="457200" y="914400"/>
             <a:ext cx="8229600" cy="548640"/>
           </a:xfrm>
           <a:prstGeom prst="rect">
@@ -5499,13 +5499,13 @@
           <a:noFill/>
         </p:spPr>
         <p:txBody>
-          <a:bodyPr wrap="none">
+          <a:bodyPr wrap="square">
             <a:spAutoFit/>
           </a:bodyPr>
           <a:lstStyle/>
           <a:p>
             <a:pPr algn="ctr">
-              <a:defRPr sz="2600" b="1"/>
+              <a:defRPr sz="2400" b="1"/>
             </a:pPr>
             <a:r>
               <a:t>Escuchad estas voces y responded: ¿es un niño o una niña?</a:t>
@@ -5521,16 +5521,16 @@
         </p:nvSpPr>
         <p:spPr>
           <a:xfrm>
-            <a:off x="1645920" y="1920240"/>
-            <a:ext cx="2743200" cy="2743200"/>
+            <a:off x="1280160" y="1828800"/>
+            <a:ext cx="3017520" cy="4114800"/>
           </a:xfrm>
           <a:prstGeom prst="roundRect">
             <a:avLst/>
           </a:prstGeom>
           <a:solidFill>
-            <a:srgbClr val="ECF0F1"/>
+            <a:srgbClr val="F5F5F5"/>
           </a:solidFill>
-          <a:ln w="38100">
+          <a:ln w="50800">
             <a:solidFill>
               <a:srgbClr val="C0392B"/>
             </a:solidFill>
@@ -5566,8 +5566,8 @@
         </p:nvSpPr>
         <p:spPr>
           <a:xfrm>
-            <a:off x="1828800" y="2194560"/>
-            <a:ext cx="2377440" cy="457200"/>
+            <a:off x="1463040" y="2103120"/>
+            <a:ext cx="2651760" cy="548640"/>
           </a:xfrm>
           <a:prstGeom prst="rect">
             <a:avLst/>
@@ -5581,7 +5581,7 @@
           <a:lstStyle/>
           <a:p>
             <a:pPr algn="ctr">
-              <a:defRPr sz="2800" b="1"/>
+              <a:defRPr sz="3000" b="1"/>
             </a:pPr>
             <a:r>
               <a:t>Audio 1</a:t>
@@ -5614,8 +5614,8 @@
         </p:blipFill>
         <p:spPr>
           <a:xfrm>
-            <a:off x="2286000" y="2834640"/>
-            <a:ext cx="1371600" cy="1371600"/>
+            <a:off x="1965960" y="2926080"/>
+            <a:ext cx="1645920" cy="1645920"/>
           </a:xfrm>
           <a:prstGeom prst="rect">
             <a:avLst/>
@@ -5630,16 +5630,16 @@
         </p:nvSpPr>
         <p:spPr>
           <a:xfrm>
-            <a:off x="5303520" y="1920240"/>
-            <a:ext cx="2743200" cy="2743200"/>
+            <a:off x="4846320" y="1828800"/>
+            <a:ext cx="3017520" cy="4114800"/>
           </a:xfrm>
           <a:prstGeom prst="roundRect">
             <a:avLst/>
           </a:prstGeom>
           <a:solidFill>
-            <a:srgbClr val="ECF0F1"/>
+            <a:srgbClr val="F5F5F5"/>
           </a:solidFill>
-          <a:ln w="38100">
+          <a:ln w="50800">
             <a:solidFill>
               <a:srgbClr val="C0392B"/>
             </a:solidFill>
@@ -5675,8 +5675,8 @@
         </p:nvSpPr>
         <p:spPr>
           <a:xfrm>
-            <a:off x="5486400" y="2194560"/>
-            <a:ext cx="2377440" cy="457200"/>
+            <a:off x="5029200" y="2103120"/>
+            <a:ext cx="2651760" cy="548640"/>
           </a:xfrm>
           <a:prstGeom prst="rect">
             <a:avLst/>
@@ -5690,7 +5690,7 @@
           <a:lstStyle/>
           <a:p>
             <a:pPr algn="ctr">
-              <a:defRPr sz="2800" b="1"/>
+              <a:defRPr sz="3000" b="1"/>
             </a:pPr>
             <a:r>
               <a:t>Audio 2</a:t>
@@ -5723,8 +5723,8 @@
         </p:blipFill>
         <p:spPr>
           <a:xfrm>
-            <a:off x="5943600" y="2834640"/>
-            <a:ext cx="1371600" cy="1371600"/>
+            <a:off x="5532120" y="2926080"/>
+            <a:ext cx="1645920" cy="1645920"/>
           </a:xfrm>
           <a:prstGeom prst="rect">
             <a:avLst/>
@@ -5792,7 +5792,7 @@
         <p:spPr>
           <a:xfrm>
             <a:off x="0" y="0"/>
-            <a:ext cx="9144000" cy="914400"/>
+            <a:ext cx="9144000" cy="777240"/>
           </a:xfrm>
           <a:prstGeom prst="rect">
             <a:avLst/>
@@ -5834,8 +5834,8 @@
         </p:nvSpPr>
         <p:spPr>
           <a:xfrm>
-            <a:off x="182880" y="137160"/>
-            <a:ext cx="8778240" cy="640080"/>
+            <a:off x="182880" y="164592"/>
+            <a:ext cx="8778240" cy="457200"/>
           </a:xfrm>
           <a:prstGeom prst="rect">
             <a:avLst/>
@@ -5849,7 +5849,7 @@
           <a:lstStyle/>
           <a:p>
             <a:pPr algn="ctr">
-              <a:defRPr sz="3400" b="1">
+              <a:defRPr sz="3000" b="1">
                 <a:solidFill>
                   <a:srgbClr val="FFFFFF"/>
                 </a:solidFill>
@@ -5869,8 +5869,8 @@
         </p:nvSpPr>
         <p:spPr>
           <a:xfrm>
-            <a:off x="457200" y="1371600"/>
-            <a:ext cx="8229600" cy="731520"/>
+            <a:off x="457200" y="1188720"/>
+            <a:ext cx="8229600" cy="822960"/>
           </a:xfrm>
           <a:prstGeom prst="rect">
             <a:avLst/>
@@ -5884,7 +5884,7 @@
           <a:lstStyle/>
           <a:p>
             <a:pPr>
-              <a:defRPr sz="2200"/>
+              <a:defRPr sz="2100"/>
             </a:pPr>
             <a:r>
               <a:t>1. ¿Creéis que los niños son conscientes de que modifican su voz para sonar más "masculinos" o "femeninos"?</a:t>
@@ -5900,8 +5900,8 @@
         </p:nvSpPr>
         <p:spPr>
           <a:xfrm>
-            <a:off x="457200" y="2468880"/>
-            <a:ext cx="8229600" cy="731520"/>
+            <a:off x="457200" y="2194560"/>
+            <a:ext cx="8229600" cy="822960"/>
           </a:xfrm>
           <a:prstGeom prst="rect">
             <a:avLst/>
@@ -5915,7 +5915,7 @@
           <a:lstStyle/>
           <a:p>
             <a:pPr>
-              <a:defRPr sz="2200"/>
+              <a:defRPr sz="2100"/>
             </a:pPr>
             <a:r>
               <a:t>2. Si las diferencias anatómicas son mínimas, ¿de dónde aprenden los niños estos patrones vocales?</a:t>
@@ -5931,8 +5931,8 @@
         </p:nvSpPr>
         <p:spPr>
           <a:xfrm>
-            <a:off x="457200" y="3566160"/>
-            <a:ext cx="8229600" cy="731520"/>
+            <a:off x="457200" y="3200400"/>
+            <a:ext cx="8229600" cy="822960"/>
           </a:xfrm>
           <a:prstGeom prst="rect">
             <a:avLst/>
@@ -5946,7 +5946,7 @@
           <a:lstStyle/>
           <a:p>
             <a:pPr>
-              <a:defRPr sz="2200"/>
+              <a:defRPr sz="2100"/>
             </a:pPr>
             <a:r>
               <a:t>3. ¿Qué implicaciones tiene esto para nuestra comprensión del género como constructo social vs biológico?</a:t>
@@ -5962,8 +5962,8 @@
         </p:nvSpPr>
         <p:spPr>
           <a:xfrm>
-            <a:off x="457200" y="4663440"/>
-            <a:ext cx="8229600" cy="731520"/>
+            <a:off x="457200" y="4206240"/>
+            <a:ext cx="8229600" cy="822960"/>
           </a:xfrm>
           <a:prstGeom prst="rect">
             <a:avLst/>
@@ -5977,7 +5977,7 @@
           <a:lstStyle/>
           <a:p>
             <a:pPr>
-              <a:defRPr sz="2200"/>
+              <a:defRPr sz="2100"/>
             </a:pPr>
             <a:r>
               <a:t>4. ¿Debería esto cambiar nuestra aproximación a la terapia de voz para niños transgénero?</a:t>
@@ -6012,7 +6012,7 @@
         <p:spPr>
           <a:xfrm>
             <a:off x="0" y="0"/>
-            <a:ext cx="9144000" cy="914400"/>
+            <a:ext cx="9144000" cy="777240"/>
           </a:xfrm>
           <a:prstGeom prst="rect">
             <a:avLst/>
@@ -6054,8 +6054,8 @@
         </p:nvSpPr>
         <p:spPr>
           <a:xfrm>
-            <a:off x="182880" y="137160"/>
-            <a:ext cx="8778240" cy="640080"/>
+            <a:off x="182880" y="164592"/>
+            <a:ext cx="8778240" cy="457200"/>
           </a:xfrm>
           <a:prstGeom prst="rect">
             <a:avLst/>
@@ -6069,7 +6069,7 @@
           <a:lstStyle/>
           <a:p>
             <a:pPr algn="ctr">
-              <a:defRPr sz="3400" b="1">
+              <a:defRPr sz="3000" b="1">
                 <a:solidFill>
                   <a:srgbClr val="FFFFFF"/>
                 </a:solidFill>
@@ -6089,16 +6089,16 @@
         </p:nvSpPr>
         <p:spPr>
           <a:xfrm>
-            <a:off x="1645920" y="1828800"/>
-            <a:ext cx="2743200" cy="3200400"/>
+            <a:off x="1280160" y="1371600"/>
+            <a:ext cx="3017520" cy="4389120"/>
           </a:xfrm>
           <a:prstGeom prst="roundRect">
             <a:avLst/>
           </a:prstGeom>
           <a:solidFill>
-            <a:srgbClr val="ECF0F1"/>
+            <a:srgbClr val="F5F5F5"/>
           </a:solidFill>
-          <a:ln w="38100">
+          <a:ln w="50800">
             <a:solidFill>
               <a:srgbClr val="C0392B"/>
             </a:solidFill>
@@ -6134,8 +6134,8 @@
         </p:nvSpPr>
         <p:spPr>
           <a:xfrm>
-            <a:off x="1828800" y="2103120"/>
-            <a:ext cx="2377440" cy="457200"/>
+            <a:off x="1463040" y="1645920"/>
+            <a:ext cx="2651760" cy="548640"/>
           </a:xfrm>
           <a:prstGeom prst="rect">
             <a:avLst/>
@@ -6149,7 +6149,7 @@
           <a:lstStyle/>
           <a:p>
             <a:pPr algn="ctr">
-              <a:defRPr sz="2800" b="1"/>
+              <a:defRPr sz="3000" b="1"/>
             </a:pPr>
             <a:r>
               <a:t>Audio 3</a:t>
@@ -6182,8 +6182,8 @@
         </p:blipFill>
         <p:spPr>
           <a:xfrm>
-            <a:off x="2286000" y="2926080"/>
-            <a:ext cx="1371600" cy="1371600"/>
+            <a:off x="1965960" y="2560320"/>
+            <a:ext cx="1645920" cy="1645920"/>
           </a:xfrm>
           <a:prstGeom prst="rect">
             <a:avLst/>
@@ -6198,16 +6198,16 @@
         </p:nvSpPr>
         <p:spPr>
           <a:xfrm>
-            <a:off x="5303520" y="1828800"/>
-            <a:ext cx="2743200" cy="3200400"/>
+            <a:off x="4846320" y="1371600"/>
+            <a:ext cx="3017520" cy="4389120"/>
           </a:xfrm>
           <a:prstGeom prst="roundRect">
             <a:avLst/>
           </a:prstGeom>
           <a:solidFill>
-            <a:srgbClr val="ECF0F1"/>
+            <a:srgbClr val="F5F5F5"/>
           </a:solidFill>
-          <a:ln w="38100">
+          <a:ln w="50800">
             <a:solidFill>
               <a:srgbClr val="C0392B"/>
             </a:solidFill>
@@ -6243,8 +6243,8 @@
         </p:nvSpPr>
         <p:spPr>
           <a:xfrm>
-            <a:off x="5486400" y="2103120"/>
-            <a:ext cx="2377440" cy="457200"/>
+            <a:off x="5029200" y="1645920"/>
+            <a:ext cx="2651760" cy="548640"/>
           </a:xfrm>
           <a:prstGeom prst="rect">
             <a:avLst/>
@@ -6258,7 +6258,7 @@
           <a:lstStyle/>
           <a:p>
             <a:pPr algn="ctr">
-              <a:defRPr sz="2800" b="1"/>
+              <a:defRPr sz="3000" b="1"/>
             </a:pPr>
             <a:r>
               <a:t>Audio 4</a:t>
@@ -6291,8 +6291,8 @@
         </p:blipFill>
         <p:spPr>
           <a:xfrm>
-            <a:off x="5943600" y="2926080"/>
-            <a:ext cx="1371600" cy="1371600"/>
+            <a:off x="5532120" y="2560320"/>
+            <a:ext cx="1645920" cy="1645920"/>
           </a:xfrm>
           <a:prstGeom prst="rect">
             <a:avLst/>
@@ -6360,7 +6360,7 @@
         <p:spPr>
           <a:xfrm>
             <a:off x="0" y="0"/>
-            <a:ext cx="9144000" cy="914400"/>
+            <a:ext cx="9144000" cy="777240"/>
           </a:xfrm>
           <a:prstGeom prst="rect">
             <a:avLst/>
@@ -6402,8 +6402,8 @@
         </p:nvSpPr>
         <p:spPr>
           <a:xfrm>
-            <a:off x="182880" y="137160"/>
-            <a:ext cx="8778240" cy="640080"/>
+            <a:off x="182880" y="164592"/>
+            <a:ext cx="8778240" cy="457200"/>
           </a:xfrm>
           <a:prstGeom prst="rect">
             <a:avLst/>
@@ -6417,7 +6417,7 @@
           <a:lstStyle/>
           <a:p>
             <a:pPr algn="ctr">
-              <a:defRPr sz="3400" b="1">
+              <a:defRPr sz="3000" b="1">
                 <a:solidFill>
                   <a:srgbClr val="FFFFFF"/>
                 </a:solidFill>
@@ -6437,16 +6437,16 @@
         </p:nvSpPr>
         <p:spPr>
           <a:xfrm>
-            <a:off x="1645920" y="1371600"/>
-            <a:ext cx="2743200" cy="2743200"/>
+            <a:off x="1280160" y="1188720"/>
+            <a:ext cx="3017520" cy="3657600"/>
           </a:xfrm>
           <a:prstGeom prst="roundRect">
             <a:avLst/>
           </a:prstGeom>
           <a:solidFill>
-            <a:srgbClr val="ECF0F1"/>
+            <a:srgbClr val="F5F5F5"/>
           </a:solidFill>
-          <a:ln w="38100">
+          <a:ln w="50800">
             <a:solidFill>
               <a:srgbClr val="C0392B"/>
             </a:solidFill>
@@ -6482,8 +6482,8 @@
         </p:nvSpPr>
         <p:spPr>
           <a:xfrm>
-            <a:off x="1828800" y="1645920"/>
-            <a:ext cx="2377440" cy="457200"/>
+            <a:off x="1463040" y="1463040"/>
+            <a:ext cx="2651760" cy="548640"/>
           </a:xfrm>
           <a:prstGeom prst="rect">
             <a:avLst/>
@@ -6497,7 +6497,7 @@
           <a:lstStyle/>
           <a:p>
             <a:pPr algn="ctr">
-              <a:defRPr sz="2800" b="1"/>
+              <a:defRPr sz="3000" b="1"/>
             </a:pPr>
             <a:r>
               <a:t>Audio 5</a:t>
@@ -6530,8 +6530,8 @@
         </p:blipFill>
         <p:spPr>
           <a:xfrm>
-            <a:off x="2286000" y="2286000"/>
-            <a:ext cx="1371600" cy="1371600"/>
+            <a:off x="1965960" y="2286000"/>
+            <a:ext cx="1645920" cy="1645920"/>
           </a:xfrm>
           <a:prstGeom prst="rect">
             <a:avLst/>
@@ -6546,16 +6546,16 @@
         </p:nvSpPr>
         <p:spPr>
           <a:xfrm>
-            <a:off x="5303520" y="1371600"/>
-            <a:ext cx="2743200" cy="2743200"/>
+            <a:off x="4846320" y="1188720"/>
+            <a:ext cx="3017520" cy="3657600"/>
           </a:xfrm>
           <a:prstGeom prst="roundRect">
             <a:avLst/>
           </a:prstGeom>
           <a:solidFill>
-            <a:srgbClr val="ECF0F1"/>
+            <a:srgbClr val="F5F5F5"/>
           </a:solidFill>
-          <a:ln w="38100">
+          <a:ln w="50800">
             <a:solidFill>
               <a:srgbClr val="C0392B"/>
             </a:solidFill>
@@ -6591,8 +6591,8 @@
         </p:nvSpPr>
         <p:spPr>
           <a:xfrm>
-            <a:off x="5486400" y="1645920"/>
-            <a:ext cx="2377440" cy="457200"/>
+            <a:off x="5029200" y="1463040"/>
+            <a:ext cx="2651760" cy="548640"/>
           </a:xfrm>
           <a:prstGeom prst="rect">
             <a:avLst/>
@@ -6606,7 +6606,7 @@
           <a:lstStyle/>
           <a:p>
             <a:pPr algn="ctr">
-              <a:defRPr sz="2800" b="1"/>
+              <a:defRPr sz="3000" b="1"/>
             </a:pPr>
             <a:r>
               <a:t>Audio 6</a:t>
@@ -6639,8 +6639,8 @@
         </p:blipFill>
         <p:spPr>
           <a:xfrm>
-            <a:off x="5943600" y="2286000"/>
-            <a:ext cx="1371600" cy="1371600"/>
+            <a:off x="5532120" y="2286000"/>
+            <a:ext cx="1645920" cy="1645920"/>
           </a:xfrm>
           <a:prstGeom prst="rect">
             <a:avLst/>
@@ -6655,8 +6655,8 @@
         </p:nvSpPr>
         <p:spPr>
           <a:xfrm>
-            <a:off x="457200" y="5029200"/>
-            <a:ext cx="8229600" cy="1371600"/>
+            <a:off x="457200" y="5303520"/>
+            <a:ext cx="8229600" cy="1188720"/>
           </a:xfrm>
           <a:prstGeom prst="rect">
             <a:avLst/>
@@ -6748,7 +6748,7 @@
         <p:spPr>
           <a:xfrm>
             <a:off x="0" y="0"/>
-            <a:ext cx="9144000" cy="914400"/>
+            <a:ext cx="9144000" cy="777240"/>
           </a:xfrm>
           <a:prstGeom prst="rect">
             <a:avLst/>
@@ -6790,8 +6790,8 @@
         </p:nvSpPr>
         <p:spPr>
           <a:xfrm>
-            <a:off x="182880" y="137160"/>
-            <a:ext cx="8778240" cy="640080"/>
+            <a:off x="182880" y="164592"/>
+            <a:ext cx="8778240" cy="457200"/>
           </a:xfrm>
           <a:prstGeom prst="rect">
             <a:avLst/>
@@ -6805,7 +6805,7 @@
           <a:lstStyle/>
           <a:p>
             <a:pPr algn="ctr">
-              <a:defRPr sz="3400" b="1">
+              <a:defRPr sz="3000" b="1">
                 <a:solidFill>
                   <a:srgbClr val="FFFFFF"/>
                 </a:solidFill>
@@ -6825,7 +6825,7 @@
         </p:nvSpPr>
         <p:spPr>
           <a:xfrm>
-            <a:off x="457200" y="1188720"/>
+            <a:off x="457200" y="960120"/>
             <a:ext cx="8229600" cy="457200"/>
           </a:xfrm>
           <a:prstGeom prst="rect">
@@ -6840,7 +6840,7 @@
           <a:lstStyle/>
           <a:p>
             <a:pPr>
-              <a:defRPr sz="2800" b="1">
+              <a:defRPr sz="2600" b="1">
                 <a:solidFill>
                   <a:srgbClr val="34495E"/>
                 </a:solidFill>
@@ -6860,7 +6860,7 @@
         </p:nvSpPr>
         <p:spPr>
           <a:xfrm>
-            <a:off x="640080" y="1828800"/>
+            <a:off x="640080" y="1508760"/>
             <a:ext cx="7863840" cy="914400"/>
           </a:xfrm>
           <a:prstGeom prst="rect">
@@ -6875,7 +6875,7 @@
           <a:lstStyle/>
           <a:p>
             <a:pPr>
-              <a:defRPr sz="2400"/>
+              <a:defRPr sz="2300"/>
             </a:pPr>
             <a:r>
               <a:t>Según Funk &amp; Simpson (2023), identificamos el género de voces infantiles con una precisión del 70-84%, muy por encima del azar, pero:</a:t>
@@ -6891,14 +6891,14 @@
         </p:nvSpPr>
         <p:spPr>
           <a:xfrm>
-            <a:off x="731520" y="2926080"/>
-            <a:ext cx="7680960" cy="1645920"/>
+            <a:off x="731520" y="2514600"/>
+            <a:ext cx="7680960" cy="1554480"/>
           </a:xfrm>
           <a:prstGeom prst="roundRect">
             <a:avLst/>
           </a:prstGeom>
           <a:solidFill>
-            <a:srgbClr val="ECF0F1"/>
+            <a:srgbClr val="F5F5F5"/>
           </a:solidFill>
           <a:ln w="25400">
             <a:solidFill>
@@ -6936,7 +6936,7 @@
         </p:nvSpPr>
         <p:spPr>
           <a:xfrm>
-            <a:off x="1097280" y="3108960"/>
+            <a:off x="1097280" y="2651760"/>
             <a:ext cx="6949440" cy="1280160"/>
           </a:xfrm>
           <a:prstGeom prst="rect">
@@ -6951,7 +6951,7 @@
           <a:lstStyle/>
           <a:p>
             <a:pPr>
-              <a:defRPr sz="2200" i="1">
+              <a:defRPr sz="2100" i="1">
                 <a:solidFill>
                   <a:srgbClr val="34495E"/>
                 </a:solidFill>
@@ -6977,8 +6977,8 @@
         </p:nvSpPr>
         <p:spPr>
           <a:xfrm>
-            <a:off x="457200" y="4754880"/>
-            <a:ext cx="8229600" cy="731520"/>
+            <a:off x="457200" y="4251960"/>
+            <a:ext cx="8229600" cy="822960"/>
           </a:xfrm>
           <a:prstGeom prst="rect">
             <a:avLst/>
@@ -6986,7 +6986,7 @@
           <a:noFill/>
         </p:spPr>
         <p:txBody>
-          <a:bodyPr wrap="none">
+          <a:bodyPr wrap="square">
             <a:spAutoFit/>
           </a:bodyPr>
           <a:lstStyle/>
@@ -7031,7 +7031,7 @@
         <p:spPr>
           <a:xfrm>
             <a:off x="0" y="0"/>
-            <a:ext cx="9144000" cy="914400"/>
+            <a:ext cx="9144000" cy="777240"/>
           </a:xfrm>
           <a:prstGeom prst="rect">
             <a:avLst/>
@@ -7073,8 +7073,8 @@
         </p:nvSpPr>
         <p:spPr>
           <a:xfrm>
-            <a:off x="182880" y="137160"/>
-            <a:ext cx="8778240" cy="640080"/>
+            <a:off x="182880" y="164592"/>
+            <a:ext cx="8778240" cy="457200"/>
           </a:xfrm>
           <a:prstGeom prst="rect">
             <a:avLst/>
@@ -7088,7 +7088,7 @@
           <a:lstStyle/>
           <a:p>
             <a:pPr algn="ctr">
-              <a:defRPr sz="3400" b="1">
+              <a:defRPr sz="3000" b="1">
                 <a:solidFill>
                   <a:srgbClr val="FFFFFF"/>
                 </a:solidFill>
@@ -7108,7 +7108,7 @@
         </p:nvSpPr>
         <p:spPr>
           <a:xfrm>
-            <a:off x="457200" y="1097280"/>
+            <a:off x="457200" y="914400"/>
             <a:ext cx="8229600" cy="365760"/>
           </a:xfrm>
           <a:prstGeom prst="rect">
@@ -7123,7 +7123,7 @@
           <a:lstStyle/>
           <a:p>
             <a:pPr>
-              <a:defRPr sz="2400">
+              <a:defRPr sz="2200">
                 <a:solidFill>
                   <a:srgbClr val="34495E"/>
                 </a:solidFill>
@@ -7144,8 +7144,8 @@
           <p:nvPr/>
         </p:nvGraphicFramePr>
         <p:xfrm>
-          <a:off x="182880" y="1645920"/>
-          <a:ext cx="8778240" cy="4114800"/>
+          <a:off x="137160" y="1371600"/>
+          <a:ext cx="8869680" cy="4389120"/>
         </p:xfrm>
         <a:graphic>
           <a:graphicData uri="http://schemas.openxmlformats.org/drawingml/2006/table">
@@ -7154,22 +7154,22 @@
                 <a:tableStyleId>{5C22544A-7EE6-4342-B048-85BDC9FD1C3A}</a:tableStyleId>
               </a:tblPr>
               <a:tblGrid>
-                <a:gridCol w="1254034"/>
-                <a:gridCol w="1254034"/>
-                <a:gridCol w="1254034"/>
-                <a:gridCol w="1254034"/>
-                <a:gridCol w="1254034"/>
-                <a:gridCol w="1254034"/>
-                <a:gridCol w="1254036"/>
+                <a:gridCol w="1267097"/>
+                <a:gridCol w="1267097"/>
+                <a:gridCol w="1267097"/>
+                <a:gridCol w="1267097"/>
+                <a:gridCol w="1267097"/>
+                <a:gridCol w="1267097"/>
+                <a:gridCol w="1267098"/>
               </a:tblGrid>
-              <a:tr h="587828">
+              <a:tr h="627017">
                 <a:tc>
                   <a:txBody>
                     <a:bodyPr/>
                     <a:lstStyle/>
                     <a:p>
                       <a:pPr algn="ctr">
-                        <a:defRPr sz="1800" b="1">
+                        <a:defRPr sz="1700" b="1">
                           <a:solidFill>
                             <a:srgbClr val="FFFFFF"/>
                           </a:solidFill>
@@ -7192,7 +7192,7 @@
                     <a:lstStyle/>
                     <a:p>
                       <a:pPr algn="ctr">
-                        <a:defRPr sz="1800" b="1">
+                        <a:defRPr sz="1700" b="1">
                           <a:solidFill>
                             <a:srgbClr val="FFFFFF"/>
                           </a:solidFill>
@@ -7215,7 +7215,7 @@
                     <a:lstStyle/>
                     <a:p>
                       <a:pPr algn="ctr">
-                        <a:defRPr sz="1800" b="1">
+                        <a:defRPr sz="1700" b="1">
                           <a:solidFill>
                             <a:srgbClr val="FFFFFF"/>
                           </a:solidFill>
@@ -7238,7 +7238,7 @@
                     <a:lstStyle/>
                     <a:p>
                       <a:pPr algn="ctr">
-                        <a:defRPr sz="1800" b="1">
+                        <a:defRPr sz="1700" b="1">
                           <a:solidFill>
                             <a:srgbClr val="FFFFFF"/>
                           </a:solidFill>
@@ -7261,7 +7261,7 @@
                     <a:lstStyle/>
                     <a:p>
                       <a:pPr algn="ctr">
-                        <a:defRPr sz="1800" b="1">
+                        <a:defRPr sz="1700" b="1">
                           <a:solidFill>
                             <a:srgbClr val="FFFFFF"/>
                           </a:solidFill>
@@ -7284,7 +7284,7 @@
                     <a:lstStyle/>
                     <a:p>
                       <a:pPr algn="ctr">
-                        <a:defRPr sz="1800" b="1">
+                        <a:defRPr sz="1700" b="1">
                           <a:solidFill>
                             <a:srgbClr val="FFFFFF"/>
                           </a:solidFill>
@@ -7307,7 +7307,7 @@
                     <a:lstStyle/>
                     <a:p>
                       <a:pPr algn="ctr">
-                        <a:defRPr sz="1800" b="1">
+                        <a:defRPr sz="1700" b="1">
                           <a:solidFill>
                             <a:srgbClr val="FFFFFF"/>
                           </a:solidFill>
@@ -7325,14 +7325,14 @@
                   </a:tcPr>
                 </a:tc>
               </a:tr>
-              <a:tr h="587828">
+              <a:tr h="627017">
                 <a:tc>
                   <a:txBody>
                     <a:bodyPr/>
                     <a:lstStyle/>
                     <a:p>
                       <a:pPr algn="ctr">
-                        <a:defRPr sz="1600"/>
+                        <a:defRPr sz="1500"/>
                       </a:pPr>
                       <a:r>
                         <a:t>Niña 1</a:t>
@@ -7341,7 +7341,7 @@
                   </a:txBody>
                   <a:tcPr>
                     <a:solidFill>
-                      <a:srgbClr val="FAFAFA"/>
+                      <a:srgbClr val="FCFCFC"/>
                     </a:solidFill>
                   </a:tcPr>
                 </a:tc>
@@ -7351,7 +7351,7 @@
                     <a:lstStyle/>
                     <a:p>
                       <a:pPr algn="ctr">
-                        <a:defRPr sz="1600"/>
+                        <a:defRPr sz="1500"/>
                       </a:pPr>
                       <a:r>
                         <a:t>4</a:t>
@@ -7360,7 +7360,7 @@
                   </a:txBody>
                   <a:tcPr>
                     <a:solidFill>
-                      <a:srgbClr val="FAFAFA"/>
+                      <a:srgbClr val="FCFCFC"/>
                     </a:solidFill>
                   </a:tcPr>
                 </a:tc>
@@ -7370,7 +7370,7 @@
                     <a:lstStyle/>
                     <a:p>
                       <a:pPr algn="ctr">
-                        <a:defRPr sz="1600"/>
+                        <a:defRPr sz="1500"/>
                       </a:pPr>
                       <a:r>
                         <a:t>28</a:t>
@@ -7379,7 +7379,7 @@
                   </a:txBody>
                   <a:tcPr>
                     <a:solidFill>
-                      <a:srgbClr val="FAFAFA"/>
+                      <a:srgbClr val="FCFCFC"/>
                     </a:solidFill>
                   </a:tcPr>
                 </a:tc>
@@ -7389,7 +7389,7 @@
                     <a:lstStyle/>
                     <a:p>
                       <a:pPr algn="ctr">
-                        <a:defRPr sz="1600"/>
+                        <a:defRPr sz="1500"/>
                       </a:pPr>
                       <a:r>
                         <a:t>300±38</a:t>
@@ -7398,7 +7398,7 @@
                   </a:txBody>
                   <a:tcPr>
                     <a:solidFill>
-                      <a:srgbClr val="FAFAFA"/>
+                      <a:srgbClr val="FCFCFC"/>
                     </a:solidFill>
                   </a:tcPr>
                 </a:tc>
@@ -7408,7 +7408,7 @@
                     <a:lstStyle/>
                     <a:p>
                       <a:pPr algn="ctr">
-                        <a:defRPr sz="1600"/>
+                        <a:defRPr sz="1500"/>
                       </a:pPr>
                       <a:r>
                         <a:t>678±206</a:t>
@@ -7417,7 +7417,7 @@
                   </a:txBody>
                   <a:tcPr>
                     <a:solidFill>
-                      <a:srgbClr val="FAFAFA"/>
+                      <a:srgbClr val="FCFCFC"/>
                     </a:solidFill>
                   </a:tcPr>
                 </a:tc>
@@ -7427,7 +7427,7 @@
                     <a:lstStyle/>
                     <a:p>
                       <a:pPr algn="ctr">
-                        <a:defRPr sz="1600"/>
+                        <a:defRPr sz="1500"/>
                       </a:pPr>
                       <a:r>
                         <a:t>1603±682</a:t>
@@ -7436,7 +7436,7 @@
                   </a:txBody>
                   <a:tcPr>
                     <a:solidFill>
-                      <a:srgbClr val="FAFAFA"/>
+                      <a:srgbClr val="FCFCFC"/>
                     </a:solidFill>
                   </a:tcPr>
                 </a:tc>
@@ -7446,7 +7446,7 @@
                     <a:lstStyle/>
                     <a:p>
                       <a:pPr algn="ctr">
-                        <a:defRPr sz="1600"/>
+                        <a:defRPr sz="1500"/>
                       </a:pPr>
                       <a:r>
                         <a:t>2918±494</a:t>
@@ -7455,19 +7455,19 @@
                   </a:txBody>
                   <a:tcPr>
                     <a:solidFill>
-                      <a:srgbClr val="FAFAFA"/>
+                      <a:srgbClr val="FCFCFC"/>
                     </a:solidFill>
                   </a:tcPr>
                 </a:tc>
               </a:tr>
-              <a:tr h="587828">
+              <a:tr h="627017">
                 <a:tc>
                   <a:txBody>
                     <a:bodyPr/>
                     <a:lstStyle/>
                     <a:p>
                       <a:pPr algn="ctr">
-                        <a:defRPr sz="1600"/>
+                        <a:defRPr sz="1500"/>
                       </a:pPr>
                       <a:r>
                         <a:t>Niña 2</a:t>
@@ -7482,7 +7482,7 @@
                     <a:lstStyle/>
                     <a:p>
                       <a:pPr algn="ctr">
-                        <a:defRPr sz="1600"/>
+                        <a:defRPr sz="1500"/>
                       </a:pPr>
                       <a:r>
                         <a:t>1</a:t>
@@ -7497,7 +7497,7 @@
                     <a:lstStyle/>
                     <a:p>
                       <a:pPr algn="ctr">
-                        <a:defRPr sz="1600"/>
+                        <a:defRPr sz="1500"/>
                       </a:pPr>
                       <a:r>
                         <a:t>16</a:t>
@@ -7512,7 +7512,7 @@
                     <a:lstStyle/>
                     <a:p>
                       <a:pPr algn="ctr">
-                        <a:defRPr sz="1600"/>
+                        <a:defRPr sz="1500"/>
                       </a:pPr>
                       <a:r>
                         <a:t>259±39</a:t>
@@ -7527,7 +7527,7 @@
                     <a:lstStyle/>
                     <a:p>
                       <a:pPr algn="ctr">
-                        <a:defRPr sz="1600"/>
+                        <a:defRPr sz="1500"/>
                       </a:pPr>
                       <a:r>
                         <a:t>702±186</a:t>
@@ -7542,7 +7542,7 @@
                     <a:lstStyle/>
                     <a:p>
                       <a:pPr algn="ctr">
-                        <a:defRPr sz="1600"/>
+                        <a:defRPr sz="1500"/>
                       </a:pPr>
                       <a:r>
                         <a:t>1376±339</a:t>
@@ -7557,7 +7557,7 @@
                     <a:lstStyle/>
                     <a:p>
                       <a:pPr algn="ctr">
-                        <a:defRPr sz="1600"/>
+                        <a:defRPr sz="1500"/>
                       </a:pPr>
                       <a:r>
                         <a:t>2568±583</a:t>
@@ -7567,14 +7567,14 @@
                   <a:tcPr/>
                 </a:tc>
               </a:tr>
-              <a:tr h="587828">
+              <a:tr h="627017">
                 <a:tc>
                   <a:txBody>
                     <a:bodyPr/>
                     <a:lstStyle/>
                     <a:p>
                       <a:pPr algn="ctr">
-                        <a:defRPr sz="1600"/>
+                        <a:defRPr sz="1500"/>
                       </a:pPr>
                       <a:r>
                         <a:t>Niña 3</a:t>
@@ -7583,7 +7583,7 @@
                   </a:txBody>
                   <a:tcPr>
                     <a:solidFill>
-                      <a:srgbClr val="FAFAFA"/>
+                      <a:srgbClr val="FCFCFC"/>
                     </a:solidFill>
                   </a:tcPr>
                 </a:tc>
@@ -7593,7 +7593,7 @@
                     <a:lstStyle/>
                     <a:p>
                       <a:pPr algn="ctr">
-                        <a:defRPr sz="1600"/>
+                        <a:defRPr sz="1500"/>
                       </a:pPr>
                       <a:r>
                         <a:t>3</a:t>
@@ -7602,7 +7602,7 @@
                   </a:txBody>
                   <a:tcPr>
                     <a:solidFill>
-                      <a:srgbClr val="FAFAFA"/>
+                      <a:srgbClr val="FCFCFC"/>
                     </a:solidFill>
                   </a:tcPr>
                 </a:tc>
@@ -7612,7 +7612,7 @@
                     <a:lstStyle/>
                     <a:p>
                       <a:pPr algn="ctr">
-                        <a:defRPr sz="1600"/>
+                        <a:defRPr sz="1500"/>
                       </a:pPr>
                       <a:r>
                         <a:t>13</a:t>
@@ -7621,7 +7621,7 @@
                   </a:txBody>
                   <a:tcPr>
                     <a:solidFill>
-                      <a:srgbClr val="FAFAFA"/>
+                      <a:srgbClr val="FCFCFC"/>
                     </a:solidFill>
                   </a:tcPr>
                 </a:tc>
@@ -7631,7 +7631,7 @@
                     <a:lstStyle/>
                     <a:p>
                       <a:pPr algn="ctr">
-                        <a:defRPr sz="1600"/>
+                        <a:defRPr sz="1500"/>
                       </a:pPr>
                       <a:r>
                         <a:t>238±23</a:t>
@@ -7640,7 +7640,7 @@
                   </a:txBody>
                   <a:tcPr>
                     <a:solidFill>
-                      <a:srgbClr val="FAFAFA"/>
+                      <a:srgbClr val="FCFCFC"/>
                     </a:solidFill>
                   </a:tcPr>
                 </a:tc>
@@ -7650,7 +7650,7 @@
                     <a:lstStyle/>
                     <a:p>
                       <a:pPr algn="ctr">
-                        <a:defRPr sz="1600"/>
+                        <a:defRPr sz="1500"/>
                       </a:pPr>
                       <a:r>
                         <a:t>687±130</a:t>
@@ -7659,7 +7659,7 @@
                   </a:txBody>
                   <a:tcPr>
                     <a:solidFill>
-                      <a:srgbClr val="FAFAFA"/>
+                      <a:srgbClr val="FCFCFC"/>
                     </a:solidFill>
                   </a:tcPr>
                 </a:tc>
@@ -7669,7 +7669,7 @@
                     <a:lstStyle/>
                     <a:p>
                       <a:pPr algn="ctr">
-                        <a:defRPr sz="1600"/>
+                        <a:defRPr sz="1500"/>
                       </a:pPr>
                       <a:r>
                         <a:t>1220±356</a:t>
@@ -7678,7 +7678,7 @@
                   </a:txBody>
                   <a:tcPr>
                     <a:solidFill>
-                      <a:srgbClr val="FAFAFA"/>
+                      <a:srgbClr val="FCFCFC"/>
                     </a:solidFill>
                   </a:tcPr>
                 </a:tc>
@@ -7688,7 +7688,7 @@
                     <a:lstStyle/>
                     <a:p>
                       <a:pPr algn="ctr">
-                        <a:defRPr sz="1600"/>
+                        <a:defRPr sz="1500"/>
                       </a:pPr>
                       <a:r>
                         <a:t>2844±633</a:t>
@@ -7697,19 +7697,19 @@
                   </a:txBody>
                   <a:tcPr>
                     <a:solidFill>
-                      <a:srgbClr val="FAFAFA"/>
+                      <a:srgbClr val="FCFCFC"/>
                     </a:solidFill>
                   </a:tcPr>
                 </a:tc>
               </a:tr>
-              <a:tr h="587828">
+              <a:tr h="627017">
                 <a:tc>
                   <a:txBody>
                     <a:bodyPr/>
                     <a:lstStyle/>
                     <a:p>
                       <a:pPr algn="ctr">
-                        <a:defRPr sz="1600"/>
+                        <a:defRPr sz="1500"/>
                       </a:pPr>
                       <a:r>
                         <a:t>Niño 1</a:t>
@@ -7724,7 +7724,7 @@
                     <a:lstStyle/>
                     <a:p>
                       <a:pPr algn="ctr">
-                        <a:defRPr sz="1600"/>
+                        <a:defRPr sz="1500"/>
                       </a:pPr>
                       <a:r>
                         <a:t>7</a:t>
@@ -7739,7 +7739,7 @@
                     <a:lstStyle/>
                     <a:p>
                       <a:pPr algn="ctr">
-                        <a:defRPr sz="1600"/>
+                        <a:defRPr sz="1500"/>
                       </a:pPr>
                       <a:r>
                         <a:t>23</a:t>
@@ -7754,7 +7754,7 @@
                     <a:lstStyle/>
                     <a:p>
                       <a:pPr algn="ctr">
-                        <a:defRPr sz="1600"/>
+                        <a:defRPr sz="1500"/>
                       </a:pPr>
                       <a:r>
                         <a:t>280±34</a:t>
@@ -7769,7 +7769,7 @@
                     <a:lstStyle/>
                     <a:p>
                       <a:pPr algn="ctr">
-                        <a:defRPr sz="1600"/>
+                        <a:defRPr sz="1500"/>
                       </a:pPr>
                       <a:r>
                         <a:t>660±132</a:t>
@@ -7784,7 +7784,7 @@
                     <a:lstStyle/>
                     <a:p>
                       <a:pPr algn="ctr">
-                        <a:defRPr sz="1600"/>
+                        <a:defRPr sz="1500"/>
                       </a:pPr>
                       <a:r>
                         <a:t>1741±494</a:t>
@@ -7799,7 +7799,7 @@
                     <a:lstStyle/>
                     <a:p>
                       <a:pPr algn="ctr">
-                        <a:defRPr sz="1600"/>
+                        <a:defRPr sz="1500"/>
                       </a:pPr>
                       <a:r>
                         <a:t>2697±406</a:t>
@@ -7809,14 +7809,14 @@
                   <a:tcPr/>
                 </a:tc>
               </a:tr>
-              <a:tr h="587828">
+              <a:tr h="627017">
                 <a:tc>
                   <a:txBody>
                     <a:bodyPr/>
                     <a:lstStyle/>
                     <a:p>
                       <a:pPr algn="ctr">
-                        <a:defRPr sz="1600"/>
+                        <a:defRPr sz="1500"/>
                       </a:pPr>
                       <a:r>
                         <a:t>Niño 2</a:t>
@@ -7825,7 +7825,7 @@
                   </a:txBody>
                   <a:tcPr>
                     <a:solidFill>
-                      <a:srgbClr val="FAFAFA"/>
+                      <a:srgbClr val="FCFCFC"/>
                     </a:solidFill>
                   </a:tcPr>
                 </a:tc>
@@ -7835,7 +7835,7 @@
                     <a:lstStyle/>
                     <a:p>
                       <a:pPr algn="ctr">
-                        <a:defRPr sz="1600"/>
+                        <a:defRPr sz="1500"/>
                       </a:pPr>
                       <a:r>
                         <a:t>2</a:t>
@@ -7844,7 +7844,7 @@
                   </a:txBody>
                   <a:tcPr>
                     <a:solidFill>
-                      <a:srgbClr val="FAFAFA"/>
+                      <a:srgbClr val="FCFCFC"/>
                     </a:solidFill>
                   </a:tcPr>
                 </a:tc>
@@ -7854,7 +7854,7 @@
                     <a:lstStyle/>
                     <a:p>
                       <a:pPr algn="ctr">
-                        <a:defRPr sz="1600"/>
+                        <a:defRPr sz="1500"/>
                       </a:pPr>
                       <a:r>
                         <a:t>9</a:t>
@@ -7863,7 +7863,7 @@
                   </a:txBody>
                   <a:tcPr>
                     <a:solidFill>
-                      <a:srgbClr val="FAFAFA"/>
+                      <a:srgbClr val="FCFCFC"/>
                     </a:solidFill>
                   </a:tcPr>
                 </a:tc>
@@ -7873,7 +7873,7 @@
                     <a:lstStyle/>
                     <a:p>
                       <a:pPr algn="ctr">
-                        <a:defRPr sz="1600"/>
+                        <a:defRPr sz="1500"/>
                       </a:pPr>
                       <a:r>
                         <a:t>268±39</a:t>
@@ -7882,7 +7882,7 @@
                   </a:txBody>
                   <a:tcPr>
                     <a:solidFill>
-                      <a:srgbClr val="FAFAFA"/>
+                      <a:srgbClr val="FCFCFC"/>
                     </a:solidFill>
                   </a:tcPr>
                 </a:tc>
@@ -7892,7 +7892,7 @@
                     <a:lstStyle/>
                     <a:p>
                       <a:pPr algn="ctr">
-                        <a:defRPr sz="1600"/>
+                        <a:defRPr sz="1500"/>
                       </a:pPr>
                       <a:r>
                         <a:t>666±57</a:t>
@@ -7901,7 +7901,7 @@
                   </a:txBody>
                   <a:tcPr>
                     <a:solidFill>
-                      <a:srgbClr val="FAFAFA"/>
+                      <a:srgbClr val="FCFCFC"/>
                     </a:solidFill>
                   </a:tcPr>
                 </a:tc>
@@ -7911,7 +7911,7 @@
                     <a:lstStyle/>
                     <a:p>
                       <a:pPr algn="ctr">
-                        <a:defRPr sz="1600"/>
+                        <a:defRPr sz="1500"/>
                       </a:pPr>
                       <a:r>
                         <a:t>1750±292</a:t>
@@ -7920,7 +7920,7 @@
                   </a:txBody>
                   <a:tcPr>
                     <a:solidFill>
-                      <a:srgbClr val="FAFAFA"/>
+                      <a:srgbClr val="FCFCFC"/>
                     </a:solidFill>
                   </a:tcPr>
                 </a:tc>
@@ -7930,7 +7930,7 @@
                     <a:lstStyle/>
                     <a:p>
                       <a:pPr algn="ctr">
-                        <a:defRPr sz="1600"/>
+                        <a:defRPr sz="1500"/>
                       </a:pPr>
                       <a:r>
                         <a:t>2879±500</a:t>
@@ -7939,19 +7939,19 @@
                   </a:txBody>
                   <a:tcPr>
                     <a:solidFill>
-                      <a:srgbClr val="FAFAFA"/>
+                      <a:srgbClr val="FCFCFC"/>
                     </a:solidFill>
                   </a:tcPr>
                 </a:tc>
               </a:tr>
-              <a:tr h="587832">
+              <a:tr h="627018">
                 <a:tc>
                   <a:txBody>
                     <a:bodyPr/>
                     <a:lstStyle/>
                     <a:p>
                       <a:pPr algn="ctr">
-                        <a:defRPr sz="1600"/>
+                        <a:defRPr sz="1500"/>
                       </a:pPr>
                       <a:r>
                         <a:t>Niño 3</a:t>
@@ -7966,7 +7966,7 @@
                     <a:lstStyle/>
                     <a:p>
                       <a:pPr algn="ctr">
-                        <a:defRPr sz="1600"/>
+                        <a:defRPr sz="1500"/>
                       </a:pPr>
                       <a:r>
                         <a:t>5</a:t>
@@ -7981,7 +7981,7 @@
                     <a:lstStyle/>
                     <a:p>
                       <a:pPr algn="ctr">
-                        <a:defRPr sz="1600"/>
+                        <a:defRPr sz="1500"/>
                       </a:pPr>
                       <a:r>
                         <a:t>15</a:t>
@@ -7996,7 +7996,7 @@
                     <a:lstStyle/>
                     <a:p>
                       <a:pPr algn="ctr">
-                        <a:defRPr sz="1600"/>
+                        <a:defRPr sz="1500"/>
                       </a:pPr>
                       <a:r>
                         <a:t>302±44</a:t>
@@ -8011,7 +8011,7 @@
                     <a:lstStyle/>
                     <a:p>
                       <a:pPr algn="ctr">
-                        <a:defRPr sz="1600"/>
+                        <a:defRPr sz="1500"/>
                       </a:pPr>
                       <a:r>
                         <a:t>681±140</a:t>
@@ -8026,7 +8026,7 @@
                     <a:lstStyle/>
                     <a:p>
                       <a:pPr algn="ctr">
-                        <a:defRPr sz="1600"/>
+                        <a:defRPr sz="1500"/>
                       </a:pPr>
                       <a:r>
                         <a:t>1598±501</a:t>
@@ -8041,7 +8041,7 @@
                     <a:lstStyle/>
                     <a:p>
                       <a:pPr algn="ctr">
-                        <a:defRPr sz="1600"/>
+                        <a:defRPr sz="1500"/>
                       </a:pPr>
                       <a:r>
                         <a:t>2800±573</a:t>
@@ -8072,13 +8072,13 @@
           <a:noFill/>
         </p:spPr>
         <p:txBody>
-          <a:bodyPr wrap="none">
+          <a:bodyPr wrap="square">
             <a:spAutoFit/>
           </a:bodyPr>
           <a:lstStyle/>
           <a:p>
             <a:pPr algn="ctr">
-              <a:defRPr sz="2400" b="1">
+              <a:defRPr sz="2600" b="1">
                 <a:solidFill>
                   <a:srgbClr val="C0392B"/>
                 </a:solidFill>
@@ -8117,7 +8117,7 @@
         <p:spPr>
           <a:xfrm>
             <a:off x="0" y="0"/>
-            <a:ext cx="9144000" cy="914400"/>
+            <a:ext cx="9144000" cy="777240"/>
           </a:xfrm>
           <a:prstGeom prst="rect">
             <a:avLst/>
@@ -8159,8 +8159,8 @@
         </p:nvSpPr>
         <p:spPr>
           <a:xfrm>
-            <a:off x="182880" y="137160"/>
-            <a:ext cx="8778240" cy="640080"/>
+            <a:off x="182880" y="164592"/>
+            <a:ext cx="8778240" cy="457200"/>
           </a:xfrm>
           <a:prstGeom prst="rect">
             <a:avLst/>
@@ -8174,7 +8174,7 @@
           <a:lstStyle/>
           <a:p>
             <a:pPr algn="ctr">
-              <a:defRPr sz="3400" b="1">
+              <a:defRPr sz="3000" b="1">
                 <a:solidFill>
                   <a:srgbClr val="FFFFFF"/>
                 </a:solidFill>
@@ -8194,8 +8194,8 @@
         </p:nvSpPr>
         <p:spPr>
           <a:xfrm>
-            <a:off x="457200" y="1188720"/>
-            <a:ext cx="8229600" cy="548640"/>
+            <a:off x="457200" y="960120"/>
+            <a:ext cx="8229600" cy="594360"/>
           </a:xfrm>
           <a:prstGeom prst="rect">
             <a:avLst/>
@@ -8203,13 +8203,13 @@
           <a:noFill/>
         </p:spPr>
         <p:txBody>
-          <a:bodyPr wrap="none">
+          <a:bodyPr wrap="square">
             <a:spAutoFit/>
           </a:bodyPr>
           <a:lstStyle/>
           <a:p>
             <a:pPr>
-              <a:defRPr sz="2600" b="1">
+              <a:defRPr sz="2500" b="1">
                 <a:solidFill>
                   <a:srgbClr val="34495E"/>
                 </a:solidFill>
@@ -8229,8 +8229,8 @@
         </p:nvSpPr>
         <p:spPr>
           <a:xfrm>
-            <a:off x="731520" y="1920240"/>
-            <a:ext cx="7680960" cy="502920"/>
+            <a:off x="731520" y="1645920"/>
+            <a:ext cx="7680960" cy="640080"/>
           </a:xfrm>
           <a:prstGeom prst="rect">
             <a:avLst/>
@@ -8244,7 +8244,7 @@
           <a:lstStyle/>
           <a:p>
             <a:pPr>
-              <a:defRPr sz="2400"/>
+              <a:defRPr sz="2300"/>
             </a:pPr>
             <a:r>
               <a:t>• la "altura" de la voz (grave o aguda)</a:t>
@@ -8260,8 +8260,8 @@
         </p:nvSpPr>
         <p:spPr>
           <a:xfrm>
-            <a:off x="731520" y="2468880"/>
-            <a:ext cx="7680960" cy="502920"/>
+            <a:off x="731520" y="2286000"/>
+            <a:ext cx="7680960" cy="640080"/>
           </a:xfrm>
           <a:prstGeom prst="rect">
             <a:avLst/>
@@ -8275,7 +8275,7 @@
           <a:lstStyle/>
           <a:p>
             <a:pPr>
-              <a:defRPr sz="2400"/>
+              <a:defRPr sz="2300"/>
             </a:pPr>
             <a:r>
               <a:t>• producido por la vibración de las cuerdas vocales</a:t>
@@ -8291,8 +8291,8 @@
         </p:nvSpPr>
         <p:spPr>
           <a:xfrm>
-            <a:off x="731520" y="3017520"/>
-            <a:ext cx="7680960" cy="502920"/>
+            <a:off x="731520" y="2926080"/>
+            <a:ext cx="7680960" cy="640080"/>
           </a:xfrm>
           <a:prstGeom prst="rect">
             <a:avLst/>
@@ -8306,7 +8306,7 @@
           <a:lstStyle/>
           <a:p>
             <a:pPr>
-              <a:defRPr sz="2400"/>
+              <a:defRPr sz="2300"/>
             </a:pPr>
             <a:r>
               <a:t>• en niños prepuberales: 200-350 Hz (similar en ambos géneros)</a:t>
@@ -8323,7 +8323,7 @@
         <p:spPr>
           <a:xfrm>
             <a:off x="731520" y="3566160"/>
-            <a:ext cx="7680960" cy="502920"/>
+            <a:ext cx="7680960" cy="640080"/>
           </a:xfrm>
           <a:prstGeom prst="rect">
             <a:avLst/>
@@ -8337,7 +8337,7 @@
           <a:lstStyle/>
           <a:p>
             <a:pPr>
-              <a:defRPr sz="2400"/>
+              <a:defRPr sz="2300"/>
             </a:pPr>
             <a:r>
               <a:t>• para comparar: adultos varones ~120 Hz, mujeres adultas ~220 Hz</a:t>
@@ -8372,7 +8372,7 @@
         <p:spPr>
           <a:xfrm>
             <a:off x="0" y="0"/>
-            <a:ext cx="9144000" cy="914400"/>
+            <a:ext cx="9144000" cy="777240"/>
           </a:xfrm>
           <a:prstGeom prst="rect">
             <a:avLst/>
@@ -8414,8 +8414,8 @@
         </p:nvSpPr>
         <p:spPr>
           <a:xfrm>
-            <a:off x="182880" y="137160"/>
-            <a:ext cx="8778240" cy="640080"/>
+            <a:off x="182880" y="164592"/>
+            <a:ext cx="8778240" cy="457200"/>
           </a:xfrm>
           <a:prstGeom prst="rect">
             <a:avLst/>
@@ -8429,7 +8429,7 @@
           <a:lstStyle/>
           <a:p>
             <a:pPr algn="ctr">
-              <a:defRPr sz="3400" b="1">
+              <a:defRPr sz="3000" b="1">
                 <a:solidFill>
                   <a:srgbClr val="FFFFFF"/>
                 </a:solidFill>
@@ -8449,8 +8449,8 @@
         </p:nvSpPr>
         <p:spPr>
           <a:xfrm>
-            <a:off x="457200" y="1188720"/>
-            <a:ext cx="8229600" cy="457200"/>
+            <a:off x="457200" y="960120"/>
+            <a:ext cx="8229600" cy="548640"/>
           </a:xfrm>
           <a:prstGeom prst="rect">
             <a:avLst/>
@@ -8464,7 +8464,7 @@
           <a:lstStyle/>
           <a:p>
             <a:pPr>
-              <a:defRPr sz="2600" b="1">
+              <a:defRPr sz="2500" b="1">
                 <a:solidFill>
                   <a:srgbClr val="34495E"/>
                 </a:solidFill>
@@ -8484,8 +8484,8 @@
         </p:nvSpPr>
         <p:spPr>
           <a:xfrm>
-            <a:off x="731520" y="1828800"/>
-            <a:ext cx="7680960" cy="457200"/>
+            <a:off x="731520" y="1600200"/>
+            <a:ext cx="7680960" cy="548640"/>
           </a:xfrm>
           <a:prstGeom prst="rect">
             <a:avLst/>
@@ -8493,13 +8493,13 @@
           <a:noFill/>
         </p:spPr>
         <p:txBody>
-          <a:bodyPr wrap="none">
+          <a:bodyPr wrap="square">
             <a:spAutoFit/>
           </a:bodyPr>
           <a:lstStyle/>
           <a:p>
             <a:pPr>
-              <a:defRPr sz="2400"/>
+              <a:defRPr sz="2300"/>
             </a:pPr>
             <a:r>
               <a:t>• frecuencias de resonancia del tracto vocal</a:t>
@@ -8515,8 +8515,8 @@
         </p:nvSpPr>
         <p:spPr>
           <a:xfrm>
-            <a:off x="731520" y="2377440"/>
-            <a:ext cx="7680960" cy="457200"/>
+            <a:off x="731520" y="2194560"/>
+            <a:ext cx="7680960" cy="548640"/>
           </a:xfrm>
           <a:prstGeom prst="rect">
             <a:avLst/>
@@ -8524,13 +8524,13 @@
           <a:noFill/>
         </p:spPr>
         <p:txBody>
-          <a:bodyPr wrap="none">
+          <a:bodyPr wrap="square">
             <a:spAutoFit/>
           </a:bodyPr>
           <a:lstStyle/>
           <a:p>
             <a:pPr>
-              <a:defRPr sz="2400"/>
+              <a:defRPr sz="2300"/>
             </a:pPr>
             <a:r>
               <a:t>• determinan la calidad de las vocales (/a/, /e/, /i/, /o/, /u/)</a:t>
@@ -8546,8 +8546,8 @@
         </p:nvSpPr>
         <p:spPr>
           <a:xfrm>
-            <a:off x="731520" y="2926080"/>
-            <a:ext cx="7680960" cy="457200"/>
+            <a:off x="731520" y="2788920"/>
+            <a:ext cx="7680960" cy="548640"/>
           </a:xfrm>
           <a:prstGeom prst="rect">
             <a:avLst/>
@@ -8555,13 +8555,13 @@
           <a:noFill/>
         </p:spPr>
         <p:txBody>
-          <a:bodyPr wrap="none">
+          <a:bodyPr wrap="square">
             <a:spAutoFit/>
           </a:bodyPr>
           <a:lstStyle/>
           <a:p>
             <a:pPr>
-              <a:defRPr sz="2400"/>
+              <a:defRPr sz="2300"/>
             </a:pPr>
             <a:r>
               <a:t>• relacionados con la longitud del tracto vocal</a:t>
@@ -8577,8 +8577,8 @@
         </p:nvSpPr>
         <p:spPr>
           <a:xfrm>
-            <a:off x="731520" y="3657600"/>
-            <a:ext cx="7680960" cy="457200"/>
+            <a:off x="731520" y="3566160"/>
+            <a:ext cx="7680960" cy="548640"/>
           </a:xfrm>
           <a:prstGeom prst="rect">
             <a:avLst/>
@@ -8612,8 +8612,8 @@
         </p:nvSpPr>
         <p:spPr>
           <a:xfrm>
-            <a:off x="731520" y="4206240"/>
-            <a:ext cx="7680960" cy="457200"/>
+            <a:off x="731520" y="4160520"/>
+            <a:ext cx="7680960" cy="548640"/>
           </a:xfrm>
           <a:prstGeom prst="rect">
             <a:avLst/>
@@ -8647,8 +8647,8 @@
         </p:nvSpPr>
         <p:spPr>
           <a:xfrm>
-            <a:off x="731520" y="4754879"/>
-            <a:ext cx="7680960" cy="457200"/>
+            <a:off x="731520" y="4754880"/>
+            <a:ext cx="7680960" cy="548640"/>
           </a:xfrm>
           <a:prstGeom prst="rect">
             <a:avLst/>
@@ -8701,7 +8701,7 @@
         <p:spPr>
           <a:xfrm>
             <a:off x="0" y="0"/>
-            <a:ext cx="9144000" cy="914400"/>
+            <a:ext cx="9144000" cy="777240"/>
           </a:xfrm>
           <a:prstGeom prst="rect">
             <a:avLst/>
@@ -8743,8 +8743,8 @@
         </p:nvSpPr>
         <p:spPr>
           <a:xfrm>
-            <a:off x="182880" y="137160"/>
-            <a:ext cx="8778240" cy="640080"/>
+            <a:off x="182880" y="164592"/>
+            <a:ext cx="8778240" cy="457200"/>
           </a:xfrm>
           <a:prstGeom prst="rect">
             <a:avLst/>
@@ -8758,7 +8758,7 @@
           <a:lstStyle/>
           <a:p>
             <a:pPr algn="ctr">
-              <a:defRPr sz="3400" b="1">
+              <a:defRPr sz="3000" b="1">
                 <a:solidFill>
                   <a:srgbClr val="FFFFFF"/>
                 </a:solidFill>
@@ -8778,7 +8778,7 @@
         </p:nvSpPr>
         <p:spPr>
           <a:xfrm>
-            <a:off x="457200" y="1097280"/>
+            <a:off x="457200" y="914400"/>
             <a:ext cx="8229600" cy="457200"/>
           </a:xfrm>
           <a:prstGeom prst="rect">
@@ -8793,7 +8793,7 @@
           <a:lstStyle/>
           <a:p>
             <a:pPr>
-              <a:defRPr sz="2400">
+              <a:defRPr sz="2300">
                 <a:solidFill>
                   <a:srgbClr val="34495E"/>
                 </a:solidFill>
@@ -8821,8 +8821,8 @@
         </p:blipFill>
         <p:spPr>
           <a:xfrm>
-            <a:off x="1371600" y="1737360"/>
-            <a:ext cx="4743014" cy="4114800"/>
+            <a:off x="1371600" y="1554480"/>
+            <a:ext cx="4848414" cy="4206240"/>
           </a:xfrm>
           <a:prstGeom prst="rect">
             <a:avLst/>
@@ -8837,8 +8837,8 @@
         </p:nvSpPr>
         <p:spPr>
           <a:xfrm>
-            <a:off x="457200" y="6035040"/>
-            <a:ext cx="8229600" cy="640080"/>
+            <a:off x="457200" y="5943600"/>
+            <a:ext cx="8229600" cy="731520"/>
           </a:xfrm>
           <a:prstGeom prst="rect">
             <a:avLst/>
@@ -8852,7 +8852,7 @@
           <a:lstStyle/>
           <a:p>
             <a:pPr>
-              <a:defRPr sz="2000" i="1">
+              <a:defRPr sz="1900" i="1">
                 <a:solidFill>
                   <a:srgbClr val="34495E"/>
                 </a:solidFill>

</xml_diff>